<commit_message>
finish with the front-end, fix bugs in newsManager' fix problems in LLM  and Data Manger
</commit_message>
<xml_diff>
--- a/מצגת.pptx
+++ b/מצגת.pptx
@@ -5,13 +5,14 @@
     <p:sldMasterId id="2147483648" r:id="rId1"/>
   </p:sldMasterIdLst>
   <p:notesMasterIdLst>
-    <p:notesMasterId r:id="rId6"/>
+    <p:notesMasterId r:id="rId7"/>
   </p:notesMasterIdLst>
   <p:sldIdLst>
     <p:sldId id="256" r:id="rId2"/>
     <p:sldId id="257" r:id="rId3"/>
-    <p:sldId id="258" r:id="rId4"/>
+    <p:sldId id="260" r:id="rId4"/>
     <p:sldId id="259" r:id="rId5"/>
+    <p:sldId id="261" r:id="rId6"/>
   </p:sldIdLst>
   <p:sldSz cx="12192000" cy="6858000"/>
   <p:notesSz cx="6858000" cy="9144000"/>
@@ -110,6 +111,11 @@
       </a:defRPr>
     </a:lvl9pPr>
   </p:defaultTextStyle>
+  <p:extLst>
+    <p:ext uri="{EFAFB233-063F-42B5-8137-9DF3F51BA10A}">
+      <p15:sldGuideLst xmlns:p15="http://schemas.microsoft.com/office/powerpoint/2012/main"/>
+    </p:ext>
+  </p:extLst>
 </p:presentation>
 </file>
 
@@ -195,7 +201,7 @@
           <a:p>
             <a:fld id="{BBCCBFA6-B51C-4C55-A048-214D83A203B2}" type="datetimeFigureOut">
               <a:rPr lang="he-IL" smtClean="0"/>
-              <a:t>כ"ט/ניסן/תשפ"ה</a:t>
+              <a:t>ל'/ניסן/תשפ"ה</a:t>
             </a:fld>
             <a:endParaRPr lang="he-IL"/>
           </a:p>
@@ -609,7 +615,7 @@
           <a:p>
             <a:fld id="{B473996B-4291-4A11-B81F-85FF913FEA71}" type="datetimeFigureOut">
               <a:rPr lang="he-IL" smtClean="0"/>
-              <a:t>כ"ט/ניסן/תשפ"ה</a:t>
+              <a:t>ל'/ניסן/תשפ"ה</a:t>
             </a:fld>
             <a:endParaRPr lang="he-IL"/>
           </a:p>
@@ -807,7 +813,7 @@
           <a:p>
             <a:fld id="{B473996B-4291-4A11-B81F-85FF913FEA71}" type="datetimeFigureOut">
               <a:rPr lang="he-IL" smtClean="0"/>
-              <a:t>כ"ט/ניסן/תשפ"ה</a:t>
+              <a:t>ל'/ניסן/תשפ"ה</a:t>
             </a:fld>
             <a:endParaRPr lang="he-IL"/>
           </a:p>
@@ -1015,7 +1021,7 @@
           <a:p>
             <a:fld id="{B473996B-4291-4A11-B81F-85FF913FEA71}" type="datetimeFigureOut">
               <a:rPr lang="he-IL" smtClean="0"/>
-              <a:t>כ"ט/ניסן/תשפ"ה</a:t>
+              <a:t>ל'/ניסן/תשפ"ה</a:t>
             </a:fld>
             <a:endParaRPr lang="he-IL"/>
           </a:p>
@@ -1213,7 +1219,7 @@
           <a:p>
             <a:fld id="{B473996B-4291-4A11-B81F-85FF913FEA71}" type="datetimeFigureOut">
               <a:rPr lang="he-IL" smtClean="0"/>
-              <a:t>כ"ט/ניסן/תשפ"ה</a:t>
+              <a:t>ל'/ניסן/תשפ"ה</a:t>
             </a:fld>
             <a:endParaRPr lang="he-IL"/>
           </a:p>
@@ -1488,7 +1494,7 @@
           <a:p>
             <a:fld id="{B473996B-4291-4A11-B81F-85FF913FEA71}" type="datetimeFigureOut">
               <a:rPr lang="he-IL" smtClean="0"/>
-              <a:t>כ"ט/ניסן/תשפ"ה</a:t>
+              <a:t>ל'/ניסן/תשפ"ה</a:t>
             </a:fld>
             <a:endParaRPr lang="he-IL"/>
           </a:p>
@@ -1753,7 +1759,7 @@
           <a:p>
             <a:fld id="{B473996B-4291-4A11-B81F-85FF913FEA71}" type="datetimeFigureOut">
               <a:rPr lang="he-IL" smtClean="0"/>
-              <a:t>כ"ט/ניסן/תשפ"ה</a:t>
+              <a:t>ל'/ניסן/תשפ"ה</a:t>
             </a:fld>
             <a:endParaRPr lang="he-IL"/>
           </a:p>
@@ -2165,7 +2171,7 @@
           <a:p>
             <a:fld id="{B473996B-4291-4A11-B81F-85FF913FEA71}" type="datetimeFigureOut">
               <a:rPr lang="he-IL" smtClean="0"/>
-              <a:t>כ"ט/ניסן/תשפ"ה</a:t>
+              <a:t>ל'/ניסן/תשפ"ה</a:t>
             </a:fld>
             <a:endParaRPr lang="he-IL"/>
           </a:p>
@@ -2306,7 +2312,7 @@
           <a:p>
             <a:fld id="{B473996B-4291-4A11-B81F-85FF913FEA71}" type="datetimeFigureOut">
               <a:rPr lang="he-IL" smtClean="0"/>
-              <a:t>כ"ט/ניסן/תשפ"ה</a:t>
+              <a:t>ל'/ניסן/תשפ"ה</a:t>
             </a:fld>
             <a:endParaRPr lang="he-IL"/>
           </a:p>
@@ -2419,7 +2425,7 @@
           <a:p>
             <a:fld id="{B473996B-4291-4A11-B81F-85FF913FEA71}" type="datetimeFigureOut">
               <a:rPr lang="he-IL" smtClean="0"/>
-              <a:t>כ"ט/ניסן/תשפ"ה</a:t>
+              <a:t>ל'/ניסן/תשפ"ה</a:t>
             </a:fld>
             <a:endParaRPr lang="he-IL"/>
           </a:p>
@@ -2730,7 +2736,7 @@
           <a:p>
             <a:fld id="{B473996B-4291-4A11-B81F-85FF913FEA71}" type="datetimeFigureOut">
               <a:rPr lang="he-IL" smtClean="0"/>
-              <a:t>כ"ט/ניסן/תשפ"ה</a:t>
+              <a:t>ל'/ניסן/תשפ"ה</a:t>
             </a:fld>
             <a:endParaRPr lang="he-IL"/>
           </a:p>
@@ -3018,7 +3024,7 @@
           <a:p>
             <a:fld id="{B473996B-4291-4A11-B81F-85FF913FEA71}" type="datetimeFigureOut">
               <a:rPr lang="he-IL" smtClean="0"/>
-              <a:t>כ"ט/ניסן/תשפ"ה</a:t>
+              <a:t>ל'/ניסן/תשפ"ה</a:t>
             </a:fld>
             <a:endParaRPr lang="he-IL"/>
           </a:p>
@@ -3095,9 +3101,18 @@
 <p:sldMaster xmlns:a="http://schemas.openxmlformats.org/drawingml/2006/main" xmlns:r="http://schemas.openxmlformats.org/officeDocument/2006/relationships" xmlns:p="http://schemas.openxmlformats.org/presentationml/2006/main">
   <p:cSld>
     <p:bg>
-      <p:bgRef idx="1001">
-        <a:schemeClr val="bg1"/>
-      </p:bgRef>
+      <p:bgPr>
+        <a:blipFill dpi="0" rotWithShape="1">
+          <a:blip r:embed="rId13">
+            <a:lum/>
+          </a:blip>
+          <a:srcRect/>
+          <a:stretch>
+            <a:fillRect l="-4000"/>
+          </a:stretch>
+        </a:blipFill>
+        <a:effectLst/>
+      </p:bgPr>
     </p:bg>
     <p:spTree>
       <p:nvGrpSpPr>
@@ -3259,7 +3274,7 @@
           <a:p>
             <a:fld id="{B473996B-4291-4A11-B81F-85FF913FEA71}" type="datetimeFigureOut">
               <a:rPr lang="he-IL" smtClean="0"/>
-              <a:t>כ"ט/ניסן/תשפ"ה</a:t>
+              <a:t>ל'/ניסן/תשפ"ה</a:t>
             </a:fld>
             <a:endParaRPr lang="he-IL"/>
           </a:p>
@@ -3662,20 +3677,6 @@
 <file path=ppt/slides/slide1.xml><?xml version="1.0" encoding="utf-8"?>
 <p:sld xmlns:a="http://schemas.openxmlformats.org/drawingml/2006/main" xmlns:r="http://schemas.openxmlformats.org/officeDocument/2006/relationships" xmlns:p="http://schemas.openxmlformats.org/presentationml/2006/main">
   <p:cSld>
-    <p:bg>
-      <p:bgPr>
-        <a:blipFill dpi="0" rotWithShape="1">
-          <a:blip r:embed="rId2">
-            <a:lum/>
-          </a:blip>
-          <a:srcRect/>
-          <a:stretch>
-            <a:fillRect t="-39000" b="-39000"/>
-          </a:stretch>
-        </a:blipFill>
-        <a:effectLst/>
-      </p:bgPr>
-    </p:bg>
     <p:spTree>
       <p:nvGrpSpPr>
         <p:cNvPr id="1" name=""/>
@@ -3705,7 +3706,7 @@
           <p:nvPr/>
         </p:nvPicPr>
         <p:blipFill>
-          <a:blip r:embed="rId3">
+          <a:blip r:embed="rId2">
             <a:extLst>
               <a:ext uri="{28A0092B-C50C-407E-A947-70E740481C1C}">
                 <a14:useLocalDpi xmlns:a14="http://schemas.microsoft.com/office/drawing/2010/main" val="0"/>
@@ -3718,7 +3719,7 @@
         </p:blipFill>
         <p:spPr>
           <a:xfrm>
-            <a:off x="2029758" y="5318800"/>
+            <a:off x="5368286" y="5365087"/>
             <a:ext cx="1278480" cy="1204484"/>
           </a:xfrm>
           <a:prstGeom prst="rect">
@@ -3741,7 +3742,7 @@
           <p:nvPr/>
         </p:nvPicPr>
         <p:blipFill>
-          <a:blip r:embed="rId4">
+          <a:blip r:embed="rId3">
             <a:extLst>
               <a:ext uri="{28A0092B-C50C-407E-A947-70E740481C1C}">
                 <a14:useLocalDpi xmlns:a14="http://schemas.microsoft.com/office/drawing/2010/main" val="0"/>
@@ -3754,7 +3755,7 @@
         </p:blipFill>
         <p:spPr>
           <a:xfrm>
-            <a:off x="4971060" y="5214317"/>
+            <a:off x="1713953" y="2148466"/>
             <a:ext cx="1487441" cy="1274949"/>
           </a:xfrm>
           <a:prstGeom prst="rect">
@@ -3777,7 +3778,7 @@
           <p:nvPr/>
         </p:nvPicPr>
         <p:blipFill>
-          <a:blip r:embed="rId5">
+          <a:blip r:embed="rId4">
             <a:extLst>
               <a:ext uri="{28A0092B-C50C-407E-A947-70E740481C1C}">
                 <a14:useLocalDpi xmlns:a14="http://schemas.microsoft.com/office/drawing/2010/main" val="0"/>
@@ -3790,7 +3791,7 @@
         </p:blipFill>
         <p:spPr>
           <a:xfrm>
-            <a:off x="401583" y="4063141"/>
+            <a:off x="8549670" y="2148466"/>
             <a:ext cx="2271046" cy="878320"/>
           </a:xfrm>
           <a:prstGeom prst="rect">
@@ -3813,10 +3814,10 @@
           <p:nvPr/>
         </p:nvPicPr>
         <p:blipFill>
-          <a:blip r:embed="rId6">
+          <a:blip r:embed="rId5">
             <a:extLst>
               <a:ext uri="{96DAC541-7B7A-43D3-8B79-37D633B846F1}">
-                <asvg:svgBlip xmlns:asvg="http://schemas.microsoft.com/office/drawing/2016/SVG/main" r:embed="rId7"/>
+                <asvg:svgBlip xmlns:asvg="http://schemas.microsoft.com/office/drawing/2016/SVG/main" r:embed="rId6"/>
               </a:ext>
             </a:extLst>
           </a:blip>
@@ -3826,7 +3827,7 @@
         </p:blipFill>
         <p:spPr>
           <a:xfrm>
-            <a:off x="401583" y="5560025"/>
+            <a:off x="7891189" y="5439593"/>
             <a:ext cx="1368855" cy="687849"/>
           </a:xfrm>
           <a:prstGeom prst="rect">
@@ -3849,7 +3850,7 @@
           <p:nvPr/>
         </p:nvPicPr>
         <p:blipFill>
-          <a:blip r:embed="rId8">
+          <a:blip r:embed="rId7">
             <a:extLst>
               <a:ext uri="{28A0092B-C50C-407E-A947-70E740481C1C}">
                 <a14:useLocalDpi xmlns:a14="http://schemas.microsoft.com/office/drawing/2010/main" val="0"/>
@@ -3862,7 +3863,7 @@
         </p:blipFill>
         <p:spPr>
           <a:xfrm>
-            <a:off x="3782759" y="5470144"/>
+            <a:off x="9027992" y="3633726"/>
             <a:ext cx="908672" cy="997267"/>
           </a:xfrm>
           <a:prstGeom prst="rect">
@@ -3885,7 +3886,7 @@
           <p:nvPr/>
         </p:nvPicPr>
         <p:blipFill>
-          <a:blip r:embed="rId9">
+          <a:blip r:embed="rId8">
             <a:extLst>
               <a:ext uri="{28A0092B-C50C-407E-A947-70E740481C1C}">
                 <a14:useLocalDpi xmlns:a14="http://schemas.microsoft.com/office/drawing/2010/main" val="0"/>
@@ -3898,7 +3899,7 @@
         </p:blipFill>
         <p:spPr>
           <a:xfrm>
-            <a:off x="8186774" y="5322866"/>
+            <a:off x="5372963" y="370452"/>
             <a:ext cx="1073270" cy="878320"/>
           </a:xfrm>
           <a:prstGeom prst="rect">
@@ -3921,7 +3922,7 @@
           <p:nvPr/>
         </p:nvPicPr>
         <p:blipFill>
-          <a:blip r:embed="rId10">
+          <a:blip r:embed="rId9">
             <a:extLst>
               <a:ext uri="{28A0092B-C50C-407E-A947-70E740481C1C}">
                 <a14:useLocalDpi xmlns:a14="http://schemas.microsoft.com/office/drawing/2010/main" val="0"/>
@@ -3934,7 +3935,7 @@
         </p:blipFill>
         <p:spPr>
           <a:xfrm>
-            <a:off x="3077324" y="4003668"/>
+            <a:off x="7360487" y="645658"/>
             <a:ext cx="1899557" cy="997267"/>
           </a:xfrm>
           <a:prstGeom prst="rect">
@@ -3957,7 +3958,7 @@
           <p:nvPr/>
         </p:nvPicPr>
         <p:blipFill>
-          <a:blip r:embed="rId11">
+          <a:blip r:embed="rId10">
             <a:extLst>
               <a:ext uri="{28A0092B-C50C-407E-A947-70E740481C1C}">
                 <a14:useLocalDpi xmlns:a14="http://schemas.microsoft.com/office/drawing/2010/main" val="0"/>
@@ -3970,7 +3971,7 @@
         </p:blipFill>
         <p:spPr>
           <a:xfrm>
-            <a:off x="5351352" y="3254975"/>
+            <a:off x="2672325" y="4673300"/>
             <a:ext cx="2305050" cy="2305050"/>
           </a:xfrm>
           <a:prstGeom prst="rect">
@@ -3993,7 +3994,7 @@
           <p:nvPr/>
         </p:nvPicPr>
         <p:blipFill>
-          <a:blip r:embed="rId12">
+          <a:blip r:embed="rId11">
             <a:extLst>
               <a:ext uri="{28A0092B-C50C-407E-A947-70E740481C1C}">
                 <a14:useLocalDpi xmlns:a14="http://schemas.microsoft.com/office/drawing/2010/main" val="0"/>
@@ -4006,7 +4007,7 @@
         </p:blipFill>
         <p:spPr>
           <a:xfrm>
-            <a:off x="6312722" y="5103790"/>
+            <a:off x="2672325" y="321331"/>
             <a:ext cx="1912423" cy="1274949"/>
           </a:xfrm>
           <a:prstGeom prst="rect">
@@ -4029,7 +4030,7 @@
           <p:nvPr/>
         </p:nvPicPr>
         <p:blipFill>
-          <a:blip r:embed="rId13">
+          <a:blip r:embed="rId12">
             <a:extLst>
               <a:ext uri="{28A0092B-C50C-407E-A947-70E740481C1C}">
                 <a14:useLocalDpi xmlns:a14="http://schemas.microsoft.com/office/drawing/2010/main" val="0"/>
@@ -4042,7 +4043,7 @@
         </p:blipFill>
         <p:spPr>
           <a:xfrm>
-            <a:off x="7799893" y="3971011"/>
+            <a:off x="1714000" y="4022378"/>
             <a:ext cx="1202314" cy="1204484"/>
           </a:xfrm>
           <a:prstGeom prst="rect">
@@ -4052,10 +4053,10 @@
       </p:pic>
       <p:sp>
         <p:nvSpPr>
-          <p:cNvPr id="40" name="מלבן 39">
-            <a:extLst>
-              <a:ext uri="{FF2B5EF4-FFF2-40B4-BE49-F238E27FC236}">
-                <a16:creationId xmlns:a16="http://schemas.microsoft.com/office/drawing/2014/main" id="{10350C14-376F-1450-0B6B-3CA62626B45F}"/>
+          <p:cNvPr id="2" name="מלבן: פינות מעוגלות 1">
+            <a:extLst>
+              <a:ext uri="{FF2B5EF4-FFF2-40B4-BE49-F238E27FC236}">
+                <a16:creationId xmlns:a16="http://schemas.microsoft.com/office/drawing/2014/main" id="{C1C218FC-3A66-4635-64A5-EE29A082DA5E}"/>
               </a:ext>
             </a:extLst>
           </p:cNvPr>
@@ -4064,8 +4065,100 @@
         </p:nvSpPr>
         <p:spPr>
           <a:xfrm>
-            <a:off x="4177228" y="946117"/>
-            <a:ext cx="3536289" cy="2339102"/>
+            <a:off x="3602535" y="1807132"/>
+            <a:ext cx="4739236" cy="3243736"/>
+          </a:xfrm>
+          <a:prstGeom prst="roundRect">
+            <a:avLst/>
+          </a:prstGeom>
+          <a:solidFill>
+            <a:schemeClr val="accent2">
+              <a:lumMod val="60000"/>
+              <a:lumOff val="40000"/>
+              <a:alpha val="43000"/>
+            </a:schemeClr>
+          </a:solidFill>
+          <a:effectLst>
+            <a:softEdge rad="177800"/>
+          </a:effectLst>
+        </p:spPr>
+        <p:style>
+          <a:lnRef idx="2">
+            <a:schemeClr val="accent1">
+              <a:shade val="15000"/>
+            </a:schemeClr>
+          </a:lnRef>
+          <a:fillRef idx="1">
+            <a:schemeClr val="accent1"/>
+          </a:fillRef>
+          <a:effectRef idx="0">
+            <a:schemeClr val="accent1"/>
+          </a:effectRef>
+          <a:fontRef idx="minor">
+            <a:schemeClr val="lt1"/>
+          </a:fontRef>
+        </p:style>
+        <p:txBody>
+          <a:bodyPr rtlCol="1" anchor="ctr"/>
+          <a:lstStyle/>
+          <a:p>
+            <a:pPr algn="ctr"/>
+            <a:endParaRPr lang="he-IL" dirty="0"/>
+          </a:p>
+        </p:txBody>
+      </p:sp>
+      <p:pic>
+        <p:nvPicPr>
+          <p:cNvPr id="43" name="תמונה 42" descr="תמונה שמכילה גרפיקה, לוגו, עיצוב גרפי, צילום מסך&#10;&#10;תוכן שנוצר על-ידי בינה מלאכותית עשוי להיות שגוי.">
+            <a:extLst>
+              <a:ext uri="{FF2B5EF4-FFF2-40B4-BE49-F238E27FC236}">
+                <a16:creationId xmlns:a16="http://schemas.microsoft.com/office/drawing/2014/main" id="{D62F5955-5D0B-C3D9-B19E-9CF6254495EA}"/>
+              </a:ext>
+            </a:extLst>
+          </p:cNvPr>
+          <p:cNvPicPr>
+            <a:picLocks noChangeAspect="1"/>
+          </p:cNvPicPr>
+          <p:nvPr/>
+        </p:nvPicPr>
+        <p:blipFill>
+          <a:blip r:embed="rId13">
+            <a:extLst>
+              <a:ext uri="{28A0092B-C50C-407E-A947-70E740481C1C}">
+                <a14:useLocalDpi xmlns:a14="http://schemas.microsoft.com/office/drawing/2010/main" val="0"/>
+              </a:ext>
+            </a:extLst>
+          </a:blip>
+          <a:stretch>
+            <a:fillRect/>
+          </a:stretch>
+        </p:blipFill>
+        <p:spPr>
+          <a:xfrm>
+            <a:off x="4229600" y="1392177"/>
+            <a:ext cx="3319201" cy="3319201"/>
+          </a:xfrm>
+          <a:prstGeom prst="rect">
+            <a:avLst/>
+          </a:prstGeom>
+        </p:spPr>
+      </p:pic>
+      <p:sp>
+        <p:nvSpPr>
+          <p:cNvPr id="40" name="מלבן 39">
+            <a:extLst>
+              <a:ext uri="{FF2B5EF4-FFF2-40B4-BE49-F238E27FC236}">
+                <a16:creationId xmlns:a16="http://schemas.microsoft.com/office/drawing/2014/main" id="{10350C14-376F-1450-0B6B-3CA62626B45F}"/>
+              </a:ext>
+            </a:extLst>
+          </p:cNvPr>
+          <p:cNvSpPr/>
+          <p:nvPr/>
+        </p:nvSpPr>
+        <p:spPr>
+          <a:xfrm>
+            <a:off x="4167960" y="3993201"/>
+            <a:ext cx="3646896" cy="707886"/>
           </a:xfrm>
           <a:prstGeom prst="rect">
             <a:avLst/>
@@ -4078,19 +4171,22 @@
           </a:bodyPr>
           <a:lstStyle/>
           <a:p>
-            <a:pPr algn="ctr"/>
+            <a:pPr algn="l"/>
             <a:r>
-              <a:rPr lang="en-US" sz="6600" b="1" cap="none" spc="50" dirty="0" err="1">
+              <a:rPr lang="en-US" sz="4000" b="1" spc="50" dirty="0">
                 <a:ln w="9525" cmpd="sng">
                   <a:solidFill>
-                    <a:schemeClr val="accent1"/>
+                    <a:schemeClr val="accent2">
+                      <a:lumMod val="50000"/>
+                    </a:schemeClr>
                   </a:solidFill>
                   <a:prstDash val="solid"/>
                 </a:ln>
                 <a:solidFill>
-                  <a:srgbClr val="70AD47">
-                    <a:tint val="1000"/>
-                  </a:srgbClr>
+                  <a:schemeClr val="tx2">
+                    <a:lumMod val="50000"/>
+                    <a:lumOff val="50000"/>
+                  </a:schemeClr>
                 </a:solidFill>
                 <a:effectLst>
                   <a:glow rad="38100">
@@ -4100,87 +4196,23 @@
                   </a:glow>
                 </a:effectLst>
               </a:rPr>
-              <a:t>NewsAI</a:t>
+              <a:t> </a:t>
             </a:r>
-            <a:br>
-              <a:rPr lang="en-US" sz="6600" b="1" cap="none" spc="50" dirty="0">
+            <a:r>
+              <a:rPr lang="en-US" sz="4000" b="1" cap="none" spc="50" dirty="0">
                 <a:ln w="9525" cmpd="sng">
                   <a:solidFill>
-                    <a:schemeClr val="accent1"/>
+                    <a:schemeClr val="accent2">
+                      <a:lumMod val="50000"/>
+                    </a:schemeClr>
                   </a:solidFill>
                   <a:prstDash val="solid"/>
                 </a:ln>
                 <a:solidFill>
-                  <a:srgbClr val="70AD47">
-                    <a:tint val="1000"/>
-                  </a:srgbClr>
-                </a:solidFill>
-                <a:effectLst>
-                  <a:glow rad="38100">
-                    <a:schemeClr val="accent1">
-                      <a:alpha val="40000"/>
-                    </a:schemeClr>
-                  </a:glow>
-                </a:effectLst>
-              </a:rPr>
-            </a:br>
-            <a:r>
-              <a:rPr lang="en-US" sz="4000" b="1" cap="none" spc="50" dirty="0">
-                <a:ln w="9525" cmpd="sng">
-                  <a:solidFill>
-                    <a:schemeClr val="accent1"/>
-                  </a:solidFill>
-                  <a:prstDash val="solid"/>
-                </a:ln>
-                <a:solidFill>
-                  <a:srgbClr val="70AD47">
-                    <a:tint val="1000"/>
-                  </a:srgbClr>
-                </a:solidFill>
-                <a:effectLst>
-                  <a:glow rad="38100">
-                    <a:schemeClr val="accent1">
-                      <a:alpha val="40000"/>
-                    </a:schemeClr>
-                  </a:glow>
-                </a:effectLst>
-              </a:rPr>
-              <a:t>by</a:t>
-            </a:r>
-            <a:br>
-              <a:rPr lang="en-US" sz="4000" b="1" cap="none" spc="50" dirty="0">
-                <a:ln w="9525" cmpd="sng">
-                  <a:solidFill>
-                    <a:schemeClr val="accent1"/>
-                  </a:solidFill>
-                  <a:prstDash val="solid"/>
-                </a:ln>
-                <a:solidFill>
-                  <a:srgbClr val="70AD47">
-                    <a:tint val="1000"/>
-                  </a:srgbClr>
-                </a:solidFill>
-                <a:effectLst>
-                  <a:glow rad="38100">
-                    <a:schemeClr val="accent1">
-                      <a:alpha val="40000"/>
-                    </a:schemeClr>
-                  </a:glow>
-                </a:effectLst>
-              </a:rPr>
-            </a:br>
-            <a:r>
-              <a:rPr lang="en-US" sz="4000" b="1" cap="none" spc="50" dirty="0">
-                <a:ln w="9525" cmpd="sng">
-                  <a:solidFill>
-                    <a:schemeClr val="accent1"/>
-                  </a:solidFill>
-                  <a:prstDash val="solid"/>
-                </a:ln>
-                <a:solidFill>
-                  <a:srgbClr val="70AD47">
-                    <a:tint val="1000"/>
-                  </a:srgbClr>
+                  <a:schemeClr val="tx2">
+                    <a:lumMod val="50000"/>
+                    <a:lumOff val="50000"/>
+                  </a:schemeClr>
                 </a:solidFill>
                 <a:effectLst>
                   <a:glow rad="38100">
@@ -4195,14 +4227,17 @@
             <a:endParaRPr lang="he-IL" sz="6600" b="1" cap="none" spc="50" dirty="0">
               <a:ln w="9525" cmpd="sng">
                 <a:solidFill>
-                  <a:schemeClr val="accent1"/>
+                  <a:schemeClr val="accent2">
+                    <a:lumMod val="50000"/>
+                  </a:schemeClr>
                 </a:solidFill>
                 <a:prstDash val="solid"/>
               </a:ln>
               <a:solidFill>
-                <a:srgbClr val="70AD47">
-                  <a:tint val="1000"/>
-                </a:srgbClr>
+                <a:schemeClr val="tx2">
+                  <a:lumMod val="50000"/>
+                  <a:lumOff val="50000"/>
+                </a:schemeClr>
               </a:solidFill>
               <a:effectLst>
                 <a:glow rad="38100">
@@ -4215,42 +4250,75 @@
           </a:p>
         </p:txBody>
       </p:sp>
-      <p:pic>
-        <p:nvPicPr>
-          <p:cNvPr id="43" name="תמונה 42" descr="תמונה שמכילה גרפיקה, לוגו, עיצוב גרפי, צילום מסך&#10;&#10;תוכן שנוצר על-ידי בינה מלאכותית עשוי להיות שגוי.">
-            <a:extLst>
-              <a:ext uri="{FF2B5EF4-FFF2-40B4-BE49-F238E27FC236}">
-                <a16:creationId xmlns:a16="http://schemas.microsoft.com/office/drawing/2014/main" id="{D62F5955-5D0B-C3D9-B19E-9CF6254495EA}"/>
-              </a:ext>
-            </a:extLst>
-          </p:cNvPr>
-          <p:cNvPicPr>
-            <a:picLocks noChangeAspect="1"/>
-          </p:cNvPicPr>
+      <p:sp>
+        <p:nvSpPr>
+          <p:cNvPr id="3" name="Rectangle 1">
+            <a:extLst>
+              <a:ext uri="{FF2B5EF4-FFF2-40B4-BE49-F238E27FC236}">
+                <a16:creationId xmlns:a16="http://schemas.microsoft.com/office/drawing/2014/main" id="{544E9ADF-738F-1B57-2783-CB29F7053889}"/>
+              </a:ext>
+            </a:extLst>
+          </p:cNvPr>
+          <p:cNvSpPr>
+            <a:spLocks noChangeArrowheads="1"/>
+          </p:cNvSpPr>
           <p:nvPr/>
-        </p:nvPicPr>
-        <p:blipFill>
-          <a:blip r:embed="rId14">
-            <a:extLst>
-              <a:ext uri="{28A0092B-C50C-407E-A947-70E740481C1C}">
-                <a14:useLocalDpi xmlns:a14="http://schemas.microsoft.com/office/drawing/2010/main" val="0"/>
-              </a:ext>
-            </a:extLst>
-          </a:blip>
-          <a:stretch>
-            <a:fillRect/>
-          </a:stretch>
-        </p:blipFill>
-        <p:spPr>
+        </p:nvSpPr>
+        <p:spPr bwMode="auto">
           <a:xfrm>
-            <a:off x="9780620" y="-125380"/>
-            <a:ext cx="1875258" cy="1875258"/>
+            <a:off x="0" y="0"/>
+            <a:ext cx="12192000" cy="0"/>
           </a:xfrm>
           <a:prstGeom prst="rect">
             <a:avLst/>
           </a:prstGeom>
+          <a:noFill/>
+          <a:ln>
+            <a:noFill/>
+          </a:ln>
+          <a:effectLst/>
+          <a:extLst>
+            <a:ext uri="{909E8E84-426E-40DD-AFC4-6F175D3DCCD1}">
+              <a14:hiddenFill xmlns:a14="http://schemas.microsoft.com/office/drawing/2010/main">
+                <a:solidFill>
+                  <a:schemeClr val="accent1"/>
+                </a:solidFill>
+              </a14:hiddenFill>
+            </a:ext>
+            <a:ext uri="{91240B29-F687-4F45-9708-019B960494DF}">
+              <a14:hiddenLine xmlns:a14="http://schemas.microsoft.com/office/drawing/2010/main" w="9525">
+                <a:solidFill>
+                  <a:schemeClr val="tx1"/>
+                </a:solidFill>
+                <a:miter lim="800000"/>
+                <a:headEnd/>
+                <a:tailEnd/>
+              </a14:hiddenLine>
+            </a:ext>
+            <a:ext uri="{AF507438-7753-43E0-B8FC-AC1667EBCBE1}">
+              <a14:hiddenEffects xmlns:a14="http://schemas.microsoft.com/office/drawing/2010/main">
+                <a:effectLst>
+                  <a:outerShdw dist="35921" dir="2700000" algn="ctr" rotWithShape="0">
+                    <a:schemeClr val="bg2"/>
+                  </a:outerShdw>
+                </a:effectLst>
+              </a14:hiddenEffects>
+            </a:ext>
+          </a:extLst>
         </p:spPr>
-      </p:pic>
+        <p:txBody>
+          <a:bodyPr vert="horz" wrap="none" lIns="91440" tIns="45720" rIns="91440" bIns="45720" numCol="1" anchor="ctr" anchorCtr="0" compatLnSpc="1">
+            <a:prstTxWarp prst="textNoShape">
+              <a:avLst/>
+            </a:prstTxWarp>
+            <a:spAutoFit/>
+          </a:bodyPr>
+          <a:lstStyle/>
+          <a:p>
+            <a:endParaRPr lang="he-IL"/>
+          </a:p>
+        </p:txBody>
+      </p:sp>
     </p:spTree>
     <p:extLst>
       <p:ext uri="{BB962C8B-B14F-4D97-AF65-F5344CB8AC3E}">
@@ -4267,20 +4335,6 @@
 <file path=ppt/slides/slide2.xml><?xml version="1.0" encoding="utf-8"?>
 <p:sld xmlns:a="http://schemas.openxmlformats.org/drawingml/2006/main" xmlns:r="http://schemas.openxmlformats.org/officeDocument/2006/relationships" xmlns:p="http://schemas.openxmlformats.org/presentationml/2006/main">
   <p:cSld>
-    <p:bg>
-      <p:bgPr>
-        <a:blipFill dpi="0" rotWithShape="1">
-          <a:blip r:embed="rId2">
-            <a:lum/>
-          </a:blip>
-          <a:srcRect/>
-          <a:stretch>
-            <a:fillRect t="-39000" b="-39000"/>
-          </a:stretch>
-        </a:blipFill>
-        <a:effectLst/>
-      </p:bgPr>
-    </p:bg>
     <p:spTree>
       <p:nvGrpSpPr>
         <p:cNvPr id="1" name=""/>
@@ -4295,6 +4349,147 @@
           <a:chExt cx="0" cy="0"/>
         </a:xfrm>
       </p:grpSpPr>
+      <p:sp useBgFill="1">
+        <p:nvSpPr>
+          <p:cNvPr id="36" name="Rectangle 29">
+            <a:extLst>
+              <a:ext uri="{FF2B5EF4-FFF2-40B4-BE49-F238E27FC236}">
+                <a16:creationId xmlns:a16="http://schemas.microsoft.com/office/drawing/2014/main" id="{23E547B5-89CF-4EC0-96DE-25771AED0799}"/>
+              </a:ext>
+              <a:ext uri="{C183D7F6-B498-43B3-948B-1728B52AA6E4}">
+                <adec:decorative xmlns:adec="http://schemas.microsoft.com/office/drawing/2017/decorative" val="1"/>
+              </a:ext>
+            </a:extLst>
+          </p:cNvPr>
+          <p:cNvSpPr>
+            <a:spLocks noGrp="1" noRot="1" noChangeAspect="1" noMove="1" noResize="1" noEditPoints="1" noAdjustHandles="1" noChangeArrowheads="1" noChangeShapeType="1" noTextEdit="1"/>
+          </p:cNvSpPr>
+          <p:nvPr>
+            <p:extLst>
+              <p:ext uri="{386F3935-93C4-4BCD-93E2-E3B085C9AB24}">
+                <p16:designElem xmlns:p16="http://schemas.microsoft.com/office/powerpoint/2015/main" val="1"/>
+              </p:ext>
+            </p:extLst>
+          </p:nvPr>
+        </p:nvSpPr>
+        <p:spPr>
+          <a:xfrm>
+            <a:off x="0" y="0"/>
+            <a:ext cx="12192000" cy="6858000"/>
+          </a:xfrm>
+          <a:prstGeom prst="rect">
+            <a:avLst/>
+          </a:prstGeom>
+          <a:ln w="12700" cap="flat" cmpd="sng" algn="ctr">
+            <a:noFill/>
+            <a:prstDash val="solid"/>
+            <a:miter lim="800000"/>
+          </a:ln>
+          <a:effectLst/>
+          <a:extLst>
+            <a:ext uri="{91240B29-F687-4F45-9708-019B960494DF}">
+              <a14:hiddenLine xmlns:a14="http://schemas.microsoft.com/office/drawing/2010/main" w="12700" cap="flat" cmpd="sng" algn="ctr">
+                <a:solidFill>
+                  <a:schemeClr val="accent1">
+                    <a:shade val="50000"/>
+                  </a:schemeClr>
+                </a:solidFill>
+                <a:prstDash val="solid"/>
+                <a:miter lim="800000"/>
+              </a14:hiddenLine>
+            </a:ext>
+          </a:extLst>
+        </p:spPr>
+        <p:style>
+          <a:lnRef idx="2">
+            <a:schemeClr val="accent1">
+              <a:shade val="50000"/>
+            </a:schemeClr>
+          </a:lnRef>
+          <a:fillRef idx="1">
+            <a:schemeClr val="accent1"/>
+          </a:fillRef>
+          <a:effectRef idx="0">
+            <a:schemeClr val="accent1"/>
+          </a:effectRef>
+          <a:fontRef idx="minor">
+            <a:schemeClr val="lt1"/>
+          </a:fontRef>
+        </p:style>
+        <p:txBody>
+          <a:bodyPr rtlCol="0" anchor="ctr"/>
+          <a:lstStyle/>
+          <a:p>
+            <a:pPr algn="ctr"/>
+            <a:endParaRPr lang="en-US"/>
+          </a:p>
+        </p:txBody>
+      </p:sp>
+      <p:sp>
+        <p:nvSpPr>
+          <p:cNvPr id="37" name="Rectangle 31">
+            <a:extLst>
+              <a:ext uri="{FF2B5EF4-FFF2-40B4-BE49-F238E27FC236}">
+                <a16:creationId xmlns:a16="http://schemas.microsoft.com/office/drawing/2014/main" id="{3F0B8CEB-8279-4E5E-A0CE-1FC9F71736F2}"/>
+              </a:ext>
+              <a:ext uri="{C183D7F6-B498-43B3-948B-1728B52AA6E4}">
+                <adec:decorative xmlns:adec="http://schemas.microsoft.com/office/drawing/2017/decorative" val="1"/>
+              </a:ext>
+            </a:extLst>
+          </p:cNvPr>
+          <p:cNvSpPr>
+            <a:spLocks noGrp="1" noRot="1" noChangeAspect="1" noMove="1" noResize="1" noEditPoints="1" noAdjustHandles="1" noChangeArrowheads="1" noChangeShapeType="1" noTextEdit="1"/>
+          </p:cNvSpPr>
+          <p:nvPr>
+            <p:extLst>
+              <p:ext uri="{386F3935-93C4-4BCD-93E2-E3B085C9AB24}">
+                <p16:designElem xmlns:p16="http://schemas.microsoft.com/office/powerpoint/2015/main" val="1"/>
+              </p:ext>
+            </p:extLst>
+          </p:nvPr>
+        </p:nvSpPr>
+        <p:spPr>
+          <a:xfrm>
+            <a:off x="4770782" y="0"/>
+            <a:ext cx="7421217" cy="6857999"/>
+          </a:xfrm>
+          <a:prstGeom prst="rect">
+            <a:avLst/>
+          </a:prstGeom>
+          <a:solidFill>
+            <a:srgbClr val="82766A">
+              <a:alpha val="15000"/>
+            </a:srgbClr>
+          </a:solidFill>
+          <a:ln>
+            <a:noFill/>
+          </a:ln>
+        </p:spPr>
+        <p:style>
+          <a:lnRef idx="2">
+            <a:schemeClr val="accent1">
+              <a:shade val="50000"/>
+            </a:schemeClr>
+          </a:lnRef>
+          <a:fillRef idx="1">
+            <a:schemeClr val="accent1"/>
+          </a:fillRef>
+          <a:effectRef idx="0">
+            <a:schemeClr val="accent1"/>
+          </a:effectRef>
+          <a:fontRef idx="minor">
+            <a:schemeClr val="lt1"/>
+          </a:fontRef>
+        </p:style>
+        <p:txBody>
+          <a:bodyPr rtlCol="0" anchor="ctr"/>
+          <a:lstStyle/>
+          <a:p>
+            <a:pPr algn="ctr"/>
+            <a:endParaRPr lang="en-US"/>
+          </a:p>
+        </p:txBody>
+      </p:sp>
       <p:pic>
         <p:nvPicPr>
           <p:cNvPr id="5" name="תמונה 4" descr="תמונה שמכילה ציור, איור, שרטוט, עיצוב גרפי&#10;&#10;תוכן שנוצר על-ידי בינה מלאכותית עשוי להיות שגוי.">
@@ -4310,27 +4505,493 @@
           <p:nvPr/>
         </p:nvPicPr>
         <p:blipFill>
-          <a:blip r:embed="rId3"/>
-          <a:stretch>
-            <a:fillRect/>
-          </a:stretch>
+          <a:blip r:embed="rId2"/>
+          <a:srcRect r="-2" b="632"/>
+          <a:stretch/>
         </p:blipFill>
         <p:spPr>
           <a:xfrm>
-            <a:off x="2667000" y="0"/>
-            <a:ext cx="6858000" cy="6858000"/>
+            <a:off x="20" y="10"/>
+            <a:ext cx="6901711" cy="6857990"/>
+          </a:xfrm>
+          <a:custGeom>
+            <a:avLst/>
+            <a:gdLst/>
+            <a:ahLst/>
+            <a:cxnLst/>
+            <a:rect l="l" t="t" r="r" b="b"/>
+            <a:pathLst>
+              <a:path w="6901731" h="6858000">
+                <a:moveTo>
+                  <a:pt x="0" y="0"/>
+                </a:moveTo>
+                <a:lnTo>
+                  <a:pt x="6897896" y="5958"/>
+                </a:lnTo>
+                <a:lnTo>
+                  <a:pt x="6866823" y="62592"/>
+                </a:lnTo>
+                <a:lnTo>
+                  <a:pt x="6901731" y="89476"/>
+                </a:lnTo>
+                <a:lnTo>
+                  <a:pt x="6901731" y="103833"/>
+                </a:lnTo>
+                <a:lnTo>
+                  <a:pt x="6900034" y="110092"/>
+                </a:lnTo>
+                <a:lnTo>
+                  <a:pt x="6901731" y="113679"/>
+                </a:lnTo>
+                <a:lnTo>
+                  <a:pt x="6901731" y="405560"/>
+                </a:lnTo>
+                <a:lnTo>
+                  <a:pt x="6900456" y="429509"/>
+                </a:lnTo>
+                <a:cubicBezTo>
+                  <a:pt x="6892773" y="535647"/>
+                  <a:pt x="6878314" y="537918"/>
+                  <a:pt x="6886342" y="636808"/>
+                </a:cubicBezTo>
+                <a:cubicBezTo>
+                  <a:pt x="6892506" y="756883"/>
+                  <a:pt x="6864504" y="771443"/>
+                  <a:pt x="6851784" y="839073"/>
+                </a:cubicBezTo>
+                <a:cubicBezTo>
+                  <a:pt x="6838675" y="892655"/>
+                  <a:pt x="6864124" y="961738"/>
+                  <a:pt x="6845760" y="994930"/>
+                </a:cubicBezTo>
+                <a:cubicBezTo>
+                  <a:pt x="6833572" y="1024166"/>
+                  <a:pt x="6859282" y="1058905"/>
+                  <a:pt x="6845601" y="1112932"/>
+                </a:cubicBezTo>
+                <a:cubicBezTo>
+                  <a:pt x="6838700" y="1149910"/>
+                  <a:pt x="6829138" y="1151035"/>
+                  <a:pt x="6820235" y="1187433"/>
+                </a:cubicBezTo>
+                <a:cubicBezTo>
+                  <a:pt x="6815504" y="1196464"/>
+                  <a:pt x="6777707" y="1338549"/>
+                  <a:pt x="6759643" y="1337010"/>
+                </a:cubicBezTo>
+                <a:cubicBezTo>
+                  <a:pt x="6737660" y="1337296"/>
+                  <a:pt x="6760650" y="1396341"/>
+                  <a:pt x="6736375" y="1382272"/>
+                </a:cubicBezTo>
+                <a:cubicBezTo>
+                  <a:pt x="6755741" y="1415836"/>
+                  <a:pt x="6714675" y="1414567"/>
+                  <a:pt x="6701292" y="1432111"/>
+                </a:cubicBezTo>
+                <a:cubicBezTo>
+                  <a:pt x="6721110" y="1460185"/>
+                  <a:pt x="6692106" y="1490815"/>
+                  <a:pt x="6686578" y="1518624"/>
+                </a:cubicBezTo>
+                <a:cubicBezTo>
+                  <a:pt x="6682512" y="1567002"/>
+                  <a:pt x="6679579" y="1571443"/>
+                  <a:pt x="6670824" y="1607743"/>
+                </a:cubicBezTo>
+                <a:cubicBezTo>
+                  <a:pt x="6671133" y="1629590"/>
+                  <a:pt x="6663161" y="1656870"/>
+                  <a:pt x="6664392" y="1696405"/>
+                </a:cubicBezTo>
+                <a:cubicBezTo>
+                  <a:pt x="6655686" y="1770486"/>
+                  <a:pt x="6641938" y="1757082"/>
+                  <a:pt x="6642880" y="1812372"/>
+                </a:cubicBezTo>
+                <a:cubicBezTo>
+                  <a:pt x="6638579" y="1872475"/>
+                  <a:pt x="6619231" y="1825476"/>
+                  <a:pt x="6612547" y="1876437"/>
+                </a:cubicBezTo>
+                <a:cubicBezTo>
+                  <a:pt x="6600695" y="1913834"/>
+                  <a:pt x="6591061" y="1923231"/>
+                  <a:pt x="6571760" y="1953331"/>
+                </a:cubicBezTo>
+                <a:cubicBezTo>
+                  <a:pt x="6561039" y="1989021"/>
+                  <a:pt x="6544090" y="2087896"/>
+                  <a:pt x="6520213" y="2096455"/>
+                </a:cubicBezTo>
+                <a:lnTo>
+                  <a:pt x="6492461" y="2188148"/>
+                </a:lnTo>
+                <a:cubicBezTo>
+                  <a:pt x="6504372" y="2211333"/>
+                  <a:pt x="6489131" y="2253220"/>
+                  <a:pt x="6471854" y="2259117"/>
+                </a:cubicBezTo>
+                <a:cubicBezTo>
+                  <a:pt x="6466151" y="2287829"/>
+                  <a:pt x="6440452" y="2301346"/>
+                  <a:pt x="6439832" y="2328334"/>
+                </a:cubicBezTo>
+                <a:cubicBezTo>
+                  <a:pt x="6431013" y="2351201"/>
+                  <a:pt x="6444250" y="2396409"/>
+                  <a:pt x="6425162" y="2408211"/>
+                </a:cubicBezTo>
+                <a:lnTo>
+                  <a:pt x="6417221" y="2427382"/>
+                </a:lnTo>
+                <a:lnTo>
+                  <a:pt x="6425030" y="2464387"/>
+                </a:lnTo>
+                <a:lnTo>
+                  <a:pt x="6406293" y="2472223"/>
+                </a:lnTo>
+                <a:cubicBezTo>
+                  <a:pt x="6406862" y="2477277"/>
+                  <a:pt x="6406486" y="2491723"/>
+                  <a:pt x="6405400" y="2493547"/>
+                </a:cubicBezTo>
+                <a:lnTo>
+                  <a:pt x="6374829" y="2532070"/>
+                </a:lnTo>
+                <a:cubicBezTo>
+                  <a:pt x="6374597" y="2545374"/>
+                  <a:pt x="6360976" y="2563797"/>
+                  <a:pt x="6350864" y="2577422"/>
+                </a:cubicBezTo>
+                <a:cubicBezTo>
+                  <a:pt x="6327056" y="2632768"/>
+                  <a:pt x="6341262" y="2616275"/>
+                  <a:pt x="6329174" y="2663854"/>
+                </a:cubicBezTo>
+                <a:cubicBezTo>
+                  <a:pt x="6326303" y="2703642"/>
+                  <a:pt x="6332854" y="2709643"/>
+                  <a:pt x="6315095" y="2741507"/>
+                </a:cubicBezTo>
+                <a:cubicBezTo>
+                  <a:pt x="6319921" y="2740191"/>
+                  <a:pt x="6321925" y="2742004"/>
+                  <a:pt x="6322463" y="2745641"/>
+                </a:cubicBezTo>
+                <a:cubicBezTo>
+                  <a:pt x="6322245" y="2747982"/>
+                  <a:pt x="6322027" y="2750323"/>
+                  <a:pt x="6321808" y="2752663"/>
+                </a:cubicBezTo>
+                <a:lnTo>
+                  <a:pt x="6314569" y="2756718"/>
+                </a:lnTo>
+                <a:cubicBezTo>
+                  <a:pt x="6289324" y="2773686"/>
+                  <a:pt x="6317551" y="2780051"/>
+                  <a:pt x="6315211" y="2811618"/>
+                </a:cubicBezTo>
+                <a:cubicBezTo>
+                  <a:pt x="6315620" y="2826627"/>
+                  <a:pt x="6296047" y="2885298"/>
+                  <a:pt x="6302211" y="2882314"/>
+                </a:cubicBezTo>
+                <a:lnTo>
+                  <a:pt x="6286167" y="2949597"/>
+                </a:lnTo>
+                <a:cubicBezTo>
+                  <a:pt x="6286401" y="2994618"/>
+                  <a:pt x="6286615" y="2971464"/>
+                  <a:pt x="6287037" y="3008578"/>
+                </a:cubicBezTo>
+                <a:cubicBezTo>
+                  <a:pt x="6293795" y="3029535"/>
+                  <a:pt x="6274405" y="3114154"/>
+                  <a:pt x="6259150" y="3123139"/>
+                </a:cubicBezTo>
+                <a:cubicBezTo>
+                  <a:pt x="6250085" y="3189063"/>
+                  <a:pt x="6269067" y="3151280"/>
+                  <a:pt x="6272249" y="3227854"/>
+                </a:cubicBezTo>
+                <a:cubicBezTo>
+                  <a:pt x="6278775" y="3295842"/>
+                  <a:pt x="6289216" y="3303765"/>
+                  <a:pt x="6292288" y="3378383"/>
+                </a:cubicBezTo>
+                <a:cubicBezTo>
+                  <a:pt x="6303894" y="3395995"/>
+                  <a:pt x="6287498" y="3432581"/>
+                  <a:pt x="6288328" y="3459618"/>
+                </a:cubicBezTo>
+                <a:cubicBezTo>
+                  <a:pt x="6289158" y="3486653"/>
+                  <a:pt x="6299937" y="3538735"/>
+                  <a:pt x="6297272" y="3540603"/>
+                </a:cubicBezTo>
+                <a:cubicBezTo>
+                  <a:pt x="6296849" y="3577379"/>
+                  <a:pt x="6294184" y="3587943"/>
+                  <a:pt x="6291001" y="3638374"/>
+                </a:cubicBezTo>
+                <a:cubicBezTo>
+                  <a:pt x="6283026" y="3666794"/>
+                  <a:pt x="6265833" y="3731744"/>
+                  <a:pt x="6283592" y="3763609"/>
+                </a:cubicBezTo>
+                <a:cubicBezTo>
+                  <a:pt x="6264286" y="3758340"/>
+                  <a:pt x="6290177" y="3803150"/>
+                  <a:pt x="6274068" y="3814506"/>
+                </a:cubicBezTo>
+                <a:cubicBezTo>
+                  <a:pt x="6260645" y="3821643"/>
+                  <a:pt x="6265372" y="3836902"/>
+                  <a:pt x="6262850" y="3850454"/>
+                </a:cubicBezTo>
+                <a:cubicBezTo>
+                  <a:pt x="6250418" y="3863479"/>
+                  <a:pt x="6250660" y="3955243"/>
+                  <a:pt x="6257357" y="3975474"/>
+                </a:cubicBezTo>
+                <a:cubicBezTo>
+                  <a:pt x="6245091" y="4036737"/>
+                  <a:pt x="6237535" y="4029237"/>
+                  <a:pt x="6257889" y="4073155"/>
+                </a:cubicBezTo>
+                <a:cubicBezTo>
+                  <a:pt x="6259272" y="4085906"/>
+                  <a:pt x="6239882" y="4116397"/>
+                  <a:pt x="6237441" y="4126638"/>
+                </a:cubicBezTo>
+                <a:lnTo>
+                  <a:pt x="6245587" y="4172738"/>
+                </a:lnTo>
+                <a:lnTo>
+                  <a:pt x="6235772" y="4176721"/>
+                </a:lnTo>
+                <a:lnTo>
+                  <a:pt x="6233287" y="4195136"/>
+                </a:lnTo>
+                <a:lnTo>
+                  <a:pt x="6234619" y="4280850"/>
+                </a:lnTo>
+                <a:cubicBezTo>
+                  <a:pt x="6239453" y="4320763"/>
+                  <a:pt x="6223309" y="4337596"/>
+                  <a:pt x="6219318" y="4402526"/>
+                </a:cubicBezTo>
+                <a:cubicBezTo>
+                  <a:pt x="6205466" y="4516209"/>
+                  <a:pt x="6216183" y="4588729"/>
+                  <a:pt x="6216810" y="4651172"/>
+                </a:cubicBezTo>
+                <a:cubicBezTo>
+                  <a:pt x="6217673" y="4756959"/>
+                  <a:pt x="6228654" y="4824005"/>
+                  <a:pt x="6225945" y="4916779"/>
+                </a:cubicBezTo>
+                <a:cubicBezTo>
+                  <a:pt x="6217032" y="4993010"/>
+                  <a:pt x="6264271" y="4984591"/>
+                  <a:pt x="6230174" y="5051379"/>
+                </a:cubicBezTo>
+                <a:cubicBezTo>
+                  <a:pt x="6235713" y="5056951"/>
+                  <a:pt x="6239420" y="5163714"/>
+                  <a:pt x="6242600" y="5170879"/>
+                </a:cubicBezTo>
+                <a:lnTo>
+                  <a:pt x="6235996" y="5216428"/>
+                </a:lnTo>
+                <a:lnTo>
+                  <a:pt x="6214638" y="5285298"/>
+                </a:lnTo>
+                <a:cubicBezTo>
+                  <a:pt x="6211392" y="5297492"/>
+                  <a:pt x="6225576" y="5312063"/>
+                  <a:pt x="6228432" y="5317696"/>
+                </a:cubicBezTo>
+                <a:lnTo>
+                  <a:pt x="6246496" y="5398787"/>
+                </a:lnTo>
+                <a:lnTo>
+                  <a:pt x="6244793" y="5399530"/>
+                </a:lnTo>
+                <a:lnTo>
+                  <a:pt x="6241695" y="5406948"/>
+                </a:lnTo>
+                <a:lnTo>
+                  <a:pt x="6267461" y="5499413"/>
+                </a:lnTo>
+                <a:cubicBezTo>
+                  <a:pt x="6285387" y="5533848"/>
+                  <a:pt x="6284888" y="5550029"/>
+                  <a:pt x="6295987" y="5582659"/>
+                </a:cubicBezTo>
+                <a:cubicBezTo>
+                  <a:pt x="6311253" y="5681724"/>
+                  <a:pt x="6295439" y="5695558"/>
+                  <a:pt x="6364803" y="5784263"/>
+                </a:cubicBezTo>
+                <a:cubicBezTo>
+                  <a:pt x="6379348" y="5818651"/>
+                  <a:pt x="6412475" y="5906802"/>
+                  <a:pt x="6423050" y="5922637"/>
+                </a:cubicBezTo>
+                <a:cubicBezTo>
+                  <a:pt x="6445210" y="5973612"/>
+                  <a:pt x="6468179" y="6023873"/>
+                  <a:pt x="6497767" y="6090108"/>
+                </a:cubicBezTo>
+                <a:cubicBezTo>
+                  <a:pt x="6571895" y="6150548"/>
+                  <a:pt x="6572491" y="6236583"/>
+                  <a:pt x="6606710" y="6281543"/>
+                </a:cubicBezTo>
+                <a:cubicBezTo>
+                  <a:pt x="6633675" y="6335892"/>
+                  <a:pt x="6654357" y="6388782"/>
+                  <a:pt x="6667540" y="6443715"/>
+                </a:cubicBezTo>
+                <a:cubicBezTo>
+                  <a:pt x="6685192" y="6466826"/>
+                  <a:pt x="6650500" y="6508701"/>
+                  <a:pt x="6659722" y="6550105"/>
+                </a:cubicBezTo>
+                <a:cubicBezTo>
+                  <a:pt x="6665926" y="6645044"/>
+                  <a:pt x="6669126" y="6627536"/>
+                  <a:pt x="6671805" y="6687397"/>
+                </a:cubicBezTo>
+                <a:cubicBezTo>
+                  <a:pt x="6682671" y="6733683"/>
+                  <a:pt x="6665210" y="6772117"/>
+                  <a:pt x="6669658" y="6806602"/>
+                </a:cubicBezTo>
+                <a:cubicBezTo>
+                  <a:pt x="6661174" y="6812658"/>
+                  <a:pt x="6667097" y="6831470"/>
+                  <a:pt x="6675783" y="6850325"/>
+                </a:cubicBezTo>
+                <a:lnTo>
+                  <a:pt x="6679704" y="6858000"/>
+                </a:lnTo>
+                <a:lnTo>
+                  <a:pt x="4532241" y="6858000"/>
+                </a:lnTo>
+                <a:lnTo>
+                  <a:pt x="1208596" y="6858000"/>
+                </a:lnTo>
+                <a:lnTo>
+                  <a:pt x="0" y="6858000"/>
+                </a:lnTo>
+                <a:close/>
+              </a:path>
+            </a:pathLst>
+          </a:custGeom>
+        </p:spPr>
+      </p:pic>
+      <p:sp>
+        <p:nvSpPr>
+          <p:cNvPr id="2" name="תיבת טקסט 1">
+            <a:extLst>
+              <a:ext uri="{FF2B5EF4-FFF2-40B4-BE49-F238E27FC236}">
+                <a16:creationId xmlns:a16="http://schemas.microsoft.com/office/drawing/2014/main" id="{CD322043-D9A4-A2BC-252D-7E123CDE583D}"/>
+              </a:ext>
+            </a:extLst>
+          </p:cNvPr>
+          <p:cNvSpPr txBox="1"/>
+          <p:nvPr/>
+        </p:nvSpPr>
+        <p:spPr>
+          <a:xfrm>
+            <a:off x="6901731" y="1576306"/>
+            <a:ext cx="4869178" cy="3908586"/>
           </a:xfrm>
           <a:prstGeom prst="rect">
             <a:avLst/>
           </a:prstGeom>
         </p:spPr>
-      </p:pic>
+        <p:txBody>
+          <a:bodyPr rtlCol="1">
+            <a:normAutofit/>
+          </a:bodyPr>
+          <a:lstStyle/>
+          <a:p>
+            <a:pPr>
+              <a:spcAft>
+                <a:spcPts val="600"/>
+              </a:spcAft>
+            </a:pPr>
+            <a:r>
+              <a:rPr lang="he-IL" sz="3600" dirty="0">
+                <a:solidFill>
+                  <a:schemeClr val="bg1"/>
+                </a:solidFill>
+                <a:latin typeface="Aharoni" panose="02010803020104030203" pitchFamily="2" charset="-79"/>
+                <a:cs typeface="Aharoni" panose="02010803020104030203" pitchFamily="2" charset="-79"/>
+              </a:rPr>
+              <a:t>כצרכני חדשות</a:t>
+            </a:r>
+          </a:p>
+          <a:p>
+            <a:pPr>
+              <a:spcAft>
+                <a:spcPts val="600"/>
+              </a:spcAft>
+            </a:pPr>
+            <a:r>
+              <a:rPr lang="he-IL" sz="3600" dirty="0">
+                <a:solidFill>
+                  <a:schemeClr val="bg1"/>
+                </a:solidFill>
+                <a:latin typeface="Aharoni" panose="02010803020104030203" pitchFamily="2" charset="-79"/>
+                <a:cs typeface="Aharoni" panose="02010803020104030203" pitchFamily="2" charset="-79"/>
+              </a:rPr>
+              <a:t>אנחנו מוגבלים לתוכן מקומי, מוצפים במידע לא רלוונטי,</a:t>
+            </a:r>
+          </a:p>
+          <a:p>
+            <a:pPr>
+              <a:spcAft>
+                <a:spcPts val="600"/>
+              </a:spcAft>
+            </a:pPr>
+            <a:r>
+              <a:rPr lang="he-IL" sz="3600" dirty="0">
+                <a:solidFill>
+                  <a:schemeClr val="bg1"/>
+                </a:solidFill>
+                <a:latin typeface="Aharoni" panose="02010803020104030203" pitchFamily="2" charset="-79"/>
+                <a:cs typeface="Aharoni" panose="02010803020104030203" pitchFamily="2" charset="-79"/>
+              </a:rPr>
+              <a:t>ומפספסים את ההזדמנות להיחשף לעולם ולהרחיב אופקים.</a:t>
+            </a:r>
+            <a:endParaRPr lang="he-IL" sz="3600" b="1" dirty="0">
+              <a:solidFill>
+                <a:schemeClr val="bg1"/>
+              </a:solidFill>
+              <a:effectLst>
+                <a:outerShdw blurRad="38100" dist="38100" dir="2700000" algn="tl">
+                  <a:srgbClr val="000000">
+                    <a:alpha val="43137"/>
+                  </a:srgbClr>
+                </a:outerShdw>
+              </a:effectLst>
+              <a:latin typeface="Aharoni" panose="02010803020104030203" pitchFamily="2" charset="-79"/>
+              <a:cs typeface="Aharoni" panose="02010803020104030203" pitchFamily="2" charset="-79"/>
+            </a:endParaRPr>
+          </a:p>
+        </p:txBody>
+      </p:sp>
       <p:pic>
         <p:nvPicPr>
-          <p:cNvPr id="6" name="תמונה 5" descr="תמונה שמכילה גרפיקה, לוגו, עיצוב גרפי, צילום מסך&#10;&#10;תוכן שנוצר על-ידי בינה מלאכותית עשוי להיות שגוי.">
-            <a:extLst>
-              <a:ext uri="{FF2B5EF4-FFF2-40B4-BE49-F238E27FC236}">
-                <a16:creationId xmlns:a16="http://schemas.microsoft.com/office/drawing/2014/main" id="{0857F7CD-5190-88E8-C047-7199D48BBED4}"/>
+          <p:cNvPr id="3" name="תמונה 2" descr="תמונה שמכילה גרפיקה, לוגו, עיצוב גרפי, צילום מסך&#10;&#10;תוכן שנוצר על-ידי בינה מלאכותית עשוי להיות שגוי.">
+            <a:extLst>
+              <a:ext uri="{FF2B5EF4-FFF2-40B4-BE49-F238E27FC236}">
+                <a16:creationId xmlns:a16="http://schemas.microsoft.com/office/drawing/2014/main" id="{D5693950-7AE6-9F9D-2EA9-E558B9482158}"/>
               </a:ext>
             </a:extLst>
           </p:cNvPr>
@@ -4340,7 +5001,7 @@
           <p:nvPr/>
         </p:nvPicPr>
         <p:blipFill>
-          <a:blip r:embed="rId4">
+          <a:blip r:embed="rId3">
             <a:extLst>
               <a:ext uri="{28A0092B-C50C-407E-A947-70E740481C1C}">
                 <a14:useLocalDpi xmlns:a14="http://schemas.microsoft.com/office/drawing/2010/main" val="0"/>
@@ -4353,7 +5014,7 @@
         </p:blipFill>
         <p:spPr>
           <a:xfrm>
-            <a:off x="9780620" y="-125380"/>
+            <a:off x="9895652" y="-200276"/>
             <a:ext cx="1875258" cy="1875258"/>
           </a:xfrm>
           <a:prstGeom prst="rect">
@@ -4377,23 +5038,9 @@
 <file path=ppt/slides/slide3.xml><?xml version="1.0" encoding="utf-8"?>
 <p:sld xmlns:a="http://schemas.openxmlformats.org/drawingml/2006/main" xmlns:r="http://schemas.openxmlformats.org/officeDocument/2006/relationships" xmlns:p="http://schemas.openxmlformats.org/presentationml/2006/main">
   <p:cSld>
-    <p:bg>
-      <p:bgPr>
-        <a:solidFill>
-          <a:schemeClr val="bg1"/>
-        </a:solidFill>
-        <a:effectLst/>
-      </p:bgPr>
-    </p:bg>
     <p:spTree>
       <p:nvGrpSpPr>
-        <p:cNvPr id="1" name="">
-          <a:extLst>
-            <a:ext uri="{FF2B5EF4-FFF2-40B4-BE49-F238E27FC236}">
-              <a16:creationId xmlns:a16="http://schemas.microsoft.com/office/drawing/2014/main" id="{113A5FFE-3951-F0B5-18EF-DCA90E6105AB}"/>
-            </a:ext>
-          </a:extLst>
-        </p:cNvPr>
+        <p:cNvPr id="1" name=""/>
         <p:cNvGrpSpPr/>
         <p:nvPr/>
       </p:nvGrpSpPr>
@@ -4405,46 +5052,498 @@
           <a:chExt cx="0" cy="0"/>
         </a:xfrm>
       </p:grpSpPr>
+      <p:pic>
+        <p:nvPicPr>
+          <p:cNvPr id="4" name="תמונה 3" descr="תמונה שמכילה פני אדם, אדם, איש, ספר&#10;&#10;תוכן שנוצר על-ידי בינה מלאכותית עשוי להיות שגוי.">
+            <a:extLst>
+              <a:ext uri="{FF2B5EF4-FFF2-40B4-BE49-F238E27FC236}">
+                <a16:creationId xmlns:a16="http://schemas.microsoft.com/office/drawing/2014/main" id="{73548979-2B7A-4EB2-5294-DF015E4DFFF4}"/>
+              </a:ext>
+            </a:extLst>
+          </p:cNvPr>
+          <p:cNvPicPr>
+            <a:picLocks noChangeAspect="1"/>
+          </p:cNvPicPr>
+          <p:nvPr/>
+        </p:nvPicPr>
+        <p:blipFill>
+          <a:blip r:embed="rId2"/>
+          <a:srcRect r="-2" b="632"/>
+          <a:stretch/>
+        </p:blipFill>
+        <p:spPr>
+          <a:xfrm flipH="1">
+            <a:off x="5290278" y="0"/>
+            <a:ext cx="6901721" cy="6858000"/>
+          </a:xfrm>
+          <a:custGeom>
+            <a:avLst/>
+            <a:gdLst/>
+            <a:ahLst/>
+            <a:cxnLst/>
+            <a:rect l="l" t="t" r="r" b="b"/>
+            <a:pathLst>
+              <a:path w="6901731" h="6858000">
+                <a:moveTo>
+                  <a:pt x="0" y="0"/>
+                </a:moveTo>
+                <a:lnTo>
+                  <a:pt x="6897896" y="5958"/>
+                </a:lnTo>
+                <a:lnTo>
+                  <a:pt x="6866823" y="62592"/>
+                </a:lnTo>
+                <a:lnTo>
+                  <a:pt x="6901731" y="89476"/>
+                </a:lnTo>
+                <a:lnTo>
+                  <a:pt x="6901731" y="103833"/>
+                </a:lnTo>
+                <a:lnTo>
+                  <a:pt x="6900034" y="110092"/>
+                </a:lnTo>
+                <a:lnTo>
+                  <a:pt x="6901731" y="113679"/>
+                </a:lnTo>
+                <a:lnTo>
+                  <a:pt x="6901731" y="405560"/>
+                </a:lnTo>
+                <a:lnTo>
+                  <a:pt x="6900456" y="429509"/>
+                </a:lnTo>
+                <a:cubicBezTo>
+                  <a:pt x="6892773" y="535647"/>
+                  <a:pt x="6878314" y="537918"/>
+                  <a:pt x="6886342" y="636808"/>
+                </a:cubicBezTo>
+                <a:cubicBezTo>
+                  <a:pt x="6892506" y="756883"/>
+                  <a:pt x="6864504" y="771443"/>
+                  <a:pt x="6851784" y="839073"/>
+                </a:cubicBezTo>
+                <a:cubicBezTo>
+                  <a:pt x="6838675" y="892655"/>
+                  <a:pt x="6864124" y="961738"/>
+                  <a:pt x="6845760" y="994930"/>
+                </a:cubicBezTo>
+                <a:cubicBezTo>
+                  <a:pt x="6833572" y="1024166"/>
+                  <a:pt x="6859282" y="1058905"/>
+                  <a:pt x="6845601" y="1112932"/>
+                </a:cubicBezTo>
+                <a:cubicBezTo>
+                  <a:pt x="6838700" y="1149910"/>
+                  <a:pt x="6829138" y="1151035"/>
+                  <a:pt x="6820235" y="1187433"/>
+                </a:cubicBezTo>
+                <a:cubicBezTo>
+                  <a:pt x="6815504" y="1196464"/>
+                  <a:pt x="6777707" y="1338549"/>
+                  <a:pt x="6759643" y="1337010"/>
+                </a:cubicBezTo>
+                <a:cubicBezTo>
+                  <a:pt x="6737660" y="1337296"/>
+                  <a:pt x="6760650" y="1396341"/>
+                  <a:pt x="6736375" y="1382272"/>
+                </a:cubicBezTo>
+                <a:cubicBezTo>
+                  <a:pt x="6755741" y="1415836"/>
+                  <a:pt x="6714675" y="1414567"/>
+                  <a:pt x="6701292" y="1432111"/>
+                </a:cubicBezTo>
+                <a:cubicBezTo>
+                  <a:pt x="6721110" y="1460185"/>
+                  <a:pt x="6692106" y="1490815"/>
+                  <a:pt x="6686578" y="1518624"/>
+                </a:cubicBezTo>
+                <a:cubicBezTo>
+                  <a:pt x="6682512" y="1567002"/>
+                  <a:pt x="6679579" y="1571443"/>
+                  <a:pt x="6670824" y="1607743"/>
+                </a:cubicBezTo>
+                <a:cubicBezTo>
+                  <a:pt x="6671133" y="1629590"/>
+                  <a:pt x="6663161" y="1656870"/>
+                  <a:pt x="6664392" y="1696405"/>
+                </a:cubicBezTo>
+                <a:cubicBezTo>
+                  <a:pt x="6655686" y="1770486"/>
+                  <a:pt x="6641938" y="1757082"/>
+                  <a:pt x="6642880" y="1812372"/>
+                </a:cubicBezTo>
+                <a:cubicBezTo>
+                  <a:pt x="6638579" y="1872475"/>
+                  <a:pt x="6619231" y="1825476"/>
+                  <a:pt x="6612547" y="1876437"/>
+                </a:cubicBezTo>
+                <a:cubicBezTo>
+                  <a:pt x="6600695" y="1913834"/>
+                  <a:pt x="6591061" y="1923231"/>
+                  <a:pt x="6571760" y="1953331"/>
+                </a:cubicBezTo>
+                <a:cubicBezTo>
+                  <a:pt x="6561039" y="1989021"/>
+                  <a:pt x="6544090" y="2087896"/>
+                  <a:pt x="6520213" y="2096455"/>
+                </a:cubicBezTo>
+                <a:lnTo>
+                  <a:pt x="6492461" y="2188148"/>
+                </a:lnTo>
+                <a:cubicBezTo>
+                  <a:pt x="6504372" y="2211333"/>
+                  <a:pt x="6489131" y="2253220"/>
+                  <a:pt x="6471854" y="2259117"/>
+                </a:cubicBezTo>
+                <a:cubicBezTo>
+                  <a:pt x="6466151" y="2287829"/>
+                  <a:pt x="6440452" y="2301346"/>
+                  <a:pt x="6439832" y="2328334"/>
+                </a:cubicBezTo>
+                <a:cubicBezTo>
+                  <a:pt x="6431013" y="2351201"/>
+                  <a:pt x="6444250" y="2396409"/>
+                  <a:pt x="6425162" y="2408211"/>
+                </a:cubicBezTo>
+                <a:lnTo>
+                  <a:pt x="6417221" y="2427382"/>
+                </a:lnTo>
+                <a:lnTo>
+                  <a:pt x="6425030" y="2464387"/>
+                </a:lnTo>
+                <a:lnTo>
+                  <a:pt x="6406293" y="2472223"/>
+                </a:lnTo>
+                <a:cubicBezTo>
+                  <a:pt x="6406862" y="2477277"/>
+                  <a:pt x="6406486" y="2491723"/>
+                  <a:pt x="6405400" y="2493547"/>
+                </a:cubicBezTo>
+                <a:lnTo>
+                  <a:pt x="6374829" y="2532070"/>
+                </a:lnTo>
+                <a:cubicBezTo>
+                  <a:pt x="6374597" y="2545374"/>
+                  <a:pt x="6360976" y="2563797"/>
+                  <a:pt x="6350864" y="2577422"/>
+                </a:cubicBezTo>
+                <a:cubicBezTo>
+                  <a:pt x="6327056" y="2632768"/>
+                  <a:pt x="6341262" y="2616275"/>
+                  <a:pt x="6329174" y="2663854"/>
+                </a:cubicBezTo>
+                <a:cubicBezTo>
+                  <a:pt x="6326303" y="2703642"/>
+                  <a:pt x="6332854" y="2709643"/>
+                  <a:pt x="6315095" y="2741507"/>
+                </a:cubicBezTo>
+                <a:cubicBezTo>
+                  <a:pt x="6319921" y="2740191"/>
+                  <a:pt x="6321925" y="2742004"/>
+                  <a:pt x="6322463" y="2745641"/>
+                </a:cubicBezTo>
+                <a:cubicBezTo>
+                  <a:pt x="6322245" y="2747982"/>
+                  <a:pt x="6322027" y="2750323"/>
+                  <a:pt x="6321808" y="2752663"/>
+                </a:cubicBezTo>
+                <a:lnTo>
+                  <a:pt x="6314569" y="2756718"/>
+                </a:lnTo>
+                <a:cubicBezTo>
+                  <a:pt x="6289324" y="2773686"/>
+                  <a:pt x="6317551" y="2780051"/>
+                  <a:pt x="6315211" y="2811618"/>
+                </a:cubicBezTo>
+                <a:cubicBezTo>
+                  <a:pt x="6315620" y="2826627"/>
+                  <a:pt x="6296047" y="2885298"/>
+                  <a:pt x="6302211" y="2882314"/>
+                </a:cubicBezTo>
+                <a:lnTo>
+                  <a:pt x="6286167" y="2949597"/>
+                </a:lnTo>
+                <a:cubicBezTo>
+                  <a:pt x="6286401" y="2994618"/>
+                  <a:pt x="6286615" y="2971464"/>
+                  <a:pt x="6287037" y="3008578"/>
+                </a:cubicBezTo>
+                <a:cubicBezTo>
+                  <a:pt x="6293795" y="3029535"/>
+                  <a:pt x="6274405" y="3114154"/>
+                  <a:pt x="6259150" y="3123139"/>
+                </a:cubicBezTo>
+                <a:cubicBezTo>
+                  <a:pt x="6250085" y="3189063"/>
+                  <a:pt x="6269067" y="3151280"/>
+                  <a:pt x="6272249" y="3227854"/>
+                </a:cubicBezTo>
+                <a:cubicBezTo>
+                  <a:pt x="6278775" y="3295842"/>
+                  <a:pt x="6289216" y="3303765"/>
+                  <a:pt x="6292288" y="3378383"/>
+                </a:cubicBezTo>
+                <a:cubicBezTo>
+                  <a:pt x="6303894" y="3395995"/>
+                  <a:pt x="6287498" y="3432581"/>
+                  <a:pt x="6288328" y="3459618"/>
+                </a:cubicBezTo>
+                <a:cubicBezTo>
+                  <a:pt x="6289158" y="3486653"/>
+                  <a:pt x="6299937" y="3538735"/>
+                  <a:pt x="6297272" y="3540603"/>
+                </a:cubicBezTo>
+                <a:cubicBezTo>
+                  <a:pt x="6296849" y="3577379"/>
+                  <a:pt x="6294184" y="3587943"/>
+                  <a:pt x="6291001" y="3638374"/>
+                </a:cubicBezTo>
+                <a:cubicBezTo>
+                  <a:pt x="6283026" y="3666794"/>
+                  <a:pt x="6265833" y="3731744"/>
+                  <a:pt x="6283592" y="3763609"/>
+                </a:cubicBezTo>
+                <a:cubicBezTo>
+                  <a:pt x="6264286" y="3758340"/>
+                  <a:pt x="6290177" y="3803150"/>
+                  <a:pt x="6274068" y="3814506"/>
+                </a:cubicBezTo>
+                <a:cubicBezTo>
+                  <a:pt x="6260645" y="3821643"/>
+                  <a:pt x="6265372" y="3836902"/>
+                  <a:pt x="6262850" y="3850454"/>
+                </a:cubicBezTo>
+                <a:cubicBezTo>
+                  <a:pt x="6250418" y="3863479"/>
+                  <a:pt x="6250660" y="3955243"/>
+                  <a:pt x="6257357" y="3975474"/>
+                </a:cubicBezTo>
+                <a:cubicBezTo>
+                  <a:pt x="6245091" y="4036737"/>
+                  <a:pt x="6237535" y="4029237"/>
+                  <a:pt x="6257889" y="4073155"/>
+                </a:cubicBezTo>
+                <a:cubicBezTo>
+                  <a:pt x="6259272" y="4085906"/>
+                  <a:pt x="6239882" y="4116397"/>
+                  <a:pt x="6237441" y="4126638"/>
+                </a:cubicBezTo>
+                <a:lnTo>
+                  <a:pt x="6245587" y="4172738"/>
+                </a:lnTo>
+                <a:lnTo>
+                  <a:pt x="6235772" y="4176721"/>
+                </a:lnTo>
+                <a:lnTo>
+                  <a:pt x="6233287" y="4195136"/>
+                </a:lnTo>
+                <a:lnTo>
+                  <a:pt x="6234619" y="4280850"/>
+                </a:lnTo>
+                <a:cubicBezTo>
+                  <a:pt x="6239453" y="4320763"/>
+                  <a:pt x="6223309" y="4337596"/>
+                  <a:pt x="6219318" y="4402526"/>
+                </a:cubicBezTo>
+                <a:cubicBezTo>
+                  <a:pt x="6205466" y="4516209"/>
+                  <a:pt x="6216183" y="4588729"/>
+                  <a:pt x="6216810" y="4651172"/>
+                </a:cubicBezTo>
+                <a:cubicBezTo>
+                  <a:pt x="6217673" y="4756959"/>
+                  <a:pt x="6228654" y="4824005"/>
+                  <a:pt x="6225945" y="4916779"/>
+                </a:cubicBezTo>
+                <a:cubicBezTo>
+                  <a:pt x="6217032" y="4993010"/>
+                  <a:pt x="6264271" y="4984591"/>
+                  <a:pt x="6230174" y="5051379"/>
+                </a:cubicBezTo>
+                <a:cubicBezTo>
+                  <a:pt x="6235713" y="5056951"/>
+                  <a:pt x="6239420" y="5163714"/>
+                  <a:pt x="6242600" y="5170879"/>
+                </a:cubicBezTo>
+                <a:lnTo>
+                  <a:pt x="6235996" y="5216428"/>
+                </a:lnTo>
+                <a:lnTo>
+                  <a:pt x="6214638" y="5285298"/>
+                </a:lnTo>
+                <a:cubicBezTo>
+                  <a:pt x="6211392" y="5297492"/>
+                  <a:pt x="6225576" y="5312063"/>
+                  <a:pt x="6228432" y="5317696"/>
+                </a:cubicBezTo>
+                <a:lnTo>
+                  <a:pt x="6246496" y="5398787"/>
+                </a:lnTo>
+                <a:lnTo>
+                  <a:pt x="6244793" y="5399530"/>
+                </a:lnTo>
+                <a:lnTo>
+                  <a:pt x="6241695" y="5406948"/>
+                </a:lnTo>
+                <a:lnTo>
+                  <a:pt x="6267461" y="5499413"/>
+                </a:lnTo>
+                <a:cubicBezTo>
+                  <a:pt x="6285387" y="5533848"/>
+                  <a:pt x="6284888" y="5550029"/>
+                  <a:pt x="6295987" y="5582659"/>
+                </a:cubicBezTo>
+                <a:cubicBezTo>
+                  <a:pt x="6311253" y="5681724"/>
+                  <a:pt x="6295439" y="5695558"/>
+                  <a:pt x="6364803" y="5784263"/>
+                </a:cubicBezTo>
+                <a:cubicBezTo>
+                  <a:pt x="6379348" y="5818651"/>
+                  <a:pt x="6412475" y="5906802"/>
+                  <a:pt x="6423050" y="5922637"/>
+                </a:cubicBezTo>
+                <a:cubicBezTo>
+                  <a:pt x="6445210" y="5973612"/>
+                  <a:pt x="6468179" y="6023873"/>
+                  <a:pt x="6497767" y="6090108"/>
+                </a:cubicBezTo>
+                <a:cubicBezTo>
+                  <a:pt x="6571895" y="6150548"/>
+                  <a:pt x="6572491" y="6236583"/>
+                  <a:pt x="6606710" y="6281543"/>
+                </a:cubicBezTo>
+                <a:cubicBezTo>
+                  <a:pt x="6633675" y="6335892"/>
+                  <a:pt x="6654357" y="6388782"/>
+                  <a:pt x="6667540" y="6443715"/>
+                </a:cubicBezTo>
+                <a:cubicBezTo>
+                  <a:pt x="6685192" y="6466826"/>
+                  <a:pt x="6650500" y="6508701"/>
+                  <a:pt x="6659722" y="6550105"/>
+                </a:cubicBezTo>
+                <a:cubicBezTo>
+                  <a:pt x="6665926" y="6645044"/>
+                  <a:pt x="6669126" y="6627536"/>
+                  <a:pt x="6671805" y="6687397"/>
+                </a:cubicBezTo>
+                <a:cubicBezTo>
+                  <a:pt x="6682671" y="6733683"/>
+                  <a:pt x="6665210" y="6772117"/>
+                  <a:pt x="6669658" y="6806602"/>
+                </a:cubicBezTo>
+                <a:cubicBezTo>
+                  <a:pt x="6661174" y="6812658"/>
+                  <a:pt x="6667097" y="6831470"/>
+                  <a:pt x="6675783" y="6850325"/>
+                </a:cubicBezTo>
+                <a:lnTo>
+                  <a:pt x="6679704" y="6858000"/>
+                </a:lnTo>
+                <a:lnTo>
+                  <a:pt x="4532241" y="6858000"/>
+                </a:lnTo>
+                <a:lnTo>
+                  <a:pt x="1208596" y="6858000"/>
+                </a:lnTo>
+                <a:lnTo>
+                  <a:pt x="0" y="6858000"/>
+                </a:lnTo>
+                <a:close/>
+              </a:path>
+            </a:pathLst>
+          </a:custGeom>
+        </p:spPr>
+      </p:pic>
       <p:sp>
         <p:nvSpPr>
-          <p:cNvPr id="16" name="Rectangle 7">
-            <a:extLst>
-              <a:ext uri="{FF2B5EF4-FFF2-40B4-BE49-F238E27FC236}">
-                <a16:creationId xmlns:a16="http://schemas.microsoft.com/office/drawing/2014/main" id="{42A4FC2C-047E-45A5-965D-8E1E3BF09BC6}"/>
-              </a:ext>
-              <a:ext uri="{C183D7F6-B498-43B3-948B-1728B52AA6E4}">
-                <adec:decorative xmlns:adec="http://schemas.microsoft.com/office/drawing/2017/decorative" val="1"/>
-              </a:ext>
-            </a:extLst>
-          </p:cNvPr>
-          <p:cNvSpPr>
-            <a:spLocks noGrp="1" noRot="1" noChangeAspect="1" noMove="1" noResize="1" noEditPoints="1" noAdjustHandles="1" noChangeArrowheads="1" noChangeShapeType="1" noTextEdit="1"/>
-          </p:cNvSpPr>
-          <p:nvPr>
-            <p:extLst>
-              <p:ext uri="{386F3935-93C4-4BCD-93E2-E3B085C9AB24}">
-                <p16:designElem xmlns:p16="http://schemas.microsoft.com/office/powerpoint/2015/main" val="1"/>
-              </p:ext>
-            </p:extLst>
-          </p:nvPr>
+          <p:cNvPr id="5" name="תיבת טקסט 4">
+            <a:extLst>
+              <a:ext uri="{FF2B5EF4-FFF2-40B4-BE49-F238E27FC236}">
+                <a16:creationId xmlns:a16="http://schemas.microsoft.com/office/drawing/2014/main" id="{5964E5ED-CAB8-C0A8-CF80-FB6E5990DACB}"/>
+              </a:ext>
+            </a:extLst>
+          </p:cNvPr>
+          <p:cNvSpPr txBox="1"/>
+          <p:nvPr/>
         </p:nvSpPr>
-        <p:spPr bwMode="white">
+        <p:spPr>
           <a:xfrm>
-            <a:off x="1524" y="0"/>
-            <a:ext cx="12188952" cy="6858000"/>
+            <a:off x="856165" y="1825802"/>
+            <a:ext cx="4140013" cy="3908586"/>
           </a:xfrm>
           <a:prstGeom prst="rect">
             <a:avLst/>
           </a:prstGeom>
-          <a:noFill/>
-          <a:ln>
-            <a:noFill/>
-          </a:ln>
+        </p:spPr>
+        <p:txBody>
+          <a:bodyPr rtlCol="1">
+            <a:normAutofit/>
+          </a:bodyPr>
+          <a:lstStyle/>
+          <a:p>
+            <a:pPr>
+              <a:spcAft>
+                <a:spcPts val="600"/>
+              </a:spcAft>
+            </a:pPr>
+            <a:br>
+              <a:rPr lang="en-US" sz="3600" dirty="0">
+                <a:solidFill>
+                  <a:schemeClr val="bg1"/>
+                </a:solidFill>
+                <a:latin typeface="Aharoni" panose="02010803020104030203" pitchFamily="2" charset="-79"/>
+                <a:cs typeface="Aharoni" panose="02010803020104030203" pitchFamily="2" charset="-79"/>
+              </a:rPr>
+            </a:br>
+            <a:r>
+              <a:rPr lang="he-IL" sz="3600" dirty="0">
+                <a:solidFill>
+                  <a:schemeClr val="bg1"/>
+                </a:solidFill>
+                <a:latin typeface="Aharoni" panose="02010803020104030203" pitchFamily="2" charset="-79"/>
+                <a:cs typeface="Aharoni" panose="02010803020104030203" pitchFamily="2" charset="-79"/>
+              </a:rPr>
+              <a:t>מערכת שמספקת חדשות מסוננות, מסוכמות ומותאמות אישית — מכל העולם, בכל שפה, בדיוק לפי מה שמעניין אותך.</a:t>
+            </a:r>
+          </a:p>
+        </p:txBody>
+      </p:sp>
+      <p:sp>
+        <p:nvSpPr>
+          <p:cNvPr id="7" name="מלבן: פינות מעוגלות 6">
+            <a:extLst>
+              <a:ext uri="{FF2B5EF4-FFF2-40B4-BE49-F238E27FC236}">
+                <a16:creationId xmlns:a16="http://schemas.microsoft.com/office/drawing/2014/main" id="{745C2BF1-1A08-459A-C1F9-64931D32F3B8}"/>
+              </a:ext>
+            </a:extLst>
+          </p:cNvPr>
+          <p:cNvSpPr/>
+          <p:nvPr/>
+        </p:nvSpPr>
+        <p:spPr>
+          <a:xfrm>
+            <a:off x="1408174" y="441612"/>
+            <a:ext cx="3328926" cy="2002779"/>
+          </a:xfrm>
+          <a:prstGeom prst="roundRect">
+            <a:avLst/>
+          </a:prstGeom>
+          <a:solidFill>
+            <a:schemeClr val="accent2">
+              <a:lumMod val="60000"/>
+              <a:lumOff val="40000"/>
+              <a:alpha val="43000"/>
+            </a:schemeClr>
+          </a:solidFill>
+          <a:effectLst>
+            <a:softEdge rad="177800"/>
+          </a:effectLst>
         </p:spPr>
         <p:style>
           <a:lnRef idx="2">
             <a:schemeClr val="accent1">
-              <a:shade val="50000"/>
+              <a:shade val="15000"/>
             </a:schemeClr>
           </a:lnRef>
           <a:fillRef idx="1">
@@ -4458,143 +5557,20 @@
           </a:fontRef>
         </p:style>
         <p:txBody>
-          <a:bodyPr rtlCol="0" anchor="ctr"/>
-          <a:lstStyle>
-            <a:defPPr>
-              <a:defRPr lang="en-US"/>
-            </a:defPPr>
-            <a:lvl1pPr marL="0" algn="l" defTabSz="914400" rtl="0" eaLnBrk="1" latinLnBrk="0" hangingPunct="1">
-              <a:defRPr sz="1800" kern="1200">
-                <a:solidFill>
-                  <a:schemeClr val="lt1"/>
-                </a:solidFill>
-                <a:latin typeface="+mn-lt"/>
-                <a:ea typeface="+mn-ea"/>
-                <a:cs typeface="+mn-cs"/>
-              </a:defRPr>
-            </a:lvl1pPr>
-            <a:lvl2pPr marL="457200" algn="l" defTabSz="914400" rtl="0" eaLnBrk="1" latinLnBrk="0" hangingPunct="1">
-              <a:defRPr sz="1800" kern="1200">
-                <a:solidFill>
-                  <a:schemeClr val="lt1"/>
-                </a:solidFill>
-                <a:latin typeface="+mn-lt"/>
-                <a:ea typeface="+mn-ea"/>
-                <a:cs typeface="+mn-cs"/>
-              </a:defRPr>
-            </a:lvl2pPr>
-            <a:lvl3pPr marL="914400" algn="l" defTabSz="914400" rtl="0" eaLnBrk="1" latinLnBrk="0" hangingPunct="1">
-              <a:defRPr sz="1800" kern="1200">
-                <a:solidFill>
-                  <a:schemeClr val="lt1"/>
-                </a:solidFill>
-                <a:latin typeface="+mn-lt"/>
-                <a:ea typeface="+mn-ea"/>
-                <a:cs typeface="+mn-cs"/>
-              </a:defRPr>
-            </a:lvl3pPr>
-            <a:lvl4pPr marL="1371600" algn="l" defTabSz="914400" rtl="0" eaLnBrk="1" latinLnBrk="0" hangingPunct="1">
-              <a:defRPr sz="1800" kern="1200">
-                <a:solidFill>
-                  <a:schemeClr val="lt1"/>
-                </a:solidFill>
-                <a:latin typeface="+mn-lt"/>
-                <a:ea typeface="+mn-ea"/>
-                <a:cs typeface="+mn-cs"/>
-              </a:defRPr>
-            </a:lvl4pPr>
-            <a:lvl5pPr marL="1828800" algn="l" defTabSz="914400" rtl="0" eaLnBrk="1" latinLnBrk="0" hangingPunct="1">
-              <a:defRPr sz="1800" kern="1200">
-                <a:solidFill>
-                  <a:schemeClr val="lt1"/>
-                </a:solidFill>
-                <a:latin typeface="+mn-lt"/>
-                <a:ea typeface="+mn-ea"/>
-                <a:cs typeface="+mn-cs"/>
-              </a:defRPr>
-            </a:lvl5pPr>
-            <a:lvl6pPr marL="2286000" algn="l" defTabSz="914400" rtl="0" eaLnBrk="1" latinLnBrk="0" hangingPunct="1">
-              <a:defRPr sz="1800" kern="1200">
-                <a:solidFill>
-                  <a:schemeClr val="lt1"/>
-                </a:solidFill>
-                <a:latin typeface="+mn-lt"/>
-                <a:ea typeface="+mn-ea"/>
-                <a:cs typeface="+mn-cs"/>
-              </a:defRPr>
-            </a:lvl6pPr>
-            <a:lvl7pPr marL="2743200" algn="l" defTabSz="914400" rtl="0" eaLnBrk="1" latinLnBrk="0" hangingPunct="1">
-              <a:defRPr sz="1800" kern="1200">
-                <a:solidFill>
-                  <a:schemeClr val="lt1"/>
-                </a:solidFill>
-                <a:latin typeface="+mn-lt"/>
-                <a:ea typeface="+mn-ea"/>
-                <a:cs typeface="+mn-cs"/>
-              </a:defRPr>
-            </a:lvl7pPr>
-            <a:lvl8pPr marL="3200400" algn="l" defTabSz="914400" rtl="0" eaLnBrk="1" latinLnBrk="0" hangingPunct="1">
-              <a:defRPr sz="1800" kern="1200">
-                <a:solidFill>
-                  <a:schemeClr val="lt1"/>
-                </a:solidFill>
-                <a:latin typeface="+mn-lt"/>
-                <a:ea typeface="+mn-ea"/>
-                <a:cs typeface="+mn-cs"/>
-              </a:defRPr>
-            </a:lvl8pPr>
-            <a:lvl9pPr marL="3657600" algn="l" defTabSz="914400" rtl="0" eaLnBrk="1" latinLnBrk="0" hangingPunct="1">
-              <a:defRPr sz="1800" kern="1200">
-                <a:solidFill>
-                  <a:schemeClr val="lt1"/>
-                </a:solidFill>
-                <a:latin typeface="+mn-lt"/>
-                <a:ea typeface="+mn-ea"/>
-                <a:cs typeface="+mn-cs"/>
-              </a:defRPr>
-            </a:lvl9pPr>
-          </a:lstStyle>
+          <a:bodyPr rtlCol="1" anchor="ctr"/>
+          <a:lstStyle/>
           <a:p>
             <a:pPr algn="ctr"/>
-            <a:endParaRPr lang="en-US"/>
+            <a:endParaRPr lang="he-IL" dirty="0"/>
           </a:p>
         </p:txBody>
       </p:sp>
       <p:pic>
         <p:nvPicPr>
-          <p:cNvPr id="3" name="תמונה 2" descr="תמונה שמכילה פני אדם, אדם, איש, ספר&#10;&#10;תוכן שנוצר על-ידי בינה מלאכותית עשוי להיות שגוי.">
-            <a:extLst>
-              <a:ext uri="{FF2B5EF4-FFF2-40B4-BE49-F238E27FC236}">
-                <a16:creationId xmlns:a16="http://schemas.microsoft.com/office/drawing/2014/main" id="{73548979-2B7A-4EB2-5294-DF015E4DFFF4}"/>
-              </a:ext>
-            </a:extLst>
-          </p:cNvPr>
-          <p:cNvPicPr>
-            <a:picLocks noChangeAspect="1"/>
-          </p:cNvPicPr>
-          <p:nvPr/>
-        </p:nvPicPr>
-        <p:blipFill>
-          <a:blip r:embed="rId2"/>
-          <a:srcRect t="8193" b="35568"/>
-          <a:stretch/>
-        </p:blipFill>
-        <p:spPr>
-          <a:xfrm>
-            <a:off x="20" y="1282"/>
-            <a:ext cx="12191980" cy="6856718"/>
-          </a:xfrm>
-          <a:prstGeom prst="rect">
-            <a:avLst/>
-          </a:prstGeom>
-        </p:spPr>
-      </p:pic>
-      <p:pic>
-        <p:nvPicPr>
-          <p:cNvPr id="4" name="תמונה 3" descr="תמונה שמכילה גרפיקה, לוגו, עיצוב גרפי, צילום מסך&#10;&#10;תוכן שנוצר על-ידי בינה מלאכותית עשוי להיות שגוי.">
-            <a:extLst>
-              <a:ext uri="{FF2B5EF4-FFF2-40B4-BE49-F238E27FC236}">
-                <a16:creationId xmlns:a16="http://schemas.microsoft.com/office/drawing/2014/main" id="{02655BB5-A75F-9EF4-F0F4-CDC8DF29C4E1}"/>
+          <p:cNvPr id="6" name="תמונה 5" descr="תמונה שמכילה גרפיקה, לוגו, עיצוב גרפי, צילום מסך&#10;&#10;תוכן שנוצר על-ידי בינה מלאכותית עשוי להיות שגוי.">
+            <a:extLst>
+              <a:ext uri="{FF2B5EF4-FFF2-40B4-BE49-F238E27FC236}">
+                <a16:creationId xmlns:a16="http://schemas.microsoft.com/office/drawing/2014/main" id="{6C78C5A7-03DA-9770-9139-81B62723C932}"/>
               </a:ext>
             </a:extLst>
           </p:cNvPr>
@@ -4617,8 +5593,8 @@
         </p:blipFill>
         <p:spPr>
           <a:xfrm>
-            <a:off x="9780620" y="-125380"/>
-            <a:ext cx="1875258" cy="1875258"/>
+            <a:off x="1408173" y="-162086"/>
+            <a:ext cx="3210176" cy="3210176"/>
           </a:xfrm>
           <a:prstGeom prst="rect">
             <a:avLst/>
@@ -4628,7 +5604,7 @@
     </p:spTree>
     <p:extLst>
       <p:ext uri="{BB962C8B-B14F-4D97-AF65-F5344CB8AC3E}">
-        <p14:creationId xmlns:p14="http://schemas.microsoft.com/office/powerpoint/2010/main" val="3987356222"/>
+        <p14:creationId xmlns:p14="http://schemas.microsoft.com/office/powerpoint/2010/main" val="874879855"/>
       </p:ext>
     </p:extLst>
   </p:cSld>
@@ -4641,20 +5617,6 @@
 <file path=ppt/slides/slide4.xml><?xml version="1.0" encoding="utf-8"?>
 <p:sld xmlns:a="http://schemas.openxmlformats.org/drawingml/2006/main" xmlns:r="http://schemas.openxmlformats.org/officeDocument/2006/relationships" xmlns:p="http://schemas.openxmlformats.org/presentationml/2006/main">
   <p:cSld>
-    <p:bg>
-      <p:bgPr>
-        <a:blipFill dpi="0" rotWithShape="1">
-          <a:blip r:embed="rId2">
-            <a:lum/>
-          </a:blip>
-          <a:srcRect/>
-          <a:stretch>
-            <a:fillRect t="-39000" b="-39000"/>
-          </a:stretch>
-        </a:blipFill>
-        <a:effectLst/>
-      </p:bgPr>
-    </p:bg>
     <p:spTree>
       <p:nvGrpSpPr>
         <p:cNvPr id="1" name="">
@@ -4690,7 +5652,7 @@
           <p:nvPr/>
         </p:nvPicPr>
         <p:blipFill>
-          <a:blip r:embed="rId3">
+          <a:blip r:embed="rId2">
             <a:extLst>
               <a:ext uri="{28A0092B-C50C-407E-A947-70E740481C1C}">
                 <a14:useLocalDpi xmlns:a14="http://schemas.microsoft.com/office/drawing/2010/main" val="0"/>
@@ -4711,1048 +5673,1598 @@
           </a:prstGeom>
         </p:spPr>
       </p:pic>
+      <p:grpSp>
+        <p:nvGrpSpPr>
+          <p:cNvPr id="2" name="קבוצה 1">
+            <a:extLst>
+              <a:ext uri="{FF2B5EF4-FFF2-40B4-BE49-F238E27FC236}">
+                <a16:creationId xmlns:a16="http://schemas.microsoft.com/office/drawing/2014/main" id="{45BE189B-5001-FE3B-3F12-4461DFC3CA3D}"/>
+              </a:ext>
+            </a:extLst>
+          </p:cNvPr>
+          <p:cNvGrpSpPr/>
+          <p:nvPr/>
+        </p:nvGrpSpPr>
+        <p:grpSpPr>
+          <a:xfrm>
+            <a:off x="1119415" y="1257300"/>
+            <a:ext cx="9089572" cy="4744998"/>
+            <a:chOff x="217715" y="381000"/>
+            <a:chExt cx="9089572" cy="4744998"/>
+          </a:xfrm>
+        </p:grpSpPr>
+        <p:sp>
+          <p:nvSpPr>
+            <p:cNvPr id="4" name="תיבת טקסט 3">
+              <a:extLst>
+                <a:ext uri="{FF2B5EF4-FFF2-40B4-BE49-F238E27FC236}">
+                  <a16:creationId xmlns:a16="http://schemas.microsoft.com/office/drawing/2014/main" id="{689438A8-ED50-ED10-07CE-750F637EB53F}"/>
+                </a:ext>
+              </a:extLst>
+            </p:cNvPr>
+            <p:cNvSpPr txBox="1"/>
+            <p:nvPr/>
+          </p:nvSpPr>
+          <p:spPr>
+            <a:xfrm>
+              <a:off x="5529943" y="381000"/>
+              <a:ext cx="827314" cy="369332"/>
+            </a:xfrm>
+            <a:prstGeom prst="rect">
+              <a:avLst/>
+            </a:prstGeom>
+            <a:noFill/>
+            <a:ln>
+              <a:solidFill>
+                <a:schemeClr val="bg1"/>
+              </a:solidFill>
+            </a:ln>
+          </p:spPr>
+          <p:txBody>
+            <a:bodyPr wrap="square" rtlCol="1">
+              <a:spAutoFit/>
+            </a:bodyPr>
+            <a:lstStyle/>
+            <a:p>
+              <a:r>
+                <a:rPr lang="en-US" dirty="0">
+                  <a:solidFill>
+                    <a:schemeClr val="bg1"/>
+                  </a:solidFill>
+                </a:rPr>
+                <a:t>client</a:t>
+              </a:r>
+              <a:endParaRPr lang="he-IL" dirty="0">
+                <a:solidFill>
+                  <a:schemeClr val="bg1"/>
+                </a:solidFill>
+              </a:endParaRPr>
+            </a:p>
+          </p:txBody>
+        </p:sp>
+        <p:sp>
+          <p:nvSpPr>
+            <p:cNvPr id="7" name="תיבת טקסט 6">
+              <a:extLst>
+                <a:ext uri="{FF2B5EF4-FFF2-40B4-BE49-F238E27FC236}">
+                  <a16:creationId xmlns:a16="http://schemas.microsoft.com/office/drawing/2014/main" id="{600B49A2-2B31-E98A-2122-E8D2D9F2D6BF}"/>
+                </a:ext>
+              </a:extLst>
+            </p:cNvPr>
+            <p:cNvSpPr txBox="1"/>
+            <p:nvPr/>
+          </p:nvSpPr>
+          <p:spPr>
+            <a:xfrm>
+              <a:off x="5323114" y="1351002"/>
+              <a:ext cx="1240971" cy="369332"/>
+            </a:xfrm>
+            <a:prstGeom prst="rect">
+              <a:avLst/>
+            </a:prstGeom>
+            <a:noFill/>
+            <a:ln>
+              <a:solidFill>
+                <a:schemeClr val="bg1"/>
+              </a:solidFill>
+            </a:ln>
+          </p:spPr>
+          <p:txBody>
+            <a:bodyPr wrap="square" rtlCol="1">
+              <a:spAutoFit/>
+            </a:bodyPr>
+            <a:lstStyle/>
+            <a:p>
+              <a:r>
+                <a:rPr lang="en-US" dirty="0">
+                  <a:solidFill>
+                    <a:schemeClr val="bg1"/>
+                  </a:solidFill>
+                </a:rPr>
+                <a:t>gateway</a:t>
+              </a:r>
+              <a:endParaRPr lang="he-IL" dirty="0">
+                <a:solidFill>
+                  <a:schemeClr val="bg1"/>
+                </a:solidFill>
+              </a:endParaRPr>
+            </a:p>
+          </p:txBody>
+        </p:sp>
+        <p:sp>
+          <p:nvSpPr>
+            <p:cNvPr id="8" name="תיבת טקסט 7">
+              <a:extLst>
+                <a:ext uri="{FF2B5EF4-FFF2-40B4-BE49-F238E27FC236}">
+                  <a16:creationId xmlns:a16="http://schemas.microsoft.com/office/drawing/2014/main" id="{5EE30E74-A01C-6EFC-77D9-3AFF059C8667}"/>
+                </a:ext>
+              </a:extLst>
+            </p:cNvPr>
+            <p:cNvSpPr txBox="1"/>
+            <p:nvPr/>
+          </p:nvSpPr>
+          <p:spPr>
+            <a:xfrm>
+              <a:off x="5475514" y="3408011"/>
+              <a:ext cx="1240971" cy="369332"/>
+            </a:xfrm>
+            <a:prstGeom prst="rect">
+              <a:avLst/>
+            </a:prstGeom>
+            <a:noFill/>
+            <a:ln>
+              <a:solidFill>
+                <a:schemeClr val="bg1"/>
+              </a:solidFill>
+            </a:ln>
+          </p:spPr>
+          <p:txBody>
+            <a:bodyPr wrap="square" rtlCol="1">
+              <a:spAutoFit/>
+            </a:bodyPr>
+            <a:lstStyle/>
+            <a:p>
+              <a:r>
+                <a:rPr lang="en-US" dirty="0" err="1">
+                  <a:solidFill>
+                    <a:schemeClr val="bg1"/>
+                  </a:solidFill>
+                </a:rPr>
+                <a:t>KeyCloak</a:t>
+              </a:r>
+              <a:endParaRPr lang="he-IL" dirty="0">
+                <a:solidFill>
+                  <a:schemeClr val="bg1"/>
+                </a:solidFill>
+              </a:endParaRPr>
+            </a:p>
+          </p:txBody>
+        </p:sp>
+        <p:sp>
+          <p:nvSpPr>
+            <p:cNvPr id="9" name="תיבת טקסט 8">
+              <a:extLst>
+                <a:ext uri="{FF2B5EF4-FFF2-40B4-BE49-F238E27FC236}">
+                  <a16:creationId xmlns:a16="http://schemas.microsoft.com/office/drawing/2014/main" id="{8A9E5B92-69EF-8F39-C740-F69488913BE9}"/>
+                </a:ext>
+              </a:extLst>
+            </p:cNvPr>
+            <p:cNvSpPr txBox="1"/>
+            <p:nvPr/>
+          </p:nvSpPr>
+          <p:spPr>
+            <a:xfrm>
+              <a:off x="7685315" y="2177141"/>
+              <a:ext cx="1621972" cy="369332"/>
+            </a:xfrm>
+            <a:prstGeom prst="rect">
+              <a:avLst/>
+            </a:prstGeom>
+            <a:noFill/>
+            <a:ln>
+              <a:solidFill>
+                <a:schemeClr val="bg1"/>
+              </a:solidFill>
+            </a:ln>
+          </p:spPr>
+          <p:txBody>
+            <a:bodyPr wrap="square" rtlCol="1">
+              <a:spAutoFit/>
+            </a:bodyPr>
+            <a:lstStyle/>
+            <a:p>
+              <a:r>
+                <a:rPr lang="en-US" dirty="0">
+                  <a:solidFill>
+                    <a:schemeClr val="bg1"/>
+                  </a:solidFill>
+                </a:rPr>
+                <a:t>Data Manager</a:t>
+              </a:r>
+              <a:endParaRPr lang="he-IL" dirty="0">
+                <a:solidFill>
+                  <a:schemeClr val="bg1"/>
+                </a:solidFill>
+              </a:endParaRPr>
+            </a:p>
+          </p:txBody>
+        </p:sp>
+        <p:sp>
+          <p:nvSpPr>
+            <p:cNvPr id="10" name="תיבת טקסט 9">
+              <a:extLst>
+                <a:ext uri="{FF2B5EF4-FFF2-40B4-BE49-F238E27FC236}">
+                  <a16:creationId xmlns:a16="http://schemas.microsoft.com/office/drawing/2014/main" id="{DF24775D-FC8E-AAFF-38A2-DF9C7253E561}"/>
+                </a:ext>
+              </a:extLst>
+            </p:cNvPr>
+            <p:cNvSpPr txBox="1"/>
+            <p:nvPr/>
+          </p:nvSpPr>
+          <p:spPr>
+            <a:xfrm>
+              <a:off x="3265716" y="2177141"/>
+              <a:ext cx="1621972" cy="369332"/>
+            </a:xfrm>
+            <a:prstGeom prst="rect">
+              <a:avLst/>
+            </a:prstGeom>
+            <a:noFill/>
+            <a:ln>
+              <a:solidFill>
+                <a:schemeClr val="bg1"/>
+              </a:solidFill>
+            </a:ln>
+          </p:spPr>
+          <p:txBody>
+            <a:bodyPr wrap="square" rtlCol="1">
+              <a:spAutoFit/>
+            </a:bodyPr>
+            <a:lstStyle/>
+            <a:p>
+              <a:r>
+                <a:rPr lang="en-US" dirty="0">
+                  <a:solidFill>
+                    <a:schemeClr val="bg1"/>
+                  </a:solidFill>
+                </a:rPr>
+                <a:t>News Manger</a:t>
+              </a:r>
+              <a:endParaRPr lang="he-IL" dirty="0">
+                <a:solidFill>
+                  <a:schemeClr val="bg1"/>
+                </a:solidFill>
+              </a:endParaRPr>
+            </a:p>
+          </p:txBody>
+        </p:sp>
+        <p:sp>
+          <p:nvSpPr>
+            <p:cNvPr id="11" name="תיבת טקסט 10">
+              <a:extLst>
+                <a:ext uri="{FF2B5EF4-FFF2-40B4-BE49-F238E27FC236}">
+                  <a16:creationId xmlns:a16="http://schemas.microsoft.com/office/drawing/2014/main" id="{FCE839A2-42CF-0AD9-B8E7-A66A3766C685}"/>
+                </a:ext>
+              </a:extLst>
+            </p:cNvPr>
+            <p:cNvSpPr txBox="1"/>
+            <p:nvPr/>
+          </p:nvSpPr>
+          <p:spPr>
+            <a:xfrm>
+              <a:off x="217715" y="3526580"/>
+              <a:ext cx="1621972" cy="369332"/>
+            </a:xfrm>
+            <a:prstGeom prst="rect">
+              <a:avLst/>
+            </a:prstGeom>
+            <a:noFill/>
+            <a:ln>
+              <a:solidFill>
+                <a:schemeClr val="bg1"/>
+              </a:solidFill>
+            </a:ln>
+          </p:spPr>
+          <p:txBody>
+            <a:bodyPr wrap="square" rtlCol="1">
+              <a:spAutoFit/>
+            </a:bodyPr>
+            <a:lstStyle/>
+            <a:p>
+              <a:r>
+                <a:rPr lang="en-US" dirty="0">
+                  <a:solidFill>
+                    <a:schemeClr val="bg1"/>
+                  </a:solidFill>
+                </a:rPr>
+                <a:t>Notification</a:t>
+              </a:r>
+              <a:endParaRPr lang="he-IL" dirty="0">
+                <a:solidFill>
+                  <a:schemeClr val="bg1"/>
+                </a:solidFill>
+              </a:endParaRPr>
+            </a:p>
+          </p:txBody>
+        </p:sp>
+        <p:sp>
+          <p:nvSpPr>
+            <p:cNvPr id="12" name="תיבת טקסט 11">
+              <a:extLst>
+                <a:ext uri="{FF2B5EF4-FFF2-40B4-BE49-F238E27FC236}">
+                  <a16:creationId xmlns:a16="http://schemas.microsoft.com/office/drawing/2014/main" id="{CDC1B019-68F8-A173-3AA5-810EEEFDE367}"/>
+                </a:ext>
+              </a:extLst>
+            </p:cNvPr>
+            <p:cNvSpPr txBox="1"/>
+            <p:nvPr/>
+          </p:nvSpPr>
+          <p:spPr>
+            <a:xfrm>
+              <a:off x="217715" y="1351002"/>
+              <a:ext cx="1621972" cy="369332"/>
+            </a:xfrm>
+            <a:prstGeom prst="rect">
+              <a:avLst/>
+            </a:prstGeom>
+            <a:noFill/>
+            <a:ln>
+              <a:solidFill>
+                <a:schemeClr val="bg1"/>
+              </a:solidFill>
+            </a:ln>
+          </p:spPr>
+          <p:txBody>
+            <a:bodyPr wrap="square" rtlCol="1">
+              <a:spAutoFit/>
+            </a:bodyPr>
+            <a:lstStyle/>
+            <a:p>
+              <a:r>
+                <a:rPr lang="en-US" dirty="0">
+                  <a:solidFill>
+                    <a:schemeClr val="bg1"/>
+                  </a:solidFill>
+                </a:rPr>
+                <a:t>LLM</a:t>
+              </a:r>
+              <a:endParaRPr lang="he-IL" dirty="0">
+                <a:solidFill>
+                  <a:schemeClr val="bg1"/>
+                </a:solidFill>
+              </a:endParaRPr>
+            </a:p>
+          </p:txBody>
+        </p:sp>
+        <p:sp>
+          <p:nvSpPr>
+            <p:cNvPr id="13" name="תיבת טקסט 12">
+              <a:extLst>
+                <a:ext uri="{FF2B5EF4-FFF2-40B4-BE49-F238E27FC236}">
+                  <a16:creationId xmlns:a16="http://schemas.microsoft.com/office/drawing/2014/main" id="{CC35C9B3-CD42-02DF-852F-262A0EA4D065}"/>
+                </a:ext>
+              </a:extLst>
+            </p:cNvPr>
+            <p:cNvSpPr txBox="1"/>
+            <p:nvPr/>
+          </p:nvSpPr>
+          <p:spPr>
+            <a:xfrm>
+              <a:off x="3178630" y="4756666"/>
+              <a:ext cx="1621972" cy="369332"/>
+            </a:xfrm>
+            <a:prstGeom prst="rect">
+              <a:avLst/>
+            </a:prstGeom>
+            <a:noFill/>
+            <a:ln>
+              <a:solidFill>
+                <a:schemeClr val="bg1"/>
+              </a:solidFill>
+            </a:ln>
+          </p:spPr>
+          <p:txBody>
+            <a:bodyPr wrap="square" rtlCol="1">
+              <a:spAutoFit/>
+            </a:bodyPr>
+            <a:lstStyle/>
+            <a:p>
+              <a:r>
+                <a:rPr lang="en-US" dirty="0">
+                  <a:solidFill>
+                    <a:schemeClr val="bg1"/>
+                  </a:solidFill>
+                </a:rPr>
+                <a:t>NewsData.IO</a:t>
+              </a:r>
+              <a:endParaRPr lang="he-IL" dirty="0">
+                <a:solidFill>
+                  <a:schemeClr val="bg1"/>
+                </a:solidFill>
+              </a:endParaRPr>
+            </a:p>
+          </p:txBody>
+        </p:sp>
+        <p:sp>
+          <p:nvSpPr>
+            <p:cNvPr id="14" name="תיבת טקסט 13">
+              <a:extLst>
+                <a:ext uri="{FF2B5EF4-FFF2-40B4-BE49-F238E27FC236}">
+                  <a16:creationId xmlns:a16="http://schemas.microsoft.com/office/drawing/2014/main" id="{CB06557E-4AAF-9918-B3C0-1F91383041C1}"/>
+                </a:ext>
+              </a:extLst>
+            </p:cNvPr>
+            <p:cNvSpPr txBox="1"/>
+            <p:nvPr/>
+          </p:nvSpPr>
+          <p:spPr>
+            <a:xfrm>
+              <a:off x="7685315" y="4560723"/>
+              <a:ext cx="1621972" cy="369332"/>
+            </a:xfrm>
+            <a:prstGeom prst="rect">
+              <a:avLst/>
+            </a:prstGeom>
+            <a:noFill/>
+            <a:ln>
+              <a:solidFill>
+                <a:schemeClr val="bg1"/>
+              </a:solidFill>
+            </a:ln>
+          </p:spPr>
+          <p:txBody>
+            <a:bodyPr wrap="square" rtlCol="1">
+              <a:spAutoFit/>
+            </a:bodyPr>
+            <a:lstStyle/>
+            <a:p>
+              <a:r>
+                <a:rPr lang="en-US" dirty="0" err="1">
+                  <a:solidFill>
+                    <a:schemeClr val="bg1"/>
+                  </a:solidFill>
+                </a:rPr>
+                <a:t>PosrgreSql</a:t>
+              </a:r>
+              <a:endParaRPr lang="he-IL" dirty="0">
+                <a:solidFill>
+                  <a:schemeClr val="bg1"/>
+                </a:solidFill>
+              </a:endParaRPr>
+            </a:p>
+          </p:txBody>
+        </p:sp>
+        <p:cxnSp>
+          <p:nvCxnSpPr>
+            <p:cNvPr id="16" name="מחבר חץ ישר 15">
+              <a:extLst>
+                <a:ext uri="{FF2B5EF4-FFF2-40B4-BE49-F238E27FC236}">
+                  <a16:creationId xmlns:a16="http://schemas.microsoft.com/office/drawing/2014/main" id="{E33F0CFF-8903-7880-33A2-455F955D5C16}"/>
+                </a:ext>
+              </a:extLst>
+            </p:cNvPr>
+            <p:cNvCxnSpPr>
+              <a:stCxn id="4" idx="2"/>
+              <a:endCxn id="7" idx="0"/>
+            </p:cNvCxnSpPr>
+            <p:nvPr/>
+          </p:nvCxnSpPr>
+          <p:spPr>
+            <a:xfrm>
+              <a:off x="5943600" y="750332"/>
+              <a:ext cx="0" cy="600670"/>
+            </a:xfrm>
+            <a:prstGeom prst="straightConnector1">
+              <a:avLst/>
+            </a:prstGeom>
+            <a:ln w="38100">
+              <a:solidFill>
+                <a:schemeClr val="bg1"/>
+              </a:solidFill>
+              <a:headEnd type="triangle" w="med" len="med"/>
+              <a:tailEnd type="triangle" w="med" len="med"/>
+            </a:ln>
+          </p:spPr>
+          <p:style>
+            <a:lnRef idx="2">
+              <a:schemeClr val="accent1"/>
+            </a:lnRef>
+            <a:fillRef idx="0">
+              <a:schemeClr val="accent1"/>
+            </a:fillRef>
+            <a:effectRef idx="1">
+              <a:schemeClr val="accent1"/>
+            </a:effectRef>
+            <a:fontRef idx="minor">
+              <a:schemeClr val="tx1"/>
+            </a:fontRef>
+          </p:style>
+        </p:cxnSp>
+        <p:cxnSp>
+          <p:nvCxnSpPr>
+            <p:cNvPr id="22" name="מחבר: מרפקי 21">
+              <a:extLst>
+                <a:ext uri="{FF2B5EF4-FFF2-40B4-BE49-F238E27FC236}">
+                  <a16:creationId xmlns:a16="http://schemas.microsoft.com/office/drawing/2014/main" id="{473E45F8-2CD2-A0CA-C862-B81B053C55EC}"/>
+                </a:ext>
+              </a:extLst>
+            </p:cNvPr>
+            <p:cNvCxnSpPr>
+              <a:cxnSpLocks/>
+              <a:stCxn id="7" idx="3"/>
+              <a:endCxn id="9" idx="0"/>
+            </p:cNvCxnSpPr>
+            <p:nvPr/>
+          </p:nvCxnSpPr>
+          <p:spPr>
+            <a:xfrm>
+              <a:off x="6564085" y="1535668"/>
+              <a:ext cx="1932216" cy="641473"/>
+            </a:xfrm>
+            <a:prstGeom prst="bentConnector2">
+              <a:avLst/>
+            </a:prstGeom>
+            <a:ln w="38100">
+              <a:solidFill>
+                <a:schemeClr val="bg1"/>
+              </a:solidFill>
+              <a:headEnd type="triangle" w="med" len="med"/>
+              <a:tailEnd type="triangle" w="med" len="med"/>
+            </a:ln>
+          </p:spPr>
+          <p:style>
+            <a:lnRef idx="2">
+              <a:schemeClr val="accent1"/>
+            </a:lnRef>
+            <a:fillRef idx="0">
+              <a:schemeClr val="accent1"/>
+            </a:fillRef>
+            <a:effectRef idx="1">
+              <a:schemeClr val="accent1"/>
+            </a:effectRef>
+            <a:fontRef idx="minor">
+              <a:schemeClr val="tx1"/>
+            </a:fontRef>
+          </p:style>
+        </p:cxnSp>
+        <p:cxnSp>
+          <p:nvCxnSpPr>
+            <p:cNvPr id="26" name="מחבר: מרפקי 25">
+              <a:extLst>
+                <a:ext uri="{FF2B5EF4-FFF2-40B4-BE49-F238E27FC236}">
+                  <a16:creationId xmlns:a16="http://schemas.microsoft.com/office/drawing/2014/main" id="{ED5ED35D-A36D-A598-495C-81322244013D}"/>
+                </a:ext>
+              </a:extLst>
+            </p:cNvPr>
+            <p:cNvCxnSpPr>
+              <a:cxnSpLocks/>
+              <a:stCxn id="7" idx="1"/>
+              <a:endCxn id="10" idx="0"/>
+            </p:cNvCxnSpPr>
+            <p:nvPr/>
+          </p:nvCxnSpPr>
+          <p:spPr>
+            <a:xfrm rot="10800000" flipV="1">
+              <a:off x="4076702" y="1535667"/>
+              <a:ext cx="1246412" cy="641473"/>
+            </a:xfrm>
+            <a:prstGeom prst="bentConnector2">
+              <a:avLst/>
+            </a:prstGeom>
+            <a:ln w="38100">
+              <a:solidFill>
+                <a:schemeClr val="bg1"/>
+              </a:solidFill>
+              <a:headEnd type="triangle" w="med" len="med"/>
+              <a:tailEnd type="triangle" w="med" len="med"/>
+            </a:ln>
+          </p:spPr>
+          <p:style>
+            <a:lnRef idx="2">
+              <a:schemeClr val="accent1"/>
+            </a:lnRef>
+            <a:fillRef idx="0">
+              <a:schemeClr val="accent1"/>
+            </a:fillRef>
+            <a:effectRef idx="1">
+              <a:schemeClr val="accent1"/>
+            </a:effectRef>
+            <a:fontRef idx="minor">
+              <a:schemeClr val="tx1"/>
+            </a:fontRef>
+          </p:style>
+        </p:cxnSp>
+        <p:cxnSp>
+          <p:nvCxnSpPr>
+            <p:cNvPr id="32" name="מחבר: מרפקי 31">
+              <a:extLst>
+                <a:ext uri="{FF2B5EF4-FFF2-40B4-BE49-F238E27FC236}">
+                  <a16:creationId xmlns:a16="http://schemas.microsoft.com/office/drawing/2014/main" id="{C7E943DF-F7E8-AA59-C342-4D09EF217373}"/>
+                </a:ext>
+              </a:extLst>
+            </p:cNvPr>
+            <p:cNvCxnSpPr>
+              <a:stCxn id="10" idx="1"/>
+              <a:endCxn id="12" idx="3"/>
+            </p:cNvCxnSpPr>
+            <p:nvPr/>
+          </p:nvCxnSpPr>
+          <p:spPr>
+            <a:xfrm rot="10800000">
+              <a:off x="1839688" y="1535669"/>
+              <a:ext cx="1426029" cy="826139"/>
+            </a:xfrm>
+            <a:prstGeom prst="bentConnector3">
+              <a:avLst/>
+            </a:prstGeom>
+            <a:ln w="38100">
+              <a:solidFill>
+                <a:srgbClr val="FFFF00"/>
+              </a:solidFill>
+              <a:headEnd type="triangle" w="med" len="med"/>
+              <a:tailEnd type="triangle" w="med" len="med"/>
+            </a:ln>
+          </p:spPr>
+          <p:style>
+            <a:lnRef idx="2">
+              <a:schemeClr val="accent1"/>
+            </a:lnRef>
+            <a:fillRef idx="0">
+              <a:schemeClr val="accent1"/>
+            </a:fillRef>
+            <a:effectRef idx="1">
+              <a:schemeClr val="accent1"/>
+            </a:effectRef>
+            <a:fontRef idx="minor">
+              <a:schemeClr val="tx1"/>
+            </a:fontRef>
+          </p:style>
+        </p:cxnSp>
+        <p:cxnSp>
+          <p:nvCxnSpPr>
+            <p:cNvPr id="36" name="מחבר: מרפקי 35">
+              <a:extLst>
+                <a:ext uri="{FF2B5EF4-FFF2-40B4-BE49-F238E27FC236}">
+                  <a16:creationId xmlns:a16="http://schemas.microsoft.com/office/drawing/2014/main" id="{814C221D-73E3-23C9-39DB-3B275E6BC187}"/>
+                </a:ext>
+              </a:extLst>
+            </p:cNvPr>
+            <p:cNvCxnSpPr>
+              <a:stCxn id="10" idx="2"/>
+              <a:endCxn id="11" idx="0"/>
+            </p:cNvCxnSpPr>
+            <p:nvPr/>
+          </p:nvCxnSpPr>
+          <p:spPr>
+            <a:xfrm rot="5400000">
+              <a:off x="2062649" y="1512526"/>
+              <a:ext cx="980107" cy="3048001"/>
+            </a:xfrm>
+            <a:prstGeom prst="bentConnector3">
+              <a:avLst/>
+            </a:prstGeom>
+            <a:ln w="38100">
+              <a:solidFill>
+                <a:srgbClr val="FFFF00"/>
+              </a:solidFill>
+              <a:headEnd type="none" w="med" len="med"/>
+              <a:tailEnd type="triangle" w="med" len="med"/>
+            </a:ln>
+          </p:spPr>
+          <p:style>
+            <a:lnRef idx="2">
+              <a:schemeClr val="accent1"/>
+            </a:lnRef>
+            <a:fillRef idx="0">
+              <a:schemeClr val="accent1"/>
+            </a:fillRef>
+            <a:effectRef idx="1">
+              <a:schemeClr val="accent1"/>
+            </a:effectRef>
+            <a:fontRef idx="minor">
+              <a:schemeClr val="tx1"/>
+            </a:fontRef>
+          </p:style>
+        </p:cxnSp>
+        <p:cxnSp>
+          <p:nvCxnSpPr>
+            <p:cNvPr id="38" name="מחבר חץ ישר 37">
+              <a:extLst>
+                <a:ext uri="{FF2B5EF4-FFF2-40B4-BE49-F238E27FC236}">
+                  <a16:creationId xmlns:a16="http://schemas.microsoft.com/office/drawing/2014/main" id="{A3FE7C96-7712-6088-1686-462364ADACB7}"/>
+                </a:ext>
+              </a:extLst>
+            </p:cNvPr>
+            <p:cNvCxnSpPr>
+              <a:cxnSpLocks/>
+            </p:cNvCxnSpPr>
+            <p:nvPr/>
+          </p:nvCxnSpPr>
+          <p:spPr>
+            <a:xfrm>
+              <a:off x="4343400" y="2546473"/>
+              <a:ext cx="0" cy="2198916"/>
+            </a:xfrm>
+            <a:prstGeom prst="straightConnector1">
+              <a:avLst/>
+            </a:prstGeom>
+            <a:ln w="38100">
+              <a:solidFill>
+                <a:schemeClr val="bg1"/>
+              </a:solidFill>
+              <a:headEnd type="triangle" w="med" len="med"/>
+              <a:tailEnd type="triangle" w="med" len="med"/>
+            </a:ln>
+          </p:spPr>
+          <p:style>
+            <a:lnRef idx="2">
+              <a:schemeClr val="accent1"/>
+            </a:lnRef>
+            <a:fillRef idx="0">
+              <a:schemeClr val="accent1"/>
+            </a:fillRef>
+            <a:effectRef idx="1">
+              <a:schemeClr val="accent1"/>
+            </a:effectRef>
+            <a:fontRef idx="minor">
+              <a:schemeClr val="tx1"/>
+            </a:fontRef>
+          </p:style>
+        </p:cxnSp>
+        <p:cxnSp>
+          <p:nvCxnSpPr>
+            <p:cNvPr id="41" name="מחבר חץ ישר 40">
+              <a:extLst>
+                <a:ext uri="{FF2B5EF4-FFF2-40B4-BE49-F238E27FC236}">
+                  <a16:creationId xmlns:a16="http://schemas.microsoft.com/office/drawing/2014/main" id="{06315BD0-16D6-4D51-28EF-0091B419B4C4}"/>
+                </a:ext>
+              </a:extLst>
+            </p:cNvPr>
+            <p:cNvCxnSpPr>
+              <a:cxnSpLocks/>
+            </p:cNvCxnSpPr>
+            <p:nvPr/>
+          </p:nvCxnSpPr>
+          <p:spPr>
+            <a:xfrm>
+              <a:off x="8650301" y="2546473"/>
+              <a:ext cx="0" cy="2014250"/>
+            </a:xfrm>
+            <a:prstGeom prst="straightConnector1">
+              <a:avLst/>
+            </a:prstGeom>
+            <a:ln w="38100">
+              <a:solidFill>
+                <a:schemeClr val="bg1"/>
+              </a:solidFill>
+              <a:headEnd type="triangle" w="med" len="med"/>
+              <a:tailEnd type="triangle" w="med" len="med"/>
+            </a:ln>
+          </p:spPr>
+          <p:style>
+            <a:lnRef idx="2">
+              <a:schemeClr val="accent1"/>
+            </a:lnRef>
+            <a:fillRef idx="0">
+              <a:schemeClr val="accent1"/>
+            </a:fillRef>
+            <a:effectRef idx="1">
+              <a:schemeClr val="accent1"/>
+            </a:effectRef>
+            <a:fontRef idx="minor">
+              <a:schemeClr val="tx1"/>
+            </a:fontRef>
+          </p:style>
+        </p:cxnSp>
+        <p:cxnSp>
+          <p:nvCxnSpPr>
+            <p:cNvPr id="43" name="מחבר: מרפקי 42">
+              <a:extLst>
+                <a:ext uri="{FF2B5EF4-FFF2-40B4-BE49-F238E27FC236}">
+                  <a16:creationId xmlns:a16="http://schemas.microsoft.com/office/drawing/2014/main" id="{7A86D28B-C603-A0D2-23F7-0EAE41494598}"/>
+                </a:ext>
+              </a:extLst>
+            </p:cNvPr>
+            <p:cNvCxnSpPr>
+              <a:stCxn id="9" idx="2"/>
+              <a:endCxn id="8" idx="3"/>
+            </p:cNvCxnSpPr>
+            <p:nvPr/>
+          </p:nvCxnSpPr>
+          <p:spPr>
+            <a:xfrm rot="5400000">
+              <a:off x="7083291" y="2179667"/>
+              <a:ext cx="1046204" cy="1779816"/>
+            </a:xfrm>
+            <a:prstGeom prst="bentConnector2">
+              <a:avLst/>
+            </a:prstGeom>
+            <a:ln w="38100">
+              <a:solidFill>
+                <a:schemeClr val="bg1"/>
+              </a:solidFill>
+              <a:headEnd type="triangle" w="med" len="med"/>
+              <a:tailEnd type="triangle" w="med" len="med"/>
+            </a:ln>
+          </p:spPr>
+          <p:style>
+            <a:lnRef idx="2">
+              <a:schemeClr val="accent1"/>
+            </a:lnRef>
+            <a:fillRef idx="0">
+              <a:schemeClr val="accent1"/>
+            </a:fillRef>
+            <a:effectRef idx="1">
+              <a:schemeClr val="accent1"/>
+            </a:effectRef>
+            <a:fontRef idx="minor">
+              <a:schemeClr val="tx1"/>
+            </a:fontRef>
+          </p:style>
+        </p:cxnSp>
+        <p:cxnSp>
+          <p:nvCxnSpPr>
+            <p:cNvPr id="45" name="מחבר: מרפקי 44">
+              <a:extLst>
+                <a:ext uri="{FF2B5EF4-FFF2-40B4-BE49-F238E27FC236}">
+                  <a16:creationId xmlns:a16="http://schemas.microsoft.com/office/drawing/2014/main" id="{E20D5799-8D30-F80C-067F-A0CF249AB6D5}"/>
+                </a:ext>
+              </a:extLst>
+            </p:cNvPr>
+            <p:cNvCxnSpPr>
+              <a:cxnSpLocks/>
+              <a:stCxn id="10" idx="3"/>
+              <a:endCxn id="8" idx="0"/>
+            </p:cNvCxnSpPr>
+            <p:nvPr/>
+          </p:nvCxnSpPr>
+          <p:spPr>
+            <a:xfrm>
+              <a:off x="4887688" y="2361807"/>
+              <a:ext cx="1208312" cy="1046204"/>
+            </a:xfrm>
+            <a:prstGeom prst="bentConnector2">
+              <a:avLst/>
+            </a:prstGeom>
+            <a:ln w="38100">
+              <a:solidFill>
+                <a:schemeClr val="bg1"/>
+              </a:solidFill>
+              <a:headEnd type="triangle" w="med" len="med"/>
+              <a:tailEnd type="triangle" w="med" len="med"/>
+            </a:ln>
+          </p:spPr>
+          <p:style>
+            <a:lnRef idx="2">
+              <a:schemeClr val="accent1"/>
+            </a:lnRef>
+            <a:fillRef idx="0">
+              <a:schemeClr val="accent1"/>
+            </a:fillRef>
+            <a:effectRef idx="1">
+              <a:schemeClr val="accent1"/>
+            </a:effectRef>
+            <a:fontRef idx="minor">
+              <a:schemeClr val="tx1"/>
+            </a:fontRef>
+          </p:style>
+        </p:cxnSp>
+        <p:cxnSp>
+          <p:nvCxnSpPr>
+            <p:cNvPr id="48" name="מחבר חץ ישר 47">
+              <a:extLst>
+                <a:ext uri="{FF2B5EF4-FFF2-40B4-BE49-F238E27FC236}">
+                  <a16:creationId xmlns:a16="http://schemas.microsoft.com/office/drawing/2014/main" id="{834A0C56-BFC2-64BD-81FC-9E228B5A0DC2}"/>
+                </a:ext>
+              </a:extLst>
+            </p:cNvPr>
+            <p:cNvCxnSpPr>
+              <a:stCxn id="7" idx="2"/>
+            </p:cNvCxnSpPr>
+            <p:nvPr/>
+          </p:nvCxnSpPr>
+          <p:spPr>
+            <a:xfrm flipH="1">
+              <a:off x="5943599" y="1720334"/>
+              <a:ext cx="1" cy="1708666"/>
+            </a:xfrm>
+            <a:prstGeom prst="straightConnector1">
+              <a:avLst/>
+            </a:prstGeom>
+            <a:ln w="38100">
+              <a:solidFill>
+                <a:schemeClr val="bg1"/>
+              </a:solidFill>
+              <a:headEnd type="triangle" w="med" len="med"/>
+              <a:tailEnd type="triangle" w="med" len="med"/>
+            </a:ln>
+          </p:spPr>
+          <p:style>
+            <a:lnRef idx="2">
+              <a:schemeClr val="accent1"/>
+            </a:lnRef>
+            <a:fillRef idx="0">
+              <a:schemeClr val="accent1"/>
+            </a:fillRef>
+            <a:effectRef idx="1">
+              <a:schemeClr val="accent1"/>
+            </a:effectRef>
+            <a:fontRef idx="minor">
+              <a:schemeClr val="tx1"/>
+            </a:fontRef>
+          </p:style>
+        </p:cxnSp>
+        <p:cxnSp>
+          <p:nvCxnSpPr>
+            <p:cNvPr id="50" name="מחבר: מרפקי 49">
+              <a:extLst>
+                <a:ext uri="{FF2B5EF4-FFF2-40B4-BE49-F238E27FC236}">
+                  <a16:creationId xmlns:a16="http://schemas.microsoft.com/office/drawing/2014/main" id="{35E44E94-FD3C-7C78-2B67-E4E9B2003352}"/>
+                </a:ext>
+              </a:extLst>
+            </p:cNvPr>
+            <p:cNvCxnSpPr>
+              <a:cxnSpLocks/>
+            </p:cNvCxnSpPr>
+            <p:nvPr/>
+          </p:nvCxnSpPr>
+          <p:spPr>
+            <a:xfrm rot="10800000" flipV="1">
+              <a:off x="3733802" y="1409700"/>
+              <a:ext cx="1589312" cy="719142"/>
+            </a:xfrm>
+            <a:prstGeom prst="bentConnector3">
+              <a:avLst>
+                <a:gd name="adj1" fmla="val 99810"/>
+              </a:avLst>
+            </a:prstGeom>
+            <a:ln w="38100">
+              <a:solidFill>
+                <a:srgbClr val="FFFF00"/>
+              </a:solidFill>
+              <a:tailEnd type="triangle"/>
+            </a:ln>
+          </p:spPr>
+          <p:style>
+            <a:lnRef idx="2">
+              <a:schemeClr val="accent1"/>
+            </a:lnRef>
+            <a:fillRef idx="0">
+              <a:schemeClr val="accent1"/>
+            </a:fillRef>
+            <a:effectRef idx="1">
+              <a:schemeClr val="accent1"/>
+            </a:effectRef>
+            <a:fontRef idx="minor">
+              <a:schemeClr val="tx1"/>
+            </a:fontRef>
+          </p:style>
+        </p:cxnSp>
+        <p:cxnSp>
+          <p:nvCxnSpPr>
+            <p:cNvPr id="57" name="מחבר חץ ישר 56">
+              <a:extLst>
+                <a:ext uri="{FF2B5EF4-FFF2-40B4-BE49-F238E27FC236}">
+                  <a16:creationId xmlns:a16="http://schemas.microsoft.com/office/drawing/2014/main" id="{F0FF6FD7-05BC-AC51-29C5-8682ABD66BF5}"/>
+                </a:ext>
+              </a:extLst>
+            </p:cNvPr>
+            <p:cNvCxnSpPr>
+              <a:cxnSpLocks/>
+            </p:cNvCxnSpPr>
+            <p:nvPr/>
+          </p:nvCxnSpPr>
+          <p:spPr>
+            <a:xfrm flipH="1">
+              <a:off x="4887688" y="2255982"/>
+              <a:ext cx="2797627" cy="0"/>
+            </a:xfrm>
+            <a:prstGeom prst="straightConnector1">
+              <a:avLst/>
+            </a:prstGeom>
+            <a:ln w="38100">
+              <a:solidFill>
+                <a:schemeClr val="bg1"/>
+              </a:solidFill>
+              <a:headEnd type="triangle" w="med" len="med"/>
+              <a:tailEnd type="triangle" w="med" len="med"/>
+            </a:ln>
+          </p:spPr>
+          <p:style>
+            <a:lnRef idx="2">
+              <a:schemeClr val="accent1"/>
+            </a:lnRef>
+            <a:fillRef idx="0">
+              <a:schemeClr val="accent1"/>
+            </a:fillRef>
+            <a:effectRef idx="1">
+              <a:schemeClr val="accent1"/>
+            </a:effectRef>
+            <a:fontRef idx="minor">
+              <a:schemeClr val="tx1"/>
+            </a:fontRef>
+          </p:style>
+        </p:cxnSp>
+        <p:cxnSp>
+          <p:nvCxnSpPr>
+            <p:cNvPr id="63" name="מחבר: מרפקי 62">
+              <a:extLst>
+                <a:ext uri="{FF2B5EF4-FFF2-40B4-BE49-F238E27FC236}">
+                  <a16:creationId xmlns:a16="http://schemas.microsoft.com/office/drawing/2014/main" id="{99DD2A86-D7A4-CC8D-45A4-CCF90CF02F3D}"/>
+                </a:ext>
+              </a:extLst>
+            </p:cNvPr>
+            <p:cNvCxnSpPr>
+              <a:stCxn id="8" idx="2"/>
+              <a:endCxn id="14" idx="1"/>
+            </p:cNvCxnSpPr>
+            <p:nvPr/>
+          </p:nvCxnSpPr>
+          <p:spPr>
+            <a:xfrm rot="16200000" flipH="1">
+              <a:off x="6406634" y="3466708"/>
+              <a:ext cx="968046" cy="1589315"/>
+            </a:xfrm>
+            <a:prstGeom prst="bentConnector2">
+              <a:avLst/>
+            </a:prstGeom>
+            <a:ln w="38100">
+              <a:solidFill>
+                <a:schemeClr val="bg1"/>
+              </a:solidFill>
+              <a:headEnd type="triangle" w="med" len="med"/>
+              <a:tailEnd type="triangle" w="med" len="med"/>
+            </a:ln>
+          </p:spPr>
+          <p:style>
+            <a:lnRef idx="2">
+              <a:schemeClr val="accent1"/>
+            </a:lnRef>
+            <a:fillRef idx="0">
+              <a:schemeClr val="accent1"/>
+            </a:fillRef>
+            <a:effectRef idx="1">
+              <a:schemeClr val="accent1"/>
+            </a:effectRef>
+            <a:fontRef idx="minor">
+              <a:schemeClr val="tx1"/>
+            </a:fontRef>
+          </p:style>
+        </p:cxnSp>
+      </p:grpSp>
+    </p:spTree>
+    <p:extLst>
+      <p:ext uri="{BB962C8B-B14F-4D97-AF65-F5344CB8AC3E}">
+        <p14:creationId xmlns:p14="http://schemas.microsoft.com/office/powerpoint/2010/main" val="3881991705"/>
+      </p:ext>
+    </p:extLst>
+  </p:cSld>
+  <p:clrMapOvr>
+    <a:masterClrMapping/>
+  </p:clrMapOvr>
+</p:sld>
+</file>
+
+<file path=ppt/slides/slide5.xml><?xml version="1.0" encoding="utf-8"?>
+<p:sld xmlns:a="http://schemas.openxmlformats.org/drawingml/2006/main" xmlns:r="http://schemas.openxmlformats.org/officeDocument/2006/relationships" xmlns:p="http://schemas.openxmlformats.org/presentationml/2006/main">
+  <p:cSld>
+    <p:spTree>
+      <p:nvGrpSpPr>
+        <p:cNvPr id="1" name=""/>
+        <p:cNvGrpSpPr/>
+        <p:nvPr/>
+      </p:nvGrpSpPr>
+      <p:grpSpPr>
+        <a:xfrm>
+          <a:off x="0" y="0"/>
+          <a:ext cx="0" cy="0"/>
+          <a:chOff x="0" y="0"/>
+          <a:chExt cx="0" cy="0"/>
+        </a:xfrm>
+      </p:grpSpPr>
       <p:sp>
         <p:nvSpPr>
-          <p:cNvPr id="4" name="תיבת טקסט 3">
-            <a:extLst>
-              <a:ext uri="{FF2B5EF4-FFF2-40B4-BE49-F238E27FC236}">
-                <a16:creationId xmlns:a16="http://schemas.microsoft.com/office/drawing/2014/main" id="{689438A8-ED50-ED10-07CE-750F637EB53F}"/>
-              </a:ext>
-            </a:extLst>
-          </p:cNvPr>
-          <p:cNvSpPr txBox="1"/>
-          <p:nvPr/>
+          <p:cNvPr id="3" name="מציין מיקום תוכן 2">
+            <a:extLst>
+              <a:ext uri="{FF2B5EF4-FFF2-40B4-BE49-F238E27FC236}">
+                <a16:creationId xmlns:a16="http://schemas.microsoft.com/office/drawing/2014/main" id="{FB5ACEDC-26A1-DB91-FD6E-FD639695737F}"/>
+              </a:ext>
+            </a:extLst>
+          </p:cNvPr>
+          <p:cNvSpPr>
+            <a:spLocks noGrp="1"/>
+          </p:cNvSpPr>
+          <p:nvPr>
+            <p:ph idx="1"/>
+          </p:nvPr>
         </p:nvSpPr>
         <p:spPr>
           <a:xfrm>
-            <a:off x="5529943" y="381000"/>
-            <a:ext cx="827314" cy="369332"/>
+            <a:off x="838200" y="1431925"/>
+            <a:ext cx="10515600" cy="1369432"/>
+          </a:xfrm>
+        </p:spPr>
+        <p:txBody>
+          <a:bodyPr/>
+          <a:lstStyle/>
+          <a:p>
+            <a:pPr marL="0" indent="0" algn="ctr">
+              <a:buNone/>
+            </a:pPr>
+            <a:r>
+              <a:rPr lang="en-US" sz="4400" b="1" dirty="0"/>
+              <a:t>David Ohhana</a:t>
+            </a:r>
+          </a:p>
+          <a:p>
+            <a:pPr marL="0" indent="0" algn="ctr">
+              <a:buNone/>
+            </a:pPr>
+            <a:r>
+              <a:rPr lang="en-US" dirty="0"/>
+              <a:t>software Engineer</a:t>
+            </a:r>
+            <a:endParaRPr lang="he-IL" dirty="0"/>
+          </a:p>
+        </p:txBody>
+      </p:sp>
+      <p:grpSp>
+        <p:nvGrpSpPr>
+          <p:cNvPr id="14" name="קבוצה 13">
+            <a:extLst>
+              <a:ext uri="{FF2B5EF4-FFF2-40B4-BE49-F238E27FC236}">
+                <a16:creationId xmlns:a16="http://schemas.microsoft.com/office/drawing/2014/main" id="{62660526-34EE-A1D8-2FB7-27742CAE94E9}"/>
+              </a:ext>
+            </a:extLst>
+          </p:cNvPr>
+          <p:cNvGrpSpPr/>
+          <p:nvPr/>
+        </p:nvGrpSpPr>
+        <p:grpSpPr>
+          <a:xfrm>
+            <a:off x="495836" y="1994421"/>
+            <a:ext cx="11445438" cy="2305050"/>
+            <a:chOff x="572036" y="2261121"/>
+            <a:chExt cx="11445438" cy="2305050"/>
+          </a:xfrm>
+        </p:grpSpPr>
+        <p:pic>
+          <p:nvPicPr>
+            <p:cNvPr id="5" name="תמונה 4" descr="תמונה שמכילה גרפיקה, עיצוב גרפי, איור, עיצוב&#10;&#10;תוכן שנוצר על-ידי בינה מלאכותית עשוי להיות שגוי.">
+              <a:extLst>
+                <a:ext uri="{FF2B5EF4-FFF2-40B4-BE49-F238E27FC236}">
+                  <a16:creationId xmlns:a16="http://schemas.microsoft.com/office/drawing/2014/main" id="{8B8FA52B-6ECF-8A12-E34D-336189E2D39B}"/>
+                </a:ext>
+              </a:extLst>
+            </p:cNvPr>
+            <p:cNvPicPr>
+              <a:picLocks noChangeAspect="1"/>
+            </p:cNvPicPr>
+            <p:nvPr/>
+          </p:nvPicPr>
+          <p:blipFill>
+            <a:blip r:embed="rId2">
+              <a:extLst>
+                <a:ext uri="{28A0092B-C50C-407E-A947-70E740481C1C}">
+                  <a14:useLocalDpi xmlns:a14="http://schemas.microsoft.com/office/drawing/2010/main" val="0"/>
+                </a:ext>
+              </a:extLst>
+            </a:blip>
+            <a:stretch>
+              <a:fillRect/>
+            </a:stretch>
+          </p:blipFill>
+          <p:spPr>
+            <a:xfrm>
+              <a:off x="572036" y="3099380"/>
+              <a:ext cx="1202314" cy="1030555"/>
+            </a:xfrm>
+            <a:prstGeom prst="rect">
+              <a:avLst/>
+            </a:prstGeom>
+          </p:spPr>
+        </p:pic>
+        <p:pic>
+          <p:nvPicPr>
+            <p:cNvPr id="6" name="תמונה 5" descr="תמונה שמכילה שחור, טקסט, גופן, גרפיקה&#10;&#10;תוכן שנוצר על-ידי בינה מלאכותית עשוי להיות שגוי.">
+              <a:extLst>
+                <a:ext uri="{FF2B5EF4-FFF2-40B4-BE49-F238E27FC236}">
+                  <a16:creationId xmlns:a16="http://schemas.microsoft.com/office/drawing/2014/main" id="{DC350619-8465-7E8F-2733-52ECBFBFB6CA}"/>
+                </a:ext>
+              </a:extLst>
+            </p:cNvPr>
+            <p:cNvPicPr>
+              <a:picLocks noChangeAspect="1"/>
+            </p:cNvPicPr>
+            <p:nvPr/>
+          </p:nvPicPr>
+          <p:blipFill>
+            <a:blip r:embed="rId3">
+              <a:extLst>
+                <a:ext uri="{28A0092B-C50C-407E-A947-70E740481C1C}">
+                  <a14:useLocalDpi xmlns:a14="http://schemas.microsoft.com/office/drawing/2010/main" val="0"/>
+                </a:ext>
+              </a:extLst>
+            </a:blip>
+            <a:stretch>
+              <a:fillRect/>
+            </a:stretch>
+          </p:blipFill>
+          <p:spPr>
+            <a:xfrm>
+              <a:off x="10312897" y="3099380"/>
+              <a:ext cx="1704577" cy="659240"/>
+            </a:xfrm>
+            <a:prstGeom prst="rect">
+              <a:avLst/>
+            </a:prstGeom>
+          </p:spPr>
+        </p:pic>
+        <p:pic>
+          <p:nvPicPr>
+            <p:cNvPr id="7" name="גרפיקה 6">
+              <a:extLst>
+                <a:ext uri="{FF2B5EF4-FFF2-40B4-BE49-F238E27FC236}">
+                  <a16:creationId xmlns:a16="http://schemas.microsoft.com/office/drawing/2014/main" id="{61122F40-C9DF-9881-E14B-6F848555AAC2}"/>
+                </a:ext>
+              </a:extLst>
+            </p:cNvPr>
+            <p:cNvPicPr>
+              <a:picLocks noChangeAspect="1"/>
+            </p:cNvPicPr>
+            <p:nvPr/>
+          </p:nvPicPr>
+          <p:blipFill>
+            <a:blip r:embed="rId4">
+              <a:extLst>
+                <a:ext uri="{96DAC541-7B7A-43D3-8B79-37D633B846F1}">
+                  <asvg:svgBlip xmlns:asvg="http://schemas.microsoft.com/office/drawing/2016/SVG/main" r:embed="rId5"/>
+                </a:ext>
+              </a:extLst>
+            </a:blip>
+            <a:stretch>
+              <a:fillRect/>
+            </a:stretch>
+          </p:blipFill>
+          <p:spPr>
+            <a:xfrm>
+              <a:off x="8711825" y="3155256"/>
+              <a:ext cx="1368855" cy="687849"/>
+            </a:xfrm>
+            <a:prstGeom prst="rect">
+              <a:avLst/>
+            </a:prstGeom>
+          </p:spPr>
+        </p:pic>
+        <p:pic>
+          <p:nvPicPr>
+            <p:cNvPr id="8" name="תמונה 7" descr="תמונה שמכילה אומנות קליפיפם, סמל, גרפיקה, סרט מצויר&#10;&#10;תוכן שנוצר על-ידי בינה מלאכותית עשוי להיות שגוי.">
+              <a:extLst>
+                <a:ext uri="{FF2B5EF4-FFF2-40B4-BE49-F238E27FC236}">
+                  <a16:creationId xmlns:a16="http://schemas.microsoft.com/office/drawing/2014/main" id="{6F80C501-F0DA-37F6-61B5-0561F2809D26}"/>
+                </a:ext>
+              </a:extLst>
+            </p:cNvPr>
+            <p:cNvPicPr>
+              <a:picLocks noChangeAspect="1"/>
+            </p:cNvPicPr>
+            <p:nvPr/>
+          </p:nvPicPr>
+          <p:blipFill>
+            <a:blip r:embed="rId6">
+              <a:extLst>
+                <a:ext uri="{28A0092B-C50C-407E-A947-70E740481C1C}">
+                  <a14:useLocalDpi xmlns:a14="http://schemas.microsoft.com/office/drawing/2010/main" val="0"/>
+                </a:ext>
+              </a:extLst>
+            </a:blip>
+            <a:stretch>
+              <a:fillRect/>
+            </a:stretch>
+          </p:blipFill>
+          <p:spPr>
+            <a:xfrm>
+              <a:off x="2133011" y="3159425"/>
+              <a:ext cx="749519" cy="822597"/>
+            </a:xfrm>
+            <a:prstGeom prst="rect">
+              <a:avLst/>
+            </a:prstGeom>
+          </p:spPr>
+        </p:pic>
+        <p:pic>
+          <p:nvPicPr>
+            <p:cNvPr id="10" name="תמונה 9" descr="תמונה שמכילה גופן, גרפיקה, לוגו, עיצוב גרפי&#10;&#10;תוכן שנוצר על-ידי בינה מלאכותית עשוי להיות שגוי.">
+              <a:extLst>
+                <a:ext uri="{FF2B5EF4-FFF2-40B4-BE49-F238E27FC236}">
+                  <a16:creationId xmlns:a16="http://schemas.microsoft.com/office/drawing/2014/main" id="{727353EB-1336-D108-A9D0-677DE4A086F4}"/>
+                </a:ext>
+              </a:extLst>
+            </p:cNvPr>
+            <p:cNvPicPr>
+              <a:picLocks noChangeAspect="1"/>
+            </p:cNvPicPr>
+            <p:nvPr/>
+          </p:nvPicPr>
+          <p:blipFill>
+            <a:blip r:embed="rId7">
+              <a:extLst>
+                <a:ext uri="{28A0092B-C50C-407E-A947-70E740481C1C}">
+                  <a14:useLocalDpi xmlns:a14="http://schemas.microsoft.com/office/drawing/2010/main" val="0"/>
+                </a:ext>
+              </a:extLst>
+            </a:blip>
+            <a:stretch>
+              <a:fillRect/>
+            </a:stretch>
+          </p:blipFill>
+          <p:spPr>
+            <a:xfrm>
+              <a:off x="6971419" y="3068057"/>
+              <a:ext cx="1508189" cy="791799"/>
+            </a:xfrm>
+            <a:prstGeom prst="rect">
+              <a:avLst/>
+            </a:prstGeom>
+          </p:spPr>
+        </p:pic>
+        <p:pic>
+          <p:nvPicPr>
+            <p:cNvPr id="11" name="תמונה 10" descr="תמונה שמכילה גרפיקה, גופן, עיצוב גרפי, לוגו&#10;&#10;תוכן שנוצר על-ידי בינה מלאכותית עשוי להיות שגוי.">
+              <a:extLst>
+                <a:ext uri="{FF2B5EF4-FFF2-40B4-BE49-F238E27FC236}">
+                  <a16:creationId xmlns:a16="http://schemas.microsoft.com/office/drawing/2014/main" id="{7EA46CE0-D5EC-ADC9-7077-19F54016F897}"/>
+                </a:ext>
+              </a:extLst>
+            </p:cNvPr>
+            <p:cNvPicPr>
+              <a:picLocks noChangeAspect="1"/>
+            </p:cNvPicPr>
+            <p:nvPr/>
+          </p:nvPicPr>
+          <p:blipFill>
+            <a:blip r:embed="rId8">
+              <a:extLst>
+                <a:ext uri="{28A0092B-C50C-407E-A947-70E740481C1C}">
+                  <a14:useLocalDpi xmlns:a14="http://schemas.microsoft.com/office/drawing/2010/main" val="0"/>
+                </a:ext>
+              </a:extLst>
+            </a:blip>
+            <a:stretch>
+              <a:fillRect/>
+            </a:stretch>
+          </p:blipFill>
+          <p:spPr>
+            <a:xfrm>
+              <a:off x="4781454" y="2261121"/>
+              <a:ext cx="2305050" cy="2305050"/>
+            </a:xfrm>
+            <a:prstGeom prst="rect">
+              <a:avLst/>
+            </a:prstGeom>
+          </p:spPr>
+        </p:pic>
+        <p:pic>
+          <p:nvPicPr>
+            <p:cNvPr id="12" name="תמונה 11" descr="תמונה שמכילה לוגו, גרפיקה, גופן, צילום מסך&#10;&#10;תוכן שנוצר על-ידי בינה מלאכותית עשוי להיות שגוי.">
+              <a:extLst>
+                <a:ext uri="{FF2B5EF4-FFF2-40B4-BE49-F238E27FC236}">
+                  <a16:creationId xmlns:a16="http://schemas.microsoft.com/office/drawing/2014/main" id="{823357BC-6B4C-621B-8352-731D1C4350E9}"/>
+                </a:ext>
+              </a:extLst>
+            </p:cNvPr>
+            <p:cNvPicPr>
+              <a:picLocks noChangeAspect="1"/>
+            </p:cNvPicPr>
+            <p:nvPr/>
+          </p:nvPicPr>
+          <p:blipFill>
+            <a:blip r:embed="rId9">
+              <a:extLst>
+                <a:ext uri="{28A0092B-C50C-407E-A947-70E740481C1C}">
+                  <a14:useLocalDpi xmlns:a14="http://schemas.microsoft.com/office/drawing/2010/main" val="0"/>
+                </a:ext>
+              </a:extLst>
+            </a:blip>
+            <a:stretch>
+              <a:fillRect/>
+            </a:stretch>
+          </p:blipFill>
+          <p:spPr>
+            <a:xfrm>
+              <a:off x="2850333" y="3086051"/>
+              <a:ext cx="1372864" cy="915243"/>
+            </a:xfrm>
+            <a:prstGeom prst="rect">
+              <a:avLst/>
+            </a:prstGeom>
+          </p:spPr>
+        </p:pic>
+        <p:pic>
+          <p:nvPicPr>
+            <p:cNvPr id="13" name="תמונה 12" descr="תמונה שמכילה גרפיקה, גופן, אומנות קליפיפם, סמל&#10;&#10;תוכן שנוצר על-ידי בינה מלאכותית עשוי להיות שגוי.">
+              <a:extLst>
+                <a:ext uri="{FF2B5EF4-FFF2-40B4-BE49-F238E27FC236}">
+                  <a16:creationId xmlns:a16="http://schemas.microsoft.com/office/drawing/2014/main" id="{A39D921B-CE9D-64B0-3301-2B619B65C67A}"/>
+                </a:ext>
+              </a:extLst>
+            </p:cNvPr>
+            <p:cNvPicPr>
+              <a:picLocks noChangeAspect="1"/>
+            </p:cNvPicPr>
+            <p:nvPr/>
+          </p:nvPicPr>
+          <p:blipFill>
+            <a:blip r:embed="rId10">
+              <a:extLst>
+                <a:ext uri="{28A0092B-C50C-407E-A947-70E740481C1C}">
+                  <a14:useLocalDpi xmlns:a14="http://schemas.microsoft.com/office/drawing/2010/main" val="0"/>
+                </a:ext>
+              </a:extLst>
+            </a:blip>
+            <a:stretch>
+              <a:fillRect/>
+            </a:stretch>
+          </p:blipFill>
+          <p:spPr>
+            <a:xfrm>
+              <a:off x="4175983" y="3142184"/>
+              <a:ext cx="1028699" cy="1030556"/>
+            </a:xfrm>
+            <a:prstGeom prst="rect">
+              <a:avLst/>
+            </a:prstGeom>
+          </p:spPr>
+        </p:pic>
+      </p:grpSp>
+      <p:pic>
+        <p:nvPicPr>
+          <p:cNvPr id="22" name="תמונה 21">
+            <a:extLst>
+              <a:ext uri="{FF2B5EF4-FFF2-40B4-BE49-F238E27FC236}">
+                <a16:creationId xmlns:a16="http://schemas.microsoft.com/office/drawing/2014/main" id="{9FB4088E-CFF9-B962-0156-3C2135EF1599}"/>
+              </a:ext>
+            </a:extLst>
+          </p:cNvPr>
+          <p:cNvPicPr>
+            <a:picLocks noChangeAspect="1"/>
+          </p:cNvPicPr>
+          <p:nvPr/>
+        </p:nvPicPr>
+        <p:blipFill>
+          <a:blip r:embed="rId11">
+            <a:extLst>
+              <a:ext uri="{28A0092B-C50C-407E-A947-70E740481C1C}">
+                <a14:useLocalDpi xmlns:a14="http://schemas.microsoft.com/office/drawing/2010/main" val="0"/>
+              </a:ext>
+            </a:extLst>
+          </a:blip>
+          <a:stretch>
+            <a:fillRect/>
+          </a:stretch>
+        </p:blipFill>
+        <p:spPr>
+          <a:xfrm>
+            <a:off x="2704159" y="4335662"/>
+            <a:ext cx="1442838" cy="1442838"/>
           </a:xfrm>
           <a:prstGeom prst="rect">
             <a:avLst/>
           </a:prstGeom>
-          <a:noFill/>
-          <a:ln>
-            <a:solidFill>
-              <a:schemeClr val="bg1"/>
-            </a:solidFill>
-          </a:ln>
         </p:spPr>
-        <p:txBody>
-          <a:bodyPr wrap="square" rtlCol="1">
-            <a:spAutoFit/>
-          </a:bodyPr>
-          <a:lstStyle/>
-          <a:p>
-            <a:r>
-              <a:rPr lang="en-US" dirty="0">
-                <a:solidFill>
-                  <a:schemeClr val="bg1"/>
-                </a:solidFill>
-              </a:rPr>
-              <a:t>client</a:t>
-            </a:r>
-            <a:endParaRPr lang="he-IL" dirty="0">
-              <a:solidFill>
-                <a:schemeClr val="bg1"/>
-              </a:solidFill>
-            </a:endParaRPr>
-          </a:p>
-        </p:txBody>
-      </p:sp>
-      <p:sp>
-        <p:nvSpPr>
-          <p:cNvPr id="7" name="תיבת טקסט 6">
-            <a:extLst>
-              <a:ext uri="{FF2B5EF4-FFF2-40B4-BE49-F238E27FC236}">
-                <a16:creationId xmlns:a16="http://schemas.microsoft.com/office/drawing/2014/main" id="{600B49A2-2B31-E98A-2122-E8D2D9F2D6BF}"/>
-              </a:ext>
-            </a:extLst>
-          </p:cNvPr>
-          <p:cNvSpPr txBox="1"/>
+      </p:pic>
+      <p:pic>
+        <p:nvPicPr>
+          <p:cNvPr id="26" name="תמונה 25">
+            <a:extLst>
+              <a:ext uri="{FF2B5EF4-FFF2-40B4-BE49-F238E27FC236}">
+                <a16:creationId xmlns:a16="http://schemas.microsoft.com/office/drawing/2014/main" id="{7B2E2827-C5BD-E379-24F8-AA777EBA5E11}"/>
+              </a:ext>
+            </a:extLst>
+          </p:cNvPr>
+          <p:cNvPicPr>
+            <a:picLocks noChangeAspect="1"/>
+          </p:cNvPicPr>
           <p:nvPr/>
-        </p:nvSpPr>
+        </p:nvPicPr>
+        <p:blipFill>
+          <a:blip r:embed="rId12">
+            <a:extLst>
+              <a:ext uri="{28A0092B-C50C-407E-A947-70E740481C1C}">
+                <a14:useLocalDpi xmlns:a14="http://schemas.microsoft.com/office/drawing/2010/main" val="0"/>
+              </a:ext>
+            </a:extLst>
+          </a:blip>
+          <a:stretch>
+            <a:fillRect/>
+          </a:stretch>
+        </p:blipFill>
         <p:spPr>
           <a:xfrm>
-            <a:off x="5323114" y="1351002"/>
-            <a:ext cx="1240971" cy="369332"/>
+            <a:off x="5242685" y="4335662"/>
+            <a:ext cx="1442838" cy="1442838"/>
           </a:xfrm>
           <a:prstGeom prst="rect">
             <a:avLst/>
           </a:prstGeom>
-          <a:noFill/>
-          <a:ln>
-            <a:solidFill>
-              <a:schemeClr val="bg1"/>
-            </a:solidFill>
-          </a:ln>
         </p:spPr>
-        <p:txBody>
-          <a:bodyPr wrap="square" rtlCol="1">
-            <a:spAutoFit/>
-          </a:bodyPr>
-          <a:lstStyle/>
-          <a:p>
-            <a:r>
-              <a:rPr lang="en-US" dirty="0">
-                <a:solidFill>
-                  <a:schemeClr val="bg1"/>
-                </a:solidFill>
-              </a:rPr>
-              <a:t>gateway</a:t>
-            </a:r>
-            <a:endParaRPr lang="he-IL" dirty="0">
-              <a:solidFill>
-                <a:schemeClr val="bg1"/>
-              </a:solidFill>
-            </a:endParaRPr>
-          </a:p>
-        </p:txBody>
-      </p:sp>
-      <p:sp>
-        <p:nvSpPr>
-          <p:cNvPr id="8" name="תיבת טקסט 7">
-            <a:extLst>
-              <a:ext uri="{FF2B5EF4-FFF2-40B4-BE49-F238E27FC236}">
-                <a16:creationId xmlns:a16="http://schemas.microsoft.com/office/drawing/2014/main" id="{5EE30E74-A01C-6EFC-77D9-3AFF059C8667}"/>
-              </a:ext>
-            </a:extLst>
-          </p:cNvPr>
-          <p:cNvSpPr txBox="1"/>
+      </p:pic>
+      <p:pic>
+        <p:nvPicPr>
+          <p:cNvPr id="28" name="תמונה 27">
+            <a:extLst>
+              <a:ext uri="{FF2B5EF4-FFF2-40B4-BE49-F238E27FC236}">
+                <a16:creationId xmlns:a16="http://schemas.microsoft.com/office/drawing/2014/main" id="{D7A746C1-A2B3-38F8-C174-3495C5D1D2FB}"/>
+              </a:ext>
+            </a:extLst>
+          </p:cNvPr>
+          <p:cNvPicPr>
+            <a:picLocks noChangeAspect="1"/>
+          </p:cNvPicPr>
           <p:nvPr/>
-        </p:nvSpPr>
+        </p:nvPicPr>
+        <p:blipFill>
+          <a:blip r:embed="rId13">
+            <a:extLst>
+              <a:ext uri="{28A0092B-C50C-407E-A947-70E740481C1C}">
+                <a14:useLocalDpi xmlns:a14="http://schemas.microsoft.com/office/drawing/2010/main" val="0"/>
+              </a:ext>
+            </a:extLst>
+          </a:blip>
+          <a:stretch>
+            <a:fillRect/>
+          </a:stretch>
+        </p:blipFill>
         <p:spPr>
           <a:xfrm>
-            <a:off x="5475514" y="3408011"/>
-            <a:ext cx="1240971" cy="369332"/>
+            <a:off x="7830327" y="4335662"/>
+            <a:ext cx="1442838" cy="1442838"/>
           </a:xfrm>
           <a:prstGeom prst="rect">
             <a:avLst/>
           </a:prstGeom>
-          <a:noFill/>
-          <a:ln>
-            <a:solidFill>
-              <a:schemeClr val="bg1"/>
-            </a:solidFill>
-          </a:ln>
         </p:spPr>
-        <p:txBody>
-          <a:bodyPr wrap="square" rtlCol="1">
-            <a:spAutoFit/>
-          </a:bodyPr>
-          <a:lstStyle/>
-          <a:p>
-            <a:r>
-              <a:rPr lang="en-US" dirty="0" err="1">
-                <a:solidFill>
-                  <a:schemeClr val="bg1"/>
-                </a:solidFill>
-              </a:rPr>
-              <a:t>KeyCloak</a:t>
-            </a:r>
-            <a:endParaRPr lang="he-IL" dirty="0">
-              <a:solidFill>
-                <a:schemeClr val="bg1"/>
-              </a:solidFill>
-            </a:endParaRPr>
-          </a:p>
-        </p:txBody>
-      </p:sp>
-      <p:sp>
-        <p:nvSpPr>
-          <p:cNvPr id="9" name="תיבת טקסט 8">
-            <a:extLst>
-              <a:ext uri="{FF2B5EF4-FFF2-40B4-BE49-F238E27FC236}">
-                <a16:creationId xmlns:a16="http://schemas.microsoft.com/office/drawing/2014/main" id="{8A9E5B92-69EF-8F39-C740-F69488913BE9}"/>
-              </a:ext>
-            </a:extLst>
-          </p:cNvPr>
-          <p:cNvSpPr txBox="1"/>
+      </p:pic>
+      <p:pic>
+        <p:nvPicPr>
+          <p:cNvPr id="29" name="תמונה 28" descr="תמונה שמכילה גרפיקה, לוגו, עיצוב גרפי, צילום מסך&#10;&#10;תוכן שנוצר על-ידי בינה מלאכותית עשוי להיות שגוי.">
+            <a:extLst>
+              <a:ext uri="{FF2B5EF4-FFF2-40B4-BE49-F238E27FC236}">
+                <a16:creationId xmlns:a16="http://schemas.microsoft.com/office/drawing/2014/main" id="{5372765B-04DB-19DD-442F-0B5F8608BB4F}"/>
+              </a:ext>
+            </a:extLst>
+          </p:cNvPr>
+          <p:cNvPicPr>
+            <a:picLocks noChangeAspect="1"/>
+          </p:cNvPicPr>
           <p:nvPr/>
-        </p:nvSpPr>
+        </p:nvPicPr>
+        <p:blipFill>
+          <a:blip r:embed="rId14">
+            <a:extLst>
+              <a:ext uri="{28A0092B-C50C-407E-A947-70E740481C1C}">
+                <a14:useLocalDpi xmlns:a14="http://schemas.microsoft.com/office/drawing/2010/main" val="0"/>
+              </a:ext>
+            </a:extLst>
+          </a:blip>
+          <a:stretch>
+            <a:fillRect/>
+          </a:stretch>
+        </p:blipFill>
         <p:spPr>
           <a:xfrm>
-            <a:off x="7685315" y="2177141"/>
-            <a:ext cx="1621972" cy="369332"/>
+            <a:off x="9780620" y="-125380"/>
+            <a:ext cx="1875258" cy="1875258"/>
           </a:xfrm>
           <a:prstGeom prst="rect">
             <a:avLst/>
           </a:prstGeom>
-          <a:noFill/>
-          <a:ln>
-            <a:solidFill>
-              <a:schemeClr val="bg1"/>
-            </a:solidFill>
-          </a:ln>
         </p:spPr>
-        <p:txBody>
-          <a:bodyPr wrap="square" rtlCol="1">
-            <a:spAutoFit/>
-          </a:bodyPr>
-          <a:lstStyle/>
-          <a:p>
-            <a:r>
-              <a:rPr lang="en-US" dirty="0">
-                <a:solidFill>
-                  <a:schemeClr val="bg1"/>
-                </a:solidFill>
-              </a:rPr>
-              <a:t>Data Manager</a:t>
-            </a:r>
-            <a:endParaRPr lang="he-IL" dirty="0">
-              <a:solidFill>
-                <a:schemeClr val="bg1"/>
-              </a:solidFill>
-            </a:endParaRPr>
-          </a:p>
-        </p:txBody>
-      </p:sp>
-      <p:sp>
-        <p:nvSpPr>
-          <p:cNvPr id="10" name="תיבת טקסט 9">
-            <a:extLst>
-              <a:ext uri="{FF2B5EF4-FFF2-40B4-BE49-F238E27FC236}">
-                <a16:creationId xmlns:a16="http://schemas.microsoft.com/office/drawing/2014/main" id="{DF24775D-FC8E-AAFF-38A2-DF9C7253E561}"/>
-              </a:ext>
-            </a:extLst>
-          </p:cNvPr>
-          <p:cNvSpPr txBox="1"/>
-          <p:nvPr/>
-        </p:nvSpPr>
-        <p:spPr>
-          <a:xfrm>
-            <a:off x="3265716" y="2177141"/>
-            <a:ext cx="1621972" cy="369332"/>
-          </a:xfrm>
-          <a:prstGeom prst="rect">
-            <a:avLst/>
-          </a:prstGeom>
-          <a:noFill/>
-          <a:ln>
-            <a:solidFill>
-              <a:schemeClr val="bg1"/>
-            </a:solidFill>
-          </a:ln>
-        </p:spPr>
-        <p:txBody>
-          <a:bodyPr wrap="square" rtlCol="1">
-            <a:spAutoFit/>
-          </a:bodyPr>
-          <a:lstStyle/>
-          <a:p>
-            <a:r>
-              <a:rPr lang="en-US" dirty="0">
-                <a:solidFill>
-                  <a:schemeClr val="bg1"/>
-                </a:solidFill>
-              </a:rPr>
-              <a:t>News Manger</a:t>
-            </a:r>
-            <a:endParaRPr lang="he-IL" dirty="0">
-              <a:solidFill>
-                <a:schemeClr val="bg1"/>
-              </a:solidFill>
-            </a:endParaRPr>
-          </a:p>
-        </p:txBody>
-      </p:sp>
-      <p:sp>
-        <p:nvSpPr>
-          <p:cNvPr id="11" name="תיבת טקסט 10">
-            <a:extLst>
-              <a:ext uri="{FF2B5EF4-FFF2-40B4-BE49-F238E27FC236}">
-                <a16:creationId xmlns:a16="http://schemas.microsoft.com/office/drawing/2014/main" id="{FCE839A2-42CF-0AD9-B8E7-A66A3766C685}"/>
-              </a:ext>
-            </a:extLst>
-          </p:cNvPr>
-          <p:cNvSpPr txBox="1"/>
-          <p:nvPr/>
-        </p:nvSpPr>
-        <p:spPr>
-          <a:xfrm>
-            <a:off x="217715" y="3526580"/>
-            <a:ext cx="1621972" cy="369332"/>
-          </a:xfrm>
-          <a:prstGeom prst="rect">
-            <a:avLst/>
-          </a:prstGeom>
-          <a:noFill/>
-          <a:ln>
-            <a:solidFill>
-              <a:schemeClr val="bg1"/>
-            </a:solidFill>
-          </a:ln>
-        </p:spPr>
-        <p:txBody>
-          <a:bodyPr wrap="square" rtlCol="1">
-            <a:spAutoFit/>
-          </a:bodyPr>
-          <a:lstStyle/>
-          <a:p>
-            <a:r>
-              <a:rPr lang="en-US" dirty="0">
-                <a:solidFill>
-                  <a:schemeClr val="bg1"/>
-                </a:solidFill>
-              </a:rPr>
-              <a:t>Notification</a:t>
-            </a:r>
-            <a:endParaRPr lang="he-IL" dirty="0">
-              <a:solidFill>
-                <a:schemeClr val="bg1"/>
-              </a:solidFill>
-            </a:endParaRPr>
-          </a:p>
-        </p:txBody>
-      </p:sp>
-      <p:sp>
-        <p:nvSpPr>
-          <p:cNvPr id="12" name="תיבת טקסט 11">
-            <a:extLst>
-              <a:ext uri="{FF2B5EF4-FFF2-40B4-BE49-F238E27FC236}">
-                <a16:creationId xmlns:a16="http://schemas.microsoft.com/office/drawing/2014/main" id="{CDC1B019-68F8-A173-3AA5-810EEEFDE367}"/>
-              </a:ext>
-            </a:extLst>
-          </p:cNvPr>
-          <p:cNvSpPr txBox="1"/>
-          <p:nvPr/>
-        </p:nvSpPr>
-        <p:spPr>
-          <a:xfrm>
-            <a:off x="217715" y="1351002"/>
-            <a:ext cx="1621972" cy="369332"/>
-          </a:xfrm>
-          <a:prstGeom prst="rect">
-            <a:avLst/>
-          </a:prstGeom>
-          <a:noFill/>
-          <a:ln>
-            <a:solidFill>
-              <a:schemeClr val="bg1"/>
-            </a:solidFill>
-          </a:ln>
-        </p:spPr>
-        <p:txBody>
-          <a:bodyPr wrap="square" rtlCol="1">
-            <a:spAutoFit/>
-          </a:bodyPr>
-          <a:lstStyle/>
-          <a:p>
-            <a:r>
-              <a:rPr lang="en-US" dirty="0">
-                <a:solidFill>
-                  <a:schemeClr val="bg1"/>
-                </a:solidFill>
-              </a:rPr>
-              <a:t>LLM</a:t>
-            </a:r>
-            <a:endParaRPr lang="he-IL" dirty="0">
-              <a:solidFill>
-                <a:schemeClr val="bg1"/>
-              </a:solidFill>
-            </a:endParaRPr>
-          </a:p>
-        </p:txBody>
-      </p:sp>
-      <p:sp>
-        <p:nvSpPr>
-          <p:cNvPr id="13" name="תיבת טקסט 12">
-            <a:extLst>
-              <a:ext uri="{FF2B5EF4-FFF2-40B4-BE49-F238E27FC236}">
-                <a16:creationId xmlns:a16="http://schemas.microsoft.com/office/drawing/2014/main" id="{CC35C9B3-CD42-02DF-852F-262A0EA4D065}"/>
-              </a:ext>
-            </a:extLst>
-          </p:cNvPr>
-          <p:cNvSpPr txBox="1"/>
-          <p:nvPr/>
-        </p:nvSpPr>
-        <p:spPr>
-          <a:xfrm>
-            <a:off x="3178630" y="4756666"/>
-            <a:ext cx="1621972" cy="369332"/>
-          </a:xfrm>
-          <a:prstGeom prst="rect">
-            <a:avLst/>
-          </a:prstGeom>
-          <a:noFill/>
-          <a:ln>
-            <a:solidFill>
-              <a:schemeClr val="bg1"/>
-            </a:solidFill>
-          </a:ln>
-        </p:spPr>
-        <p:txBody>
-          <a:bodyPr wrap="square" rtlCol="1">
-            <a:spAutoFit/>
-          </a:bodyPr>
-          <a:lstStyle/>
-          <a:p>
-            <a:r>
-              <a:rPr lang="en-US" dirty="0">
-                <a:solidFill>
-                  <a:schemeClr val="bg1"/>
-                </a:solidFill>
-              </a:rPr>
-              <a:t>NewsData.IO</a:t>
-            </a:r>
-            <a:endParaRPr lang="he-IL" dirty="0">
-              <a:solidFill>
-                <a:schemeClr val="bg1"/>
-              </a:solidFill>
-            </a:endParaRPr>
-          </a:p>
-        </p:txBody>
-      </p:sp>
-      <p:sp>
-        <p:nvSpPr>
-          <p:cNvPr id="14" name="תיבת טקסט 13">
-            <a:extLst>
-              <a:ext uri="{FF2B5EF4-FFF2-40B4-BE49-F238E27FC236}">
-                <a16:creationId xmlns:a16="http://schemas.microsoft.com/office/drawing/2014/main" id="{CB06557E-4AAF-9918-B3C0-1F91383041C1}"/>
-              </a:ext>
-            </a:extLst>
-          </p:cNvPr>
-          <p:cNvSpPr txBox="1"/>
-          <p:nvPr/>
-        </p:nvSpPr>
-        <p:spPr>
-          <a:xfrm>
-            <a:off x="7685315" y="4560723"/>
-            <a:ext cx="1621972" cy="369332"/>
-          </a:xfrm>
-          <a:prstGeom prst="rect">
-            <a:avLst/>
-          </a:prstGeom>
-          <a:noFill/>
-          <a:ln>
-            <a:solidFill>
-              <a:schemeClr val="bg1"/>
-            </a:solidFill>
-          </a:ln>
-        </p:spPr>
-        <p:txBody>
-          <a:bodyPr wrap="square" rtlCol="1">
-            <a:spAutoFit/>
-          </a:bodyPr>
-          <a:lstStyle/>
-          <a:p>
-            <a:r>
-              <a:rPr lang="en-US" dirty="0" err="1">
-                <a:solidFill>
-                  <a:schemeClr val="bg1"/>
-                </a:solidFill>
-              </a:rPr>
-              <a:t>PosrgreSql</a:t>
-            </a:r>
-            <a:endParaRPr lang="he-IL" dirty="0">
-              <a:solidFill>
-                <a:schemeClr val="bg1"/>
-              </a:solidFill>
-            </a:endParaRPr>
-          </a:p>
-        </p:txBody>
-      </p:sp>
-      <p:cxnSp>
-        <p:nvCxnSpPr>
-          <p:cNvPr id="16" name="מחבר חץ ישר 15">
-            <a:extLst>
-              <a:ext uri="{FF2B5EF4-FFF2-40B4-BE49-F238E27FC236}">
-                <a16:creationId xmlns:a16="http://schemas.microsoft.com/office/drawing/2014/main" id="{E33F0CFF-8903-7880-33A2-455F955D5C16}"/>
-              </a:ext>
-            </a:extLst>
-          </p:cNvPr>
-          <p:cNvCxnSpPr>
-            <a:stCxn id="4" idx="2"/>
-            <a:endCxn id="7" idx="0"/>
-          </p:cNvCxnSpPr>
-          <p:nvPr/>
-        </p:nvCxnSpPr>
-        <p:spPr>
-          <a:xfrm>
-            <a:off x="5943600" y="750332"/>
-            <a:ext cx="0" cy="600670"/>
-          </a:xfrm>
-          <a:prstGeom prst="straightConnector1">
-            <a:avLst/>
-          </a:prstGeom>
-          <a:ln w="38100">
-            <a:solidFill>
-              <a:schemeClr val="bg1"/>
-            </a:solidFill>
-            <a:headEnd type="triangle" w="med" len="med"/>
-            <a:tailEnd type="triangle" w="med" len="med"/>
-          </a:ln>
-        </p:spPr>
-        <p:style>
-          <a:lnRef idx="2">
-            <a:schemeClr val="accent1"/>
-          </a:lnRef>
-          <a:fillRef idx="0">
-            <a:schemeClr val="accent1"/>
-          </a:fillRef>
-          <a:effectRef idx="1">
-            <a:schemeClr val="accent1"/>
-          </a:effectRef>
-          <a:fontRef idx="minor">
-            <a:schemeClr val="tx1"/>
-          </a:fontRef>
-        </p:style>
-      </p:cxnSp>
-      <p:cxnSp>
-        <p:nvCxnSpPr>
-          <p:cNvPr id="22" name="מחבר: מרפקי 21">
-            <a:extLst>
-              <a:ext uri="{FF2B5EF4-FFF2-40B4-BE49-F238E27FC236}">
-                <a16:creationId xmlns:a16="http://schemas.microsoft.com/office/drawing/2014/main" id="{473E45F8-2CD2-A0CA-C862-B81B053C55EC}"/>
-              </a:ext>
-            </a:extLst>
-          </p:cNvPr>
-          <p:cNvCxnSpPr>
-            <a:cxnSpLocks/>
-            <a:stCxn id="7" idx="3"/>
-            <a:endCxn id="9" idx="0"/>
-          </p:cNvCxnSpPr>
-          <p:nvPr/>
-        </p:nvCxnSpPr>
-        <p:spPr>
-          <a:xfrm>
-            <a:off x="6564085" y="1535668"/>
-            <a:ext cx="1932216" cy="641473"/>
-          </a:xfrm>
-          <a:prstGeom prst="bentConnector2">
-            <a:avLst/>
-          </a:prstGeom>
-          <a:ln w="38100">
-            <a:solidFill>
-              <a:schemeClr val="bg1"/>
-            </a:solidFill>
-            <a:headEnd type="triangle" w="med" len="med"/>
-            <a:tailEnd type="triangle" w="med" len="med"/>
-          </a:ln>
-        </p:spPr>
-        <p:style>
-          <a:lnRef idx="2">
-            <a:schemeClr val="accent1"/>
-          </a:lnRef>
-          <a:fillRef idx="0">
-            <a:schemeClr val="accent1"/>
-          </a:fillRef>
-          <a:effectRef idx="1">
-            <a:schemeClr val="accent1"/>
-          </a:effectRef>
-          <a:fontRef idx="minor">
-            <a:schemeClr val="tx1"/>
-          </a:fontRef>
-        </p:style>
-      </p:cxnSp>
-      <p:cxnSp>
-        <p:nvCxnSpPr>
-          <p:cNvPr id="26" name="מחבר: מרפקי 25">
-            <a:extLst>
-              <a:ext uri="{FF2B5EF4-FFF2-40B4-BE49-F238E27FC236}">
-                <a16:creationId xmlns:a16="http://schemas.microsoft.com/office/drawing/2014/main" id="{ED5ED35D-A36D-A598-495C-81322244013D}"/>
-              </a:ext>
-            </a:extLst>
-          </p:cNvPr>
-          <p:cNvCxnSpPr>
-            <a:cxnSpLocks/>
-            <a:stCxn id="7" idx="1"/>
-            <a:endCxn id="10" idx="0"/>
-          </p:cNvCxnSpPr>
-          <p:nvPr/>
-        </p:nvCxnSpPr>
-        <p:spPr>
-          <a:xfrm rot="10800000" flipV="1">
-            <a:off x="4076702" y="1535667"/>
-            <a:ext cx="1246412" cy="641473"/>
-          </a:xfrm>
-          <a:prstGeom prst="bentConnector2">
-            <a:avLst/>
-          </a:prstGeom>
-          <a:ln w="38100">
-            <a:solidFill>
-              <a:schemeClr val="bg1"/>
-            </a:solidFill>
-            <a:headEnd type="triangle" w="med" len="med"/>
-            <a:tailEnd type="triangle" w="med" len="med"/>
-          </a:ln>
-        </p:spPr>
-        <p:style>
-          <a:lnRef idx="2">
-            <a:schemeClr val="accent1"/>
-          </a:lnRef>
-          <a:fillRef idx="0">
-            <a:schemeClr val="accent1"/>
-          </a:fillRef>
-          <a:effectRef idx="1">
-            <a:schemeClr val="accent1"/>
-          </a:effectRef>
-          <a:fontRef idx="minor">
-            <a:schemeClr val="tx1"/>
-          </a:fontRef>
-        </p:style>
-      </p:cxnSp>
-      <p:cxnSp>
-        <p:nvCxnSpPr>
-          <p:cNvPr id="32" name="מחבר: מרפקי 31">
-            <a:extLst>
-              <a:ext uri="{FF2B5EF4-FFF2-40B4-BE49-F238E27FC236}">
-                <a16:creationId xmlns:a16="http://schemas.microsoft.com/office/drawing/2014/main" id="{C7E943DF-F7E8-AA59-C342-4D09EF217373}"/>
-              </a:ext>
-            </a:extLst>
-          </p:cNvPr>
-          <p:cNvCxnSpPr>
-            <a:stCxn id="10" idx="1"/>
-            <a:endCxn id="12" idx="3"/>
-          </p:cNvCxnSpPr>
-          <p:nvPr/>
-        </p:nvCxnSpPr>
-        <p:spPr>
-          <a:xfrm rot="10800000">
-            <a:off x="1839688" y="1535669"/>
-            <a:ext cx="1426029" cy="826139"/>
-          </a:xfrm>
-          <a:prstGeom prst="bentConnector3">
-            <a:avLst/>
-          </a:prstGeom>
-          <a:ln w="38100">
-            <a:solidFill>
-              <a:srgbClr val="FFFF00"/>
-            </a:solidFill>
-            <a:headEnd type="triangle" w="med" len="med"/>
-            <a:tailEnd type="triangle" w="med" len="med"/>
-          </a:ln>
-        </p:spPr>
-        <p:style>
-          <a:lnRef idx="2">
-            <a:schemeClr val="accent1"/>
-          </a:lnRef>
-          <a:fillRef idx="0">
-            <a:schemeClr val="accent1"/>
-          </a:fillRef>
-          <a:effectRef idx="1">
-            <a:schemeClr val="accent1"/>
-          </a:effectRef>
-          <a:fontRef idx="minor">
-            <a:schemeClr val="tx1"/>
-          </a:fontRef>
-        </p:style>
-      </p:cxnSp>
-      <p:cxnSp>
-        <p:nvCxnSpPr>
-          <p:cNvPr id="36" name="מחבר: מרפקי 35">
-            <a:extLst>
-              <a:ext uri="{FF2B5EF4-FFF2-40B4-BE49-F238E27FC236}">
-                <a16:creationId xmlns:a16="http://schemas.microsoft.com/office/drawing/2014/main" id="{814C221D-73E3-23C9-39DB-3B275E6BC187}"/>
-              </a:ext>
-            </a:extLst>
-          </p:cNvPr>
-          <p:cNvCxnSpPr>
-            <a:stCxn id="10" idx="2"/>
-            <a:endCxn id="11" idx="0"/>
-          </p:cNvCxnSpPr>
-          <p:nvPr/>
-        </p:nvCxnSpPr>
-        <p:spPr>
-          <a:xfrm rot="5400000">
-            <a:off x="2062649" y="1512526"/>
-            <a:ext cx="980107" cy="3048001"/>
-          </a:xfrm>
-          <a:prstGeom prst="bentConnector3">
-            <a:avLst/>
-          </a:prstGeom>
-          <a:ln w="38100">
-            <a:solidFill>
-              <a:srgbClr val="FFFF00"/>
-            </a:solidFill>
-            <a:headEnd type="none" w="med" len="med"/>
-            <a:tailEnd type="triangle" w="med" len="med"/>
-          </a:ln>
-        </p:spPr>
-        <p:style>
-          <a:lnRef idx="2">
-            <a:schemeClr val="accent1"/>
-          </a:lnRef>
-          <a:fillRef idx="0">
-            <a:schemeClr val="accent1"/>
-          </a:fillRef>
-          <a:effectRef idx="1">
-            <a:schemeClr val="accent1"/>
-          </a:effectRef>
-          <a:fontRef idx="minor">
-            <a:schemeClr val="tx1"/>
-          </a:fontRef>
-        </p:style>
-      </p:cxnSp>
-      <p:cxnSp>
-        <p:nvCxnSpPr>
-          <p:cNvPr id="38" name="מחבר חץ ישר 37">
-            <a:extLst>
-              <a:ext uri="{FF2B5EF4-FFF2-40B4-BE49-F238E27FC236}">
-                <a16:creationId xmlns:a16="http://schemas.microsoft.com/office/drawing/2014/main" id="{A3FE7C96-7712-6088-1686-462364ADACB7}"/>
-              </a:ext>
-            </a:extLst>
-          </p:cNvPr>
-          <p:cNvCxnSpPr>
-            <a:cxnSpLocks/>
-          </p:cNvCxnSpPr>
-          <p:nvPr/>
-        </p:nvCxnSpPr>
-        <p:spPr>
-          <a:xfrm>
-            <a:off x="4343400" y="2546473"/>
-            <a:ext cx="0" cy="2198916"/>
-          </a:xfrm>
-          <a:prstGeom prst="straightConnector1">
-            <a:avLst/>
-          </a:prstGeom>
-          <a:ln w="38100">
-            <a:solidFill>
-              <a:schemeClr val="bg1"/>
-            </a:solidFill>
-            <a:headEnd type="triangle" w="med" len="med"/>
-            <a:tailEnd type="triangle" w="med" len="med"/>
-          </a:ln>
-        </p:spPr>
-        <p:style>
-          <a:lnRef idx="2">
-            <a:schemeClr val="accent1"/>
-          </a:lnRef>
-          <a:fillRef idx="0">
-            <a:schemeClr val="accent1"/>
-          </a:fillRef>
-          <a:effectRef idx="1">
-            <a:schemeClr val="accent1"/>
-          </a:effectRef>
-          <a:fontRef idx="minor">
-            <a:schemeClr val="tx1"/>
-          </a:fontRef>
-        </p:style>
-      </p:cxnSp>
-      <p:cxnSp>
-        <p:nvCxnSpPr>
-          <p:cNvPr id="41" name="מחבר חץ ישר 40">
-            <a:extLst>
-              <a:ext uri="{FF2B5EF4-FFF2-40B4-BE49-F238E27FC236}">
-                <a16:creationId xmlns:a16="http://schemas.microsoft.com/office/drawing/2014/main" id="{06315BD0-16D6-4D51-28EF-0091B419B4C4}"/>
-              </a:ext>
-            </a:extLst>
-          </p:cNvPr>
-          <p:cNvCxnSpPr>
-            <a:cxnSpLocks/>
-          </p:cNvCxnSpPr>
-          <p:nvPr/>
-        </p:nvCxnSpPr>
-        <p:spPr>
-          <a:xfrm>
-            <a:off x="8650301" y="2546473"/>
-            <a:ext cx="0" cy="2014250"/>
-          </a:xfrm>
-          <a:prstGeom prst="straightConnector1">
-            <a:avLst/>
-          </a:prstGeom>
-          <a:ln w="38100">
-            <a:solidFill>
-              <a:schemeClr val="bg1"/>
-            </a:solidFill>
-            <a:headEnd type="triangle" w="med" len="med"/>
-            <a:tailEnd type="triangle" w="med" len="med"/>
-          </a:ln>
-        </p:spPr>
-        <p:style>
-          <a:lnRef idx="2">
-            <a:schemeClr val="accent1"/>
-          </a:lnRef>
-          <a:fillRef idx="0">
-            <a:schemeClr val="accent1"/>
-          </a:fillRef>
-          <a:effectRef idx="1">
-            <a:schemeClr val="accent1"/>
-          </a:effectRef>
-          <a:fontRef idx="minor">
-            <a:schemeClr val="tx1"/>
-          </a:fontRef>
-        </p:style>
-      </p:cxnSp>
-      <p:cxnSp>
-        <p:nvCxnSpPr>
-          <p:cNvPr id="43" name="מחבר: מרפקי 42">
-            <a:extLst>
-              <a:ext uri="{FF2B5EF4-FFF2-40B4-BE49-F238E27FC236}">
-                <a16:creationId xmlns:a16="http://schemas.microsoft.com/office/drawing/2014/main" id="{7A86D28B-C603-A0D2-23F7-0EAE41494598}"/>
-              </a:ext>
-            </a:extLst>
-          </p:cNvPr>
-          <p:cNvCxnSpPr>
-            <a:stCxn id="9" idx="2"/>
-            <a:endCxn id="8" idx="3"/>
-          </p:cNvCxnSpPr>
-          <p:nvPr/>
-        </p:nvCxnSpPr>
-        <p:spPr>
-          <a:xfrm rot="5400000">
-            <a:off x="7083291" y="2179667"/>
-            <a:ext cx="1046204" cy="1779816"/>
-          </a:xfrm>
-          <a:prstGeom prst="bentConnector2">
-            <a:avLst/>
-          </a:prstGeom>
-          <a:ln w="38100">
-            <a:solidFill>
-              <a:schemeClr val="bg1"/>
-            </a:solidFill>
-            <a:headEnd type="triangle" w="med" len="med"/>
-            <a:tailEnd type="triangle" w="med" len="med"/>
-          </a:ln>
-        </p:spPr>
-        <p:style>
-          <a:lnRef idx="2">
-            <a:schemeClr val="accent1"/>
-          </a:lnRef>
-          <a:fillRef idx="0">
-            <a:schemeClr val="accent1"/>
-          </a:fillRef>
-          <a:effectRef idx="1">
-            <a:schemeClr val="accent1"/>
-          </a:effectRef>
-          <a:fontRef idx="minor">
-            <a:schemeClr val="tx1"/>
-          </a:fontRef>
-        </p:style>
-      </p:cxnSp>
-      <p:cxnSp>
-        <p:nvCxnSpPr>
-          <p:cNvPr id="45" name="מחבר: מרפקי 44">
-            <a:extLst>
-              <a:ext uri="{FF2B5EF4-FFF2-40B4-BE49-F238E27FC236}">
-                <a16:creationId xmlns:a16="http://schemas.microsoft.com/office/drawing/2014/main" id="{E20D5799-8D30-F80C-067F-A0CF249AB6D5}"/>
-              </a:ext>
-            </a:extLst>
-          </p:cNvPr>
-          <p:cNvCxnSpPr>
-            <a:cxnSpLocks/>
-            <a:stCxn id="10" idx="3"/>
-            <a:endCxn id="8" idx="0"/>
-          </p:cNvCxnSpPr>
-          <p:nvPr/>
-        </p:nvCxnSpPr>
-        <p:spPr>
-          <a:xfrm>
-            <a:off x="4887688" y="2361807"/>
-            <a:ext cx="1208312" cy="1046204"/>
-          </a:xfrm>
-          <a:prstGeom prst="bentConnector2">
-            <a:avLst/>
-          </a:prstGeom>
-          <a:ln w="38100">
-            <a:solidFill>
-              <a:schemeClr val="bg1"/>
-            </a:solidFill>
-            <a:headEnd type="triangle" w="med" len="med"/>
-            <a:tailEnd type="triangle" w="med" len="med"/>
-          </a:ln>
-        </p:spPr>
-        <p:style>
-          <a:lnRef idx="2">
-            <a:schemeClr val="accent1"/>
-          </a:lnRef>
-          <a:fillRef idx="0">
-            <a:schemeClr val="accent1"/>
-          </a:fillRef>
-          <a:effectRef idx="1">
-            <a:schemeClr val="accent1"/>
-          </a:effectRef>
-          <a:fontRef idx="minor">
-            <a:schemeClr val="tx1"/>
-          </a:fontRef>
-        </p:style>
-      </p:cxnSp>
-      <p:cxnSp>
-        <p:nvCxnSpPr>
-          <p:cNvPr id="48" name="מחבר חץ ישר 47">
-            <a:extLst>
-              <a:ext uri="{FF2B5EF4-FFF2-40B4-BE49-F238E27FC236}">
-                <a16:creationId xmlns:a16="http://schemas.microsoft.com/office/drawing/2014/main" id="{834A0C56-BFC2-64BD-81FC-9E228B5A0DC2}"/>
-              </a:ext>
-            </a:extLst>
-          </p:cNvPr>
-          <p:cNvCxnSpPr>
-            <a:stCxn id="7" idx="2"/>
-          </p:cNvCxnSpPr>
-          <p:nvPr/>
-        </p:nvCxnSpPr>
-        <p:spPr>
-          <a:xfrm flipH="1">
-            <a:off x="5943599" y="1720334"/>
-            <a:ext cx="1" cy="1708666"/>
-          </a:xfrm>
-          <a:prstGeom prst="straightConnector1">
-            <a:avLst/>
-          </a:prstGeom>
-          <a:ln w="38100">
-            <a:solidFill>
-              <a:schemeClr val="bg1"/>
-            </a:solidFill>
-            <a:headEnd type="triangle" w="med" len="med"/>
-            <a:tailEnd type="triangle" w="med" len="med"/>
-          </a:ln>
-        </p:spPr>
-        <p:style>
-          <a:lnRef idx="2">
-            <a:schemeClr val="accent1"/>
-          </a:lnRef>
-          <a:fillRef idx="0">
-            <a:schemeClr val="accent1"/>
-          </a:fillRef>
-          <a:effectRef idx="1">
-            <a:schemeClr val="accent1"/>
-          </a:effectRef>
-          <a:fontRef idx="minor">
-            <a:schemeClr val="tx1"/>
-          </a:fontRef>
-        </p:style>
-      </p:cxnSp>
-      <p:cxnSp>
-        <p:nvCxnSpPr>
-          <p:cNvPr id="50" name="מחבר: מרפקי 49">
-            <a:extLst>
-              <a:ext uri="{FF2B5EF4-FFF2-40B4-BE49-F238E27FC236}">
-                <a16:creationId xmlns:a16="http://schemas.microsoft.com/office/drawing/2014/main" id="{35E44E94-FD3C-7C78-2B67-E4E9B2003352}"/>
-              </a:ext>
-            </a:extLst>
-          </p:cNvPr>
-          <p:cNvCxnSpPr>
-            <a:cxnSpLocks/>
-          </p:cNvCxnSpPr>
-          <p:nvPr/>
-        </p:nvCxnSpPr>
-        <p:spPr>
-          <a:xfrm rot="10800000" flipV="1">
-            <a:off x="3733802" y="1409700"/>
-            <a:ext cx="1589312" cy="719142"/>
-          </a:xfrm>
-          <a:prstGeom prst="bentConnector3">
-            <a:avLst>
-              <a:gd name="adj1" fmla="val 99810"/>
-            </a:avLst>
-          </a:prstGeom>
-          <a:ln w="38100">
-            <a:solidFill>
-              <a:srgbClr val="FFFF00"/>
-            </a:solidFill>
-            <a:tailEnd type="triangle"/>
-          </a:ln>
-        </p:spPr>
-        <p:style>
-          <a:lnRef idx="2">
-            <a:schemeClr val="accent1"/>
-          </a:lnRef>
-          <a:fillRef idx="0">
-            <a:schemeClr val="accent1"/>
-          </a:fillRef>
-          <a:effectRef idx="1">
-            <a:schemeClr val="accent1"/>
-          </a:effectRef>
-          <a:fontRef idx="minor">
-            <a:schemeClr val="tx1"/>
-          </a:fontRef>
-        </p:style>
-      </p:cxnSp>
-      <p:cxnSp>
-        <p:nvCxnSpPr>
-          <p:cNvPr id="57" name="מחבר חץ ישר 56">
-            <a:extLst>
-              <a:ext uri="{FF2B5EF4-FFF2-40B4-BE49-F238E27FC236}">
-                <a16:creationId xmlns:a16="http://schemas.microsoft.com/office/drawing/2014/main" id="{F0FF6FD7-05BC-AC51-29C5-8682ABD66BF5}"/>
-              </a:ext>
-            </a:extLst>
-          </p:cNvPr>
-          <p:cNvCxnSpPr>
-            <a:cxnSpLocks/>
-          </p:cNvCxnSpPr>
-          <p:nvPr/>
-        </p:nvCxnSpPr>
-        <p:spPr>
-          <a:xfrm flipH="1">
-            <a:off x="4887688" y="2255982"/>
-            <a:ext cx="2797627" cy="0"/>
-          </a:xfrm>
-          <a:prstGeom prst="straightConnector1">
-            <a:avLst/>
-          </a:prstGeom>
-          <a:ln w="38100">
-            <a:solidFill>
-              <a:schemeClr val="bg1"/>
-            </a:solidFill>
-            <a:headEnd type="triangle" w="med" len="med"/>
-            <a:tailEnd type="triangle" w="med" len="med"/>
-          </a:ln>
-        </p:spPr>
-        <p:style>
-          <a:lnRef idx="2">
-            <a:schemeClr val="accent1"/>
-          </a:lnRef>
-          <a:fillRef idx="0">
-            <a:schemeClr val="accent1"/>
-          </a:fillRef>
-          <a:effectRef idx="1">
-            <a:schemeClr val="accent1"/>
-          </a:effectRef>
-          <a:fontRef idx="minor">
-            <a:schemeClr val="tx1"/>
-          </a:fontRef>
-        </p:style>
-      </p:cxnSp>
-      <p:cxnSp>
-        <p:nvCxnSpPr>
-          <p:cNvPr id="63" name="מחבר: מרפקי 62">
-            <a:extLst>
-              <a:ext uri="{FF2B5EF4-FFF2-40B4-BE49-F238E27FC236}">
-                <a16:creationId xmlns:a16="http://schemas.microsoft.com/office/drawing/2014/main" id="{99DD2A86-D7A4-CC8D-45A4-CCF90CF02F3D}"/>
-              </a:ext>
-            </a:extLst>
-          </p:cNvPr>
-          <p:cNvCxnSpPr>
-            <a:stCxn id="8" idx="2"/>
-            <a:endCxn id="14" idx="1"/>
-          </p:cNvCxnSpPr>
-          <p:nvPr/>
-        </p:nvCxnSpPr>
-        <p:spPr>
-          <a:xfrm rot="16200000" flipH="1">
-            <a:off x="6406634" y="3466708"/>
-            <a:ext cx="968046" cy="1589315"/>
-          </a:xfrm>
-          <a:prstGeom prst="bentConnector2">
-            <a:avLst/>
-          </a:prstGeom>
-          <a:ln w="38100">
-            <a:solidFill>
-              <a:schemeClr val="bg1"/>
-            </a:solidFill>
-            <a:headEnd type="triangle" w="med" len="med"/>
-            <a:tailEnd type="triangle" w="med" len="med"/>
-          </a:ln>
-        </p:spPr>
-        <p:style>
-          <a:lnRef idx="2">
-            <a:schemeClr val="accent1"/>
-          </a:lnRef>
-          <a:fillRef idx="0">
-            <a:schemeClr val="accent1"/>
-          </a:fillRef>
-          <a:effectRef idx="1">
-            <a:schemeClr val="accent1"/>
-          </a:effectRef>
-          <a:fontRef idx="minor">
-            <a:schemeClr val="tx1"/>
-          </a:fontRef>
-        </p:style>
-      </p:cxnSp>
+      </p:pic>
     </p:spTree>
     <p:extLst>
       <p:ext uri="{BB962C8B-B14F-4D97-AF65-F5344CB8AC3E}">
-        <p14:creationId xmlns:p14="http://schemas.microsoft.com/office/powerpoint/2010/main" val="3881991705"/>
+        <p14:creationId xmlns:p14="http://schemas.microsoft.com/office/powerpoint/2010/main" val="3465864551"/>
       </p:ext>
     </p:extLst>
   </p:cSld>

</xml_diff>

<commit_message>
chenge select to combobox, fix size of dialog and update page
</commit_message>
<xml_diff>
--- a/מצגת.pptx
+++ b/מצגת.pptx
@@ -207,7 +207,7 @@
           <a:p>
             <a:fld id="{BBCCBFA6-B51C-4C55-A048-214D83A203B2}" type="datetimeFigureOut">
               <a:rPr lang="he-IL" smtClean="0"/>
-              <a:t>ו'/אייר/תשפ"ה</a:t>
+              <a:t>ז'/אייר/תשפ"ה</a:t>
             </a:fld>
             <a:endParaRPr lang="he-IL"/>
           </a:p>
@@ -735,6 +735,9 @@
               <a:rPr lang="en-US" dirty="0"/>
               <a:t>NEWSAI</a:t>
             </a:r>
+            <a:br>
+              <a:rPr lang="en-US" dirty="0"/>
+            </a:br>
             <a:endParaRPr lang="he-IL" dirty="0"/>
           </a:p>
         </p:txBody>
@@ -1782,7 +1785,7 @@
           <a:p>
             <a:fld id="{B473996B-4291-4A11-B81F-85FF913FEA71}" type="datetimeFigureOut">
               <a:rPr lang="he-IL" smtClean="0"/>
-              <a:t>ו'/אייר/תשפ"ה</a:t>
+              <a:t>ז'/אייר/תשפ"ה</a:t>
             </a:fld>
             <a:endParaRPr lang="he-IL"/>
           </a:p>
@@ -1980,7 +1983,7 @@
           <a:p>
             <a:fld id="{B473996B-4291-4A11-B81F-85FF913FEA71}" type="datetimeFigureOut">
               <a:rPr lang="he-IL" smtClean="0"/>
-              <a:t>ו'/אייר/תשפ"ה</a:t>
+              <a:t>ז'/אייר/תשפ"ה</a:t>
             </a:fld>
             <a:endParaRPr lang="he-IL"/>
           </a:p>
@@ -2188,7 +2191,7 @@
           <a:p>
             <a:fld id="{B473996B-4291-4A11-B81F-85FF913FEA71}" type="datetimeFigureOut">
               <a:rPr lang="he-IL" smtClean="0"/>
-              <a:t>ו'/אייר/תשפ"ה</a:t>
+              <a:t>ז'/אייר/תשפ"ה</a:t>
             </a:fld>
             <a:endParaRPr lang="he-IL"/>
           </a:p>
@@ -2386,7 +2389,7 @@
           <a:p>
             <a:fld id="{B473996B-4291-4A11-B81F-85FF913FEA71}" type="datetimeFigureOut">
               <a:rPr lang="he-IL" smtClean="0"/>
-              <a:t>ו'/אייר/תשפ"ה</a:t>
+              <a:t>ז'/אייר/תשפ"ה</a:t>
             </a:fld>
             <a:endParaRPr lang="he-IL"/>
           </a:p>
@@ -2661,7 +2664,7 @@
           <a:p>
             <a:fld id="{B473996B-4291-4A11-B81F-85FF913FEA71}" type="datetimeFigureOut">
               <a:rPr lang="he-IL" smtClean="0"/>
-              <a:t>ו'/אייר/תשפ"ה</a:t>
+              <a:t>ז'/אייר/תשפ"ה</a:t>
             </a:fld>
             <a:endParaRPr lang="he-IL"/>
           </a:p>
@@ -2926,7 +2929,7 @@
           <a:p>
             <a:fld id="{B473996B-4291-4A11-B81F-85FF913FEA71}" type="datetimeFigureOut">
               <a:rPr lang="he-IL" smtClean="0"/>
-              <a:t>ו'/אייר/תשפ"ה</a:t>
+              <a:t>ז'/אייר/תשפ"ה</a:t>
             </a:fld>
             <a:endParaRPr lang="he-IL"/>
           </a:p>
@@ -3338,7 +3341,7 @@
           <a:p>
             <a:fld id="{B473996B-4291-4A11-B81F-85FF913FEA71}" type="datetimeFigureOut">
               <a:rPr lang="he-IL" smtClean="0"/>
-              <a:t>ו'/אייר/תשפ"ה</a:t>
+              <a:t>ז'/אייר/תשפ"ה</a:t>
             </a:fld>
             <a:endParaRPr lang="he-IL"/>
           </a:p>
@@ -3479,7 +3482,7 @@
           <a:p>
             <a:fld id="{B473996B-4291-4A11-B81F-85FF913FEA71}" type="datetimeFigureOut">
               <a:rPr lang="he-IL" smtClean="0"/>
-              <a:t>ו'/אייר/תשפ"ה</a:t>
+              <a:t>ז'/אייר/תשפ"ה</a:t>
             </a:fld>
             <a:endParaRPr lang="he-IL"/>
           </a:p>
@@ -3592,7 +3595,7 @@
           <a:p>
             <a:fld id="{B473996B-4291-4A11-B81F-85FF913FEA71}" type="datetimeFigureOut">
               <a:rPr lang="he-IL" smtClean="0"/>
-              <a:t>ו'/אייר/תשפ"ה</a:t>
+              <a:t>ז'/אייר/תשפ"ה</a:t>
             </a:fld>
             <a:endParaRPr lang="he-IL"/>
           </a:p>
@@ -3903,7 +3906,7 @@
           <a:p>
             <a:fld id="{B473996B-4291-4A11-B81F-85FF913FEA71}" type="datetimeFigureOut">
               <a:rPr lang="he-IL" smtClean="0"/>
-              <a:t>ו'/אייר/תשפ"ה</a:t>
+              <a:t>ז'/אייר/תשפ"ה</a:t>
             </a:fld>
             <a:endParaRPr lang="he-IL"/>
           </a:p>
@@ -4191,7 +4194,7 @@
           <a:p>
             <a:fld id="{B473996B-4291-4A11-B81F-85FF913FEA71}" type="datetimeFigureOut">
               <a:rPr lang="he-IL" smtClean="0"/>
-              <a:t>ו'/אייר/תשפ"ה</a:t>
+              <a:t>ז'/אייר/תשפ"ה</a:t>
             </a:fld>
             <a:endParaRPr lang="he-IL"/>
           </a:p>
@@ -4441,7 +4444,7 @@
           <a:p>
             <a:fld id="{B473996B-4291-4A11-B81F-85FF913FEA71}" type="datetimeFigureOut">
               <a:rPr lang="he-IL" smtClean="0"/>
-              <a:t>ו'/אייר/תשפ"ה</a:t>
+              <a:t>ז'/אייר/תשפ"ה</a:t>
             </a:fld>
             <a:endParaRPr lang="he-IL"/>
           </a:p>
@@ -5756,9 +5759,6 @@
             <a:p>
               <a:r>
                 <a:rPr lang="en-US" dirty="0" err="1">
-                  <a:solidFill>
-                    <a:schemeClr val="bg1"/>
-                  </a:solidFill>
                   <a:highlight>
                     <a:srgbClr val="00FFFF"/>
                   </a:highlight>
@@ -5766,9 +5766,6 @@
                 <a:t>KeyCloak</a:t>
               </a:r>
               <a:endParaRPr lang="he-IL" dirty="0">
-                <a:solidFill>
-                  <a:schemeClr val="bg1"/>
-                </a:solidFill>
                 <a:highlight>
                   <a:srgbClr val="00FFFF"/>
                 </a:highlight>
@@ -10101,9 +10098,6 @@
             <a:p>
               <a:r>
                 <a:rPr lang="en-US" dirty="0">
-                  <a:solidFill>
-                    <a:schemeClr val="bg1"/>
-                  </a:solidFill>
                   <a:highlight>
                     <a:srgbClr val="00FFFF"/>
                   </a:highlight>
@@ -10111,9 +10105,6 @@
                 <a:t>gateway</a:t>
               </a:r>
               <a:endParaRPr lang="he-IL" dirty="0">
-                <a:solidFill>
-                  <a:schemeClr val="bg1"/>
-                </a:solidFill>
                 <a:highlight>
                   <a:srgbClr val="00FFFF"/>
                 </a:highlight>
@@ -11516,9 +11507,6 @@
             <a:p>
               <a:r>
                 <a:rPr lang="en-US" dirty="0">
-                  <a:solidFill>
-                    <a:schemeClr val="bg1"/>
-                  </a:solidFill>
                   <a:highlight>
                     <a:srgbClr val="00FFFF"/>
                   </a:highlight>
@@ -11526,9 +11514,6 @@
                 <a:t>Data Manager</a:t>
               </a:r>
               <a:endParaRPr lang="he-IL" dirty="0">
-                <a:solidFill>
-                  <a:schemeClr val="bg1"/>
-                </a:solidFill>
                 <a:highlight>
                   <a:srgbClr val="00FFFF"/>
                 </a:highlight>
@@ -12882,9 +12867,6 @@
             <a:p>
               <a:r>
                 <a:rPr lang="en-US" dirty="0">
-                  <a:solidFill>
-                    <a:schemeClr val="bg1"/>
-                  </a:solidFill>
                   <a:highlight>
                     <a:srgbClr val="00FFFF"/>
                   </a:highlight>
@@ -12892,9 +12874,6 @@
                 <a:t>News Manager</a:t>
               </a:r>
               <a:endParaRPr lang="he-IL" dirty="0">
-                <a:solidFill>
-                  <a:schemeClr val="bg1"/>
-                </a:solidFill>
                 <a:highlight>
                   <a:srgbClr val="00FFFF"/>
                 </a:highlight>
@@ -14297,9 +14276,6 @@
             <a:p>
               <a:r>
                 <a:rPr lang="en-US" dirty="0">
-                  <a:solidFill>
-                    <a:schemeClr val="bg1"/>
-                  </a:solidFill>
                   <a:highlight>
                     <a:srgbClr val="00FFFF"/>
                   </a:highlight>
@@ -14307,9 +14283,6 @@
                 <a:t>LLM</a:t>
               </a:r>
               <a:endParaRPr lang="he-IL" dirty="0">
-                <a:solidFill>
-                  <a:schemeClr val="bg1"/>
-                </a:solidFill>
                 <a:highlight>
                   <a:srgbClr val="00FFFF"/>
                 </a:highlight>
@@ -15565,9 +15538,6 @@
             <a:p>
               <a:r>
                 <a:rPr lang="en-US" dirty="0">
-                  <a:solidFill>
-                    <a:schemeClr val="bg1"/>
-                  </a:solidFill>
                   <a:highlight>
                     <a:srgbClr val="00FFFF"/>
                   </a:highlight>
@@ -15575,9 +15545,6 @@
                 <a:t>Notification</a:t>
               </a:r>
               <a:endParaRPr lang="he-IL" dirty="0">
-                <a:solidFill>
-                  <a:schemeClr val="bg1"/>
-                </a:solidFill>
                 <a:highlight>
                   <a:srgbClr val="00FFFF"/>
                 </a:highlight>

</xml_diff>